<commit_message>
Refined display code and appearance
</commit_message>
<xml_diff>
--- a/assets/front_panel.pptx
+++ b/assets/front_panel.pptx
@@ -198,7 +198,7 @@
           <a:p>
             <a:fld id="{71E95682-14D9-2E46-B1B0-B9367477D62A}" type="datetimeFigureOut">
               <a:rPr lang="en-US" smtClean="0"/>
-              <a:t>4/14/25</a:t>
+              <a:t>4/15/25</a:t>
             </a:fld>
             <a:endParaRPr lang="en-US"/>
           </a:p>
@@ -780,7 +780,7 @@
           <a:p>
             <a:fld id="{41FB2227-03CE-E245-9493-775E002035A1}" type="datetimeFigureOut">
               <a:rPr lang="en-US" smtClean="0"/>
-              <a:t>4/14/25</a:t>
+              <a:t>4/15/25</a:t>
             </a:fld>
             <a:endParaRPr lang="en-US"/>
           </a:p>
@@ -978,7 +978,7 @@
           <a:p>
             <a:fld id="{41FB2227-03CE-E245-9493-775E002035A1}" type="datetimeFigureOut">
               <a:rPr lang="en-US" smtClean="0"/>
-              <a:t>4/14/25</a:t>
+              <a:t>4/15/25</a:t>
             </a:fld>
             <a:endParaRPr lang="en-US"/>
           </a:p>
@@ -1186,7 +1186,7 @@
           <a:p>
             <a:fld id="{41FB2227-03CE-E245-9493-775E002035A1}" type="datetimeFigureOut">
               <a:rPr lang="en-US" smtClean="0"/>
-              <a:t>4/14/25</a:t>
+              <a:t>4/15/25</a:t>
             </a:fld>
             <a:endParaRPr lang="en-US"/>
           </a:p>
@@ -1384,7 +1384,7 @@
           <a:p>
             <a:fld id="{41FB2227-03CE-E245-9493-775E002035A1}" type="datetimeFigureOut">
               <a:rPr lang="en-US" smtClean="0"/>
-              <a:t>4/14/25</a:t>
+              <a:t>4/15/25</a:t>
             </a:fld>
             <a:endParaRPr lang="en-US"/>
           </a:p>
@@ -1659,7 +1659,7 @@
           <a:p>
             <a:fld id="{41FB2227-03CE-E245-9493-775E002035A1}" type="datetimeFigureOut">
               <a:rPr lang="en-US" smtClean="0"/>
-              <a:t>4/14/25</a:t>
+              <a:t>4/15/25</a:t>
             </a:fld>
             <a:endParaRPr lang="en-US"/>
           </a:p>
@@ -1924,7 +1924,7 @@
           <a:p>
             <a:fld id="{41FB2227-03CE-E245-9493-775E002035A1}" type="datetimeFigureOut">
               <a:rPr lang="en-US" smtClean="0"/>
-              <a:t>4/14/25</a:t>
+              <a:t>4/15/25</a:t>
             </a:fld>
             <a:endParaRPr lang="en-US"/>
           </a:p>
@@ -2336,7 +2336,7 @@
           <a:p>
             <a:fld id="{41FB2227-03CE-E245-9493-775E002035A1}" type="datetimeFigureOut">
               <a:rPr lang="en-US" smtClean="0"/>
-              <a:t>4/14/25</a:t>
+              <a:t>4/15/25</a:t>
             </a:fld>
             <a:endParaRPr lang="en-US"/>
           </a:p>
@@ -2477,7 +2477,7 @@
           <a:p>
             <a:fld id="{41FB2227-03CE-E245-9493-775E002035A1}" type="datetimeFigureOut">
               <a:rPr lang="en-US" smtClean="0"/>
-              <a:t>4/14/25</a:t>
+              <a:t>4/15/25</a:t>
             </a:fld>
             <a:endParaRPr lang="en-US"/>
           </a:p>
@@ -2590,7 +2590,7 @@
           <a:p>
             <a:fld id="{41FB2227-03CE-E245-9493-775E002035A1}" type="datetimeFigureOut">
               <a:rPr lang="en-US" smtClean="0"/>
-              <a:t>4/14/25</a:t>
+              <a:t>4/15/25</a:t>
             </a:fld>
             <a:endParaRPr lang="en-US"/>
           </a:p>
@@ -2901,7 +2901,7 @@
           <a:p>
             <a:fld id="{41FB2227-03CE-E245-9493-775E002035A1}" type="datetimeFigureOut">
               <a:rPr lang="en-US" smtClean="0"/>
-              <a:t>4/14/25</a:t>
+              <a:t>4/15/25</a:t>
             </a:fld>
             <a:endParaRPr lang="en-US"/>
           </a:p>
@@ -3189,7 +3189,7 @@
           <a:p>
             <a:fld id="{41FB2227-03CE-E245-9493-775E002035A1}" type="datetimeFigureOut">
               <a:rPr lang="en-US" smtClean="0"/>
-              <a:t>4/14/25</a:t>
+              <a:t>4/15/25</a:t>
             </a:fld>
             <a:endParaRPr lang="en-US"/>
           </a:p>
@@ -3430,7 +3430,7 @@
           <a:p>
             <a:fld id="{41FB2227-03CE-E245-9493-775E002035A1}" type="datetimeFigureOut">
               <a:rPr lang="en-US" smtClean="0"/>
-              <a:t>4/14/25</a:t>
+              <a:t>4/15/25</a:t>
             </a:fld>
             <a:endParaRPr lang="en-US"/>
           </a:p>
@@ -17037,15 +17037,148 @@
             <a:avLst/>
           </a:prstGeom>
           <a:solidFill>
-            <a:srgbClr val="051A23"/>
+            <a:srgbClr val="02090C"/>
           </a:solidFill>
           <a:scene3d>
             <a:camera prst="orthographicFront"/>
             <a:lightRig rig="threePt" dir="t"/>
           </a:scene3d>
           <a:sp3d>
-            <a:bevelT w="50800" h="50800" prst="softRound"/>
+            <a:bevelT w="25400" h="25400" prst="softRound"/>
           </a:sp3d>
+        </p:spPr>
+        <p:style>
+          <a:lnRef idx="2">
+            <a:schemeClr val="accent1">
+              <a:shade val="15000"/>
+            </a:schemeClr>
+          </a:lnRef>
+          <a:fillRef idx="1">
+            <a:schemeClr val="accent1"/>
+          </a:fillRef>
+          <a:effectRef idx="0">
+            <a:schemeClr val="accent1"/>
+          </a:effectRef>
+          <a:fontRef idx="minor">
+            <a:schemeClr val="lt1"/>
+          </a:fontRef>
+        </p:style>
+        <p:txBody>
+          <a:bodyPr rtlCol="0" anchor="ctr"/>
+          <a:lstStyle/>
+          <a:p>
+            <a:pPr algn="ctr"/>
+            <a:endParaRPr lang="en-US" dirty="0"/>
+          </a:p>
+        </p:txBody>
+      </p:sp>
+      <p:sp>
+        <p:nvSpPr>
+          <p:cNvPr id="49" name="Rectangle 48">
+            <a:extLst>
+              <a:ext uri="{FF2B5EF4-FFF2-40B4-BE49-F238E27FC236}">
+                <a16:creationId xmlns:a16="http://schemas.microsoft.com/office/drawing/2014/main" id="{96B14877-3BC8-2B5D-2D5E-844B0D2D89E0}"/>
+              </a:ext>
+            </a:extLst>
+          </p:cNvPr>
+          <p:cNvSpPr/>
+          <p:nvPr/>
+        </p:nvSpPr>
+        <p:spPr>
+          <a:xfrm>
+            <a:off x="1670050" y="4765675"/>
+            <a:ext cx="9639300" cy="638175"/>
+          </a:xfrm>
+          <a:prstGeom prst="rect">
+            <a:avLst/>
+          </a:prstGeom>
+          <a:blipFill dpi="0" rotWithShape="1">
+            <a:blip r:embed="rId4"/>
+            <a:srcRect/>
+            <a:tile tx="0" ty="0" sx="20000" sy="20000" flip="none" algn="tl"/>
+          </a:blipFill>
+          <a:ln>
+            <a:noFill/>
+          </a:ln>
+          <a:scene3d>
+            <a:camera prst="orthographicFront"/>
+            <a:lightRig rig="threePt" dir="t"/>
+          </a:scene3d>
+          <a:sp3d prstMaterial="clear">
+            <a:bevelT w="38100" h="38100"/>
+          </a:sp3d>
+        </p:spPr>
+        <p:style>
+          <a:lnRef idx="2">
+            <a:schemeClr val="accent1">
+              <a:shade val="15000"/>
+            </a:schemeClr>
+          </a:lnRef>
+          <a:fillRef idx="1">
+            <a:schemeClr val="accent1"/>
+          </a:fillRef>
+          <a:effectRef idx="0">
+            <a:schemeClr val="accent1"/>
+          </a:effectRef>
+          <a:fontRef idx="minor">
+            <a:schemeClr val="lt1"/>
+          </a:fontRef>
+        </p:style>
+        <p:txBody>
+          <a:bodyPr rtlCol="0" anchor="ctr"/>
+          <a:lstStyle/>
+          <a:p>
+            <a:pPr algn="ctr"/>
+            <a:endParaRPr lang="en-US"/>
+          </a:p>
+        </p:txBody>
+      </p:sp>
+      <p:sp>
+        <p:nvSpPr>
+          <p:cNvPr id="46" name="Rectangle 45">
+            <a:extLst>
+              <a:ext uri="{FF2B5EF4-FFF2-40B4-BE49-F238E27FC236}">
+                <a16:creationId xmlns:a16="http://schemas.microsoft.com/office/drawing/2014/main" id="{052C593D-B3E1-1C1C-924E-4A870F01A1EE}"/>
+              </a:ext>
+            </a:extLst>
+          </p:cNvPr>
+          <p:cNvSpPr/>
+          <p:nvPr/>
+        </p:nvSpPr>
+        <p:spPr>
+          <a:xfrm>
+            <a:off x="1666875" y="4769519"/>
+            <a:ext cx="9639301" cy="634331"/>
+          </a:xfrm>
+          <a:prstGeom prst="rect">
+            <a:avLst/>
+          </a:prstGeom>
+          <a:gradFill flip="none" rotWithShape="1">
+            <a:gsLst>
+              <a:gs pos="0">
+                <a:schemeClr val="bg1">
+                  <a:alpha val="10328"/>
+                </a:schemeClr>
+              </a:gs>
+              <a:gs pos="100000">
+                <a:schemeClr val="tx2">
+                  <a:lumMod val="90000"/>
+                  <a:lumOff val="10000"/>
+                  <a:alpha val="0"/>
+                </a:schemeClr>
+              </a:gs>
+            </a:gsLst>
+            <a:lin ang="1200000" scaled="0"/>
+            <a:tileRect/>
+          </a:gradFill>
+          <a:ln>
+            <a:noFill/>
+          </a:ln>
+          <a:scene3d>
+            <a:camera prst="orthographicFront"/>
+            <a:lightRig rig="threePt" dir="t"/>
+          </a:scene3d>
+          <a:sp3d prstMaterial="matte"/>
         </p:spPr>
         <p:style>
           <a:lnRef idx="2">

</xml_diff>

<commit_message>
Expanded display to 7 lines
</commit_message>
<xml_diff>
--- a/assets/front_panel.pptx
+++ b/assets/front_panel.pptx
@@ -2,7 +2,7 @@
 <file path=ppt/presentation.xml><?xml version="1.0" encoding="utf-8"?>
 <p:presentation xmlns:a="http://schemas.openxmlformats.org/drawingml/2006/main" xmlns:r="http://schemas.openxmlformats.org/officeDocument/2006/relationships" xmlns:p="http://schemas.openxmlformats.org/presentationml/2006/main" saveSubsetFonts="1" autoCompressPictures="0">
   <p:sldMasterIdLst>
-    <p:sldMasterId id="2147483648" r:id="rId1"/>
+    <p:sldMasterId id="2147483660" r:id="rId1"/>
   </p:sldMasterIdLst>
   <p:notesMasterIdLst>
     <p:notesMasterId r:id="rId4"/>
@@ -11,13 +11,13 @@
     <p:sldId id="256" r:id="rId2"/>
     <p:sldId id="258" r:id="rId3"/>
   </p:sldIdLst>
-  <p:sldSz cx="12192000" cy="6858000"/>
+  <p:sldSz cx="12192000" cy="9144000"/>
   <p:notesSz cx="6858000" cy="9144000"/>
   <p:defaultTextStyle>
     <a:defPPr>
       <a:defRPr lang="en-US"/>
     </a:defPPr>
-    <a:lvl1pPr marL="0" algn="l" defTabSz="914400" rtl="0" eaLnBrk="1" latinLnBrk="0" hangingPunct="1">
+    <a:lvl1pPr marL="0" algn="l" defTabSz="457200" rtl="0" eaLnBrk="1" latinLnBrk="0" hangingPunct="1">
       <a:defRPr sz="1800" kern="1200">
         <a:solidFill>
           <a:schemeClr val="tx1"/>
@@ -27,7 +27,7 @@
         <a:cs typeface="+mn-cs"/>
       </a:defRPr>
     </a:lvl1pPr>
-    <a:lvl2pPr marL="457200" algn="l" defTabSz="914400" rtl="0" eaLnBrk="1" latinLnBrk="0" hangingPunct="1">
+    <a:lvl2pPr marL="457200" algn="l" defTabSz="457200" rtl="0" eaLnBrk="1" latinLnBrk="0" hangingPunct="1">
       <a:defRPr sz="1800" kern="1200">
         <a:solidFill>
           <a:schemeClr val="tx1"/>
@@ -37,7 +37,7 @@
         <a:cs typeface="+mn-cs"/>
       </a:defRPr>
     </a:lvl2pPr>
-    <a:lvl3pPr marL="914400" algn="l" defTabSz="914400" rtl="0" eaLnBrk="1" latinLnBrk="0" hangingPunct="1">
+    <a:lvl3pPr marL="914400" algn="l" defTabSz="457200" rtl="0" eaLnBrk="1" latinLnBrk="0" hangingPunct="1">
       <a:defRPr sz="1800" kern="1200">
         <a:solidFill>
           <a:schemeClr val="tx1"/>
@@ -47,7 +47,7 @@
         <a:cs typeface="+mn-cs"/>
       </a:defRPr>
     </a:lvl3pPr>
-    <a:lvl4pPr marL="1371600" algn="l" defTabSz="914400" rtl="0" eaLnBrk="1" latinLnBrk="0" hangingPunct="1">
+    <a:lvl4pPr marL="1371600" algn="l" defTabSz="457200" rtl="0" eaLnBrk="1" latinLnBrk="0" hangingPunct="1">
       <a:defRPr sz="1800" kern="1200">
         <a:solidFill>
           <a:schemeClr val="tx1"/>
@@ -57,7 +57,7 @@
         <a:cs typeface="+mn-cs"/>
       </a:defRPr>
     </a:lvl4pPr>
-    <a:lvl5pPr marL="1828800" algn="l" defTabSz="914400" rtl="0" eaLnBrk="1" latinLnBrk="0" hangingPunct="1">
+    <a:lvl5pPr marL="1828800" algn="l" defTabSz="457200" rtl="0" eaLnBrk="1" latinLnBrk="0" hangingPunct="1">
       <a:defRPr sz="1800" kern="1200">
         <a:solidFill>
           <a:schemeClr val="tx1"/>
@@ -67,7 +67,7 @@
         <a:cs typeface="+mn-cs"/>
       </a:defRPr>
     </a:lvl5pPr>
-    <a:lvl6pPr marL="2286000" algn="l" defTabSz="914400" rtl="0" eaLnBrk="1" latinLnBrk="0" hangingPunct="1">
+    <a:lvl6pPr marL="2286000" algn="l" defTabSz="457200" rtl="0" eaLnBrk="1" latinLnBrk="0" hangingPunct="1">
       <a:defRPr sz="1800" kern="1200">
         <a:solidFill>
           <a:schemeClr val="tx1"/>
@@ -77,7 +77,7 @@
         <a:cs typeface="+mn-cs"/>
       </a:defRPr>
     </a:lvl6pPr>
-    <a:lvl7pPr marL="2743200" algn="l" defTabSz="914400" rtl="0" eaLnBrk="1" latinLnBrk="0" hangingPunct="1">
+    <a:lvl7pPr marL="2743200" algn="l" defTabSz="457200" rtl="0" eaLnBrk="1" latinLnBrk="0" hangingPunct="1">
       <a:defRPr sz="1800" kern="1200">
         <a:solidFill>
           <a:schemeClr val="tx1"/>
@@ -87,7 +87,7 @@
         <a:cs typeface="+mn-cs"/>
       </a:defRPr>
     </a:lvl7pPr>
-    <a:lvl8pPr marL="3200400" algn="l" defTabSz="914400" rtl="0" eaLnBrk="1" latinLnBrk="0" hangingPunct="1">
+    <a:lvl8pPr marL="3200400" algn="l" defTabSz="457200" rtl="0" eaLnBrk="1" latinLnBrk="0" hangingPunct="1">
       <a:defRPr sz="1800" kern="1200">
         <a:solidFill>
           <a:schemeClr val="tx1"/>
@@ -97,7 +97,7 @@
         <a:cs typeface="+mn-cs"/>
       </a:defRPr>
     </a:lvl8pPr>
-    <a:lvl9pPr marL="3657600" algn="l" defTabSz="914400" rtl="0" eaLnBrk="1" latinLnBrk="0" hangingPunct="1">
+    <a:lvl9pPr marL="3657600" algn="l" defTabSz="457200" rtl="0" eaLnBrk="1" latinLnBrk="0" hangingPunct="1">
       <a:defRPr sz="1800" kern="1200">
         <a:solidFill>
           <a:schemeClr val="tx1"/>
@@ -198,7 +198,7 @@
           <a:p>
             <a:fld id="{71E95682-14D9-2E46-B1B0-B9367477D62A}" type="datetimeFigureOut">
               <a:rPr lang="en-US" smtClean="0"/>
-              <a:t>4/15/25</a:t>
+              <a:t>4/21/25</a:t>
             </a:fld>
             <a:endParaRPr lang="en-US"/>
           </a:p>
@@ -216,8 +216,8 @@
         </p:nvSpPr>
         <p:spPr>
           <a:xfrm>
-            <a:off x="685800" y="1143000"/>
-            <a:ext cx="5486400" cy="3086100"/>
+            <a:off x="1371600" y="1143000"/>
+            <a:ext cx="4114800" cy="3086100"/>
           </a:xfrm>
           <a:prstGeom prst="rect">
             <a:avLst/>
@@ -492,7 +492,12 @@
             <p:ph type="sldImg"/>
           </p:nvPr>
         </p:nvSpPr>
-        <p:spPr/>
+        <p:spPr>
+          <a:xfrm>
+            <a:off x="1371600" y="1143000"/>
+            <a:ext cx="4114800" cy="3086100"/>
+          </a:xfrm>
+        </p:spPr>
       </p:sp>
       <p:sp>
         <p:nvSpPr>
@@ -576,7 +581,12 @@
             <p:ph type="sldImg"/>
           </p:nvPr>
         </p:nvSpPr>
-        <p:spPr/>
+        <p:spPr>
+          <a:xfrm>
+            <a:off x="1371600" y="1143000"/>
+            <a:ext cx="4114800" cy="3086100"/>
+          </a:xfrm>
+        </p:spPr>
       </p:sp>
       <p:sp>
         <p:nvSpPr>
@@ -652,13 +662,7 @@
       </p:grpSpPr>
       <p:sp>
         <p:nvSpPr>
-          <p:cNvPr id="2" name="Title 1">
-            <a:extLst>
-              <a:ext uri="{FF2B5EF4-FFF2-40B4-BE49-F238E27FC236}">
-                <a16:creationId xmlns:a16="http://schemas.microsoft.com/office/drawing/2014/main" id="{AE921E72-5D93-2648-12EE-07D97DA78120}"/>
-              </a:ext>
-            </a:extLst>
-          </p:cNvPr>
+          <p:cNvPr id="2" name="Title 1"/>
           <p:cNvSpPr>
             <a:spLocks noGrp="1"/>
           </p:cNvSpPr>
@@ -668,15 +672,15 @@
         </p:nvSpPr>
         <p:spPr>
           <a:xfrm>
-            <a:off x="1524000" y="1122363"/>
-            <a:ext cx="9144000" cy="2387600"/>
+            <a:off x="914400" y="1496484"/>
+            <a:ext cx="10363200" cy="3183467"/>
           </a:xfrm>
         </p:spPr>
         <p:txBody>
           <a:bodyPr anchor="b"/>
           <a:lstStyle>
             <a:lvl1pPr algn="ctr">
-              <a:defRPr sz="6000"/>
+              <a:defRPr sz="8000"/>
             </a:lvl1pPr>
           </a:lstStyle>
           <a:p>
@@ -684,18 +688,13 @@
               <a:rPr lang="en-US"/>
               <a:t>Click to edit Master title style</a:t>
             </a:r>
-          </a:p>
-        </p:txBody>
-      </p:sp>
-      <p:sp>
-        <p:nvSpPr>
-          <p:cNvPr id="3" name="Subtitle 2">
-            <a:extLst>
-              <a:ext uri="{FF2B5EF4-FFF2-40B4-BE49-F238E27FC236}">
-                <a16:creationId xmlns:a16="http://schemas.microsoft.com/office/drawing/2014/main" id="{0A70C4FA-DA5E-BDDF-FAFD-EDA2D282D76F}"/>
-              </a:ext>
-            </a:extLst>
-          </p:cNvPr>
+            <a:endParaRPr lang="en-US" dirty="0"/>
+          </a:p>
+        </p:txBody>
+      </p:sp>
+      <p:sp>
+        <p:nvSpPr>
+          <p:cNvPr id="3" name="Subtitle 2"/>
           <p:cNvSpPr>
             <a:spLocks noGrp="1"/>
           </p:cNvSpPr>
@@ -705,8 +704,8 @@
         </p:nvSpPr>
         <p:spPr>
           <a:xfrm>
-            <a:off x="1524000" y="3602038"/>
-            <a:ext cx="9144000" cy="1655762"/>
+            <a:off x="1524000" y="4802717"/>
+            <a:ext cx="9144000" cy="2207683"/>
           </a:xfrm>
         </p:spPr>
         <p:txBody>
@@ -714,39 +713,39 @@
           <a:lstStyle>
             <a:lvl1pPr marL="0" indent="0" algn="ctr">
               <a:buNone/>
+              <a:defRPr sz="3200"/>
+            </a:lvl1pPr>
+            <a:lvl2pPr marL="609585" indent="0" algn="ctr">
+              <a:buNone/>
+              <a:defRPr sz="2667"/>
+            </a:lvl2pPr>
+            <a:lvl3pPr marL="1219170" indent="0" algn="ctr">
+              <a:buNone/>
               <a:defRPr sz="2400"/>
-            </a:lvl1pPr>
-            <a:lvl2pPr marL="457200" indent="0" algn="ctr">
+            </a:lvl3pPr>
+            <a:lvl4pPr marL="1828754" indent="0" algn="ctr">
               <a:buNone/>
-              <a:defRPr sz="2000"/>
-            </a:lvl2pPr>
-            <a:lvl3pPr marL="914400" indent="0" algn="ctr">
+              <a:defRPr sz="2133"/>
+            </a:lvl4pPr>
+            <a:lvl5pPr marL="2438339" indent="0" algn="ctr">
               <a:buNone/>
-              <a:defRPr sz="1800"/>
-            </a:lvl3pPr>
-            <a:lvl4pPr marL="1371600" indent="0" algn="ctr">
+              <a:defRPr sz="2133"/>
+            </a:lvl5pPr>
+            <a:lvl6pPr marL="3047924" indent="0" algn="ctr">
               <a:buNone/>
-              <a:defRPr sz="1600"/>
-            </a:lvl4pPr>
-            <a:lvl5pPr marL="1828800" indent="0" algn="ctr">
+              <a:defRPr sz="2133"/>
+            </a:lvl6pPr>
+            <a:lvl7pPr marL="3657509" indent="0" algn="ctr">
               <a:buNone/>
-              <a:defRPr sz="1600"/>
-            </a:lvl5pPr>
-            <a:lvl6pPr marL="2286000" indent="0" algn="ctr">
+              <a:defRPr sz="2133"/>
+            </a:lvl7pPr>
+            <a:lvl8pPr marL="4267093" indent="0" algn="ctr">
               <a:buNone/>
-              <a:defRPr sz="1600"/>
-            </a:lvl6pPr>
-            <a:lvl7pPr marL="2743200" indent="0" algn="ctr">
+              <a:defRPr sz="2133"/>
+            </a:lvl8pPr>
+            <a:lvl9pPr marL="4876678" indent="0" algn="ctr">
               <a:buNone/>
-              <a:defRPr sz="1600"/>
-            </a:lvl7pPr>
-            <a:lvl8pPr marL="3200400" indent="0" algn="ctr">
-              <a:buNone/>
-              <a:defRPr sz="1600"/>
-            </a:lvl8pPr>
-            <a:lvl9pPr marL="3657600" indent="0" algn="ctr">
-              <a:buNone/>
-              <a:defRPr sz="1600"/>
+              <a:defRPr sz="2133"/>
             </a:lvl9pPr>
           </a:lstStyle>
           <a:p>
@@ -754,18 +753,13 @@
               <a:rPr lang="en-US"/>
               <a:t>Click to edit Master subtitle style</a:t>
             </a:r>
-          </a:p>
-        </p:txBody>
-      </p:sp>
-      <p:sp>
-        <p:nvSpPr>
-          <p:cNvPr id="4" name="Date Placeholder 3">
-            <a:extLst>
-              <a:ext uri="{FF2B5EF4-FFF2-40B4-BE49-F238E27FC236}">
-                <a16:creationId xmlns:a16="http://schemas.microsoft.com/office/drawing/2014/main" id="{F0169B29-7657-2F8A-FE62-5C14EA60424C}"/>
-              </a:ext>
-            </a:extLst>
-          </p:cNvPr>
+            <a:endParaRPr lang="en-US" dirty="0"/>
+          </a:p>
+        </p:txBody>
+      </p:sp>
+      <p:sp>
+        <p:nvSpPr>
+          <p:cNvPr id="4" name="Date Placeholder 3"/>
           <p:cNvSpPr>
             <a:spLocks noGrp="1"/>
           </p:cNvSpPr>
@@ -780,7 +774,7 @@
           <a:p>
             <a:fld id="{41FB2227-03CE-E245-9493-775E002035A1}" type="datetimeFigureOut">
               <a:rPr lang="en-US" smtClean="0"/>
-              <a:t>4/15/25</a:t>
+              <a:t>4/21/25</a:t>
             </a:fld>
             <a:endParaRPr lang="en-US"/>
           </a:p>
@@ -788,13 +782,7 @@
       </p:sp>
       <p:sp>
         <p:nvSpPr>
-          <p:cNvPr id="5" name="Footer Placeholder 4">
-            <a:extLst>
-              <a:ext uri="{FF2B5EF4-FFF2-40B4-BE49-F238E27FC236}">
-                <a16:creationId xmlns:a16="http://schemas.microsoft.com/office/drawing/2014/main" id="{29102F07-EE31-1982-989F-61FF0D2B573A}"/>
-              </a:ext>
-            </a:extLst>
-          </p:cNvPr>
+          <p:cNvPr id="5" name="Footer Placeholder 4"/>
           <p:cNvSpPr>
             <a:spLocks noGrp="1"/>
           </p:cNvSpPr>
@@ -813,13 +801,7 @@
       </p:sp>
       <p:sp>
         <p:nvSpPr>
-          <p:cNvPr id="6" name="Slide Number Placeholder 5">
-            <a:extLst>
-              <a:ext uri="{FF2B5EF4-FFF2-40B4-BE49-F238E27FC236}">
-                <a16:creationId xmlns:a16="http://schemas.microsoft.com/office/drawing/2014/main" id="{AC49B2D7-1028-1E00-364F-858EF3EF00DA}"/>
-              </a:ext>
-            </a:extLst>
-          </p:cNvPr>
+          <p:cNvPr id="6" name="Slide Number Placeholder 5"/>
           <p:cNvSpPr>
             <a:spLocks noGrp="1"/>
           </p:cNvSpPr>
@@ -843,7 +825,7 @@
     </p:spTree>
     <p:extLst>
       <p:ext uri="{BB962C8B-B14F-4D97-AF65-F5344CB8AC3E}">
-        <p14:creationId xmlns:p14="http://schemas.microsoft.com/office/powerpoint/2010/main" val="4096787792"/>
+        <p14:creationId xmlns:p14="http://schemas.microsoft.com/office/powerpoint/2010/main" val="1711273136"/>
       </p:ext>
     </p:extLst>
   </p:cSld>
@@ -872,13 +854,7 @@
       </p:grpSpPr>
       <p:sp>
         <p:nvSpPr>
-          <p:cNvPr id="2" name="Title 1">
-            <a:extLst>
-              <a:ext uri="{FF2B5EF4-FFF2-40B4-BE49-F238E27FC236}">
-                <a16:creationId xmlns:a16="http://schemas.microsoft.com/office/drawing/2014/main" id="{1F526A7D-381D-C5F6-3B12-3D77F2175D50}"/>
-              </a:ext>
-            </a:extLst>
-          </p:cNvPr>
+          <p:cNvPr id="2" name="Title 1"/>
           <p:cNvSpPr>
             <a:spLocks noGrp="1"/>
           </p:cNvSpPr>
@@ -895,18 +871,13 @@
               <a:rPr lang="en-US"/>
               <a:t>Click to edit Master title style</a:t>
             </a:r>
-          </a:p>
-        </p:txBody>
-      </p:sp>
-      <p:sp>
-        <p:nvSpPr>
-          <p:cNvPr id="3" name="Vertical Text Placeholder 2">
-            <a:extLst>
-              <a:ext uri="{FF2B5EF4-FFF2-40B4-BE49-F238E27FC236}">
-                <a16:creationId xmlns:a16="http://schemas.microsoft.com/office/drawing/2014/main" id="{DE281363-57C8-64F7-CEFC-41879C7BA6B7}"/>
-              </a:ext>
-            </a:extLst>
-          </p:cNvPr>
+            <a:endParaRPr lang="en-US" dirty="0"/>
+          </a:p>
+        </p:txBody>
+      </p:sp>
+      <p:sp>
+        <p:nvSpPr>
+          <p:cNvPr id="3" name="Vertical Text Placeholder 2"/>
           <p:cNvSpPr>
             <a:spLocks noGrp="1"/>
           </p:cNvSpPr>
@@ -952,18 +923,13 @@
               <a:rPr lang="en-US"/>
               <a:t>Fifth level</a:t>
             </a:r>
-          </a:p>
-        </p:txBody>
-      </p:sp>
-      <p:sp>
-        <p:nvSpPr>
-          <p:cNvPr id="4" name="Date Placeholder 3">
-            <a:extLst>
-              <a:ext uri="{FF2B5EF4-FFF2-40B4-BE49-F238E27FC236}">
-                <a16:creationId xmlns:a16="http://schemas.microsoft.com/office/drawing/2014/main" id="{2E0F27D9-3D2C-847B-4E26-C2A9F132F019}"/>
-              </a:ext>
-            </a:extLst>
-          </p:cNvPr>
+            <a:endParaRPr lang="en-US" dirty="0"/>
+          </a:p>
+        </p:txBody>
+      </p:sp>
+      <p:sp>
+        <p:nvSpPr>
+          <p:cNvPr id="4" name="Date Placeholder 3"/>
           <p:cNvSpPr>
             <a:spLocks noGrp="1"/>
           </p:cNvSpPr>
@@ -978,7 +944,7 @@
           <a:p>
             <a:fld id="{41FB2227-03CE-E245-9493-775E002035A1}" type="datetimeFigureOut">
               <a:rPr lang="en-US" smtClean="0"/>
-              <a:t>4/15/25</a:t>
+              <a:t>4/21/25</a:t>
             </a:fld>
             <a:endParaRPr lang="en-US"/>
           </a:p>
@@ -986,13 +952,7 @@
       </p:sp>
       <p:sp>
         <p:nvSpPr>
-          <p:cNvPr id="5" name="Footer Placeholder 4">
-            <a:extLst>
-              <a:ext uri="{FF2B5EF4-FFF2-40B4-BE49-F238E27FC236}">
-                <a16:creationId xmlns:a16="http://schemas.microsoft.com/office/drawing/2014/main" id="{6B2243E9-12C2-0E1A-A6BD-EFCBCB22A4C6}"/>
-              </a:ext>
-            </a:extLst>
-          </p:cNvPr>
+          <p:cNvPr id="5" name="Footer Placeholder 4"/>
           <p:cNvSpPr>
             <a:spLocks noGrp="1"/>
           </p:cNvSpPr>
@@ -1011,13 +971,7 @@
       </p:sp>
       <p:sp>
         <p:nvSpPr>
-          <p:cNvPr id="6" name="Slide Number Placeholder 5">
-            <a:extLst>
-              <a:ext uri="{FF2B5EF4-FFF2-40B4-BE49-F238E27FC236}">
-                <a16:creationId xmlns:a16="http://schemas.microsoft.com/office/drawing/2014/main" id="{F0015229-EA1A-132C-F42E-C2DC20382CA2}"/>
-              </a:ext>
-            </a:extLst>
-          </p:cNvPr>
+          <p:cNvPr id="6" name="Slide Number Placeholder 5"/>
           <p:cNvSpPr>
             <a:spLocks noGrp="1"/>
           </p:cNvSpPr>
@@ -1041,7 +995,7 @@
     </p:spTree>
     <p:extLst>
       <p:ext uri="{BB962C8B-B14F-4D97-AF65-F5344CB8AC3E}">
-        <p14:creationId xmlns:p14="http://schemas.microsoft.com/office/powerpoint/2010/main" val="3012531163"/>
+        <p14:creationId xmlns:p14="http://schemas.microsoft.com/office/powerpoint/2010/main" val="2446336368"/>
       </p:ext>
     </p:extLst>
   </p:cSld>
@@ -1070,13 +1024,7 @@
       </p:grpSpPr>
       <p:sp>
         <p:nvSpPr>
-          <p:cNvPr id="2" name="Vertical Title 1">
-            <a:extLst>
-              <a:ext uri="{FF2B5EF4-FFF2-40B4-BE49-F238E27FC236}">
-                <a16:creationId xmlns:a16="http://schemas.microsoft.com/office/drawing/2014/main" id="{B09E4BF5-A881-2858-C611-EE4DA9484865}"/>
-              </a:ext>
-            </a:extLst>
-          </p:cNvPr>
+          <p:cNvPr id="2" name="Vertical Title 1"/>
           <p:cNvSpPr>
             <a:spLocks noGrp="1"/>
           </p:cNvSpPr>
@@ -1086,8 +1034,8 @@
         </p:nvSpPr>
         <p:spPr>
           <a:xfrm>
-            <a:off x="8724900" y="365125"/>
-            <a:ext cx="2628900" cy="5811838"/>
+            <a:off x="8724901" y="486833"/>
+            <a:ext cx="2628900" cy="7749117"/>
           </a:xfrm>
         </p:spPr>
         <p:txBody>
@@ -1098,18 +1046,13 @@
               <a:rPr lang="en-US"/>
               <a:t>Click to edit Master title style</a:t>
             </a:r>
-          </a:p>
-        </p:txBody>
-      </p:sp>
-      <p:sp>
-        <p:nvSpPr>
-          <p:cNvPr id="3" name="Vertical Text Placeholder 2">
-            <a:extLst>
-              <a:ext uri="{FF2B5EF4-FFF2-40B4-BE49-F238E27FC236}">
-                <a16:creationId xmlns:a16="http://schemas.microsoft.com/office/drawing/2014/main" id="{EBA680B7-C2B2-7B58-BF48-381A2DDC3344}"/>
-              </a:ext>
-            </a:extLst>
-          </p:cNvPr>
+            <a:endParaRPr lang="en-US" dirty="0"/>
+          </a:p>
+        </p:txBody>
+      </p:sp>
+      <p:sp>
+        <p:nvSpPr>
+          <p:cNvPr id="3" name="Vertical Text Placeholder 2"/>
           <p:cNvSpPr>
             <a:spLocks noGrp="1"/>
           </p:cNvSpPr>
@@ -1119,8 +1062,8 @@
         </p:nvSpPr>
         <p:spPr>
           <a:xfrm>
-            <a:off x="838200" y="365125"/>
-            <a:ext cx="7734300" cy="5811838"/>
+            <a:off x="838201" y="486833"/>
+            <a:ext cx="7734300" cy="7749117"/>
           </a:xfrm>
         </p:spPr>
         <p:txBody>
@@ -1160,18 +1103,13 @@
               <a:rPr lang="en-US"/>
               <a:t>Fifth level</a:t>
             </a:r>
-          </a:p>
-        </p:txBody>
-      </p:sp>
-      <p:sp>
-        <p:nvSpPr>
-          <p:cNvPr id="4" name="Date Placeholder 3">
-            <a:extLst>
-              <a:ext uri="{FF2B5EF4-FFF2-40B4-BE49-F238E27FC236}">
-                <a16:creationId xmlns:a16="http://schemas.microsoft.com/office/drawing/2014/main" id="{8AF4D041-D836-F9B7-627D-200BDA3C9FB5}"/>
-              </a:ext>
-            </a:extLst>
-          </p:cNvPr>
+            <a:endParaRPr lang="en-US" dirty="0"/>
+          </a:p>
+        </p:txBody>
+      </p:sp>
+      <p:sp>
+        <p:nvSpPr>
+          <p:cNvPr id="4" name="Date Placeholder 3"/>
           <p:cNvSpPr>
             <a:spLocks noGrp="1"/>
           </p:cNvSpPr>
@@ -1186,7 +1124,7 @@
           <a:p>
             <a:fld id="{41FB2227-03CE-E245-9493-775E002035A1}" type="datetimeFigureOut">
               <a:rPr lang="en-US" smtClean="0"/>
-              <a:t>4/15/25</a:t>
+              <a:t>4/21/25</a:t>
             </a:fld>
             <a:endParaRPr lang="en-US"/>
           </a:p>
@@ -1194,13 +1132,7 @@
       </p:sp>
       <p:sp>
         <p:nvSpPr>
-          <p:cNvPr id="5" name="Footer Placeholder 4">
-            <a:extLst>
-              <a:ext uri="{FF2B5EF4-FFF2-40B4-BE49-F238E27FC236}">
-                <a16:creationId xmlns:a16="http://schemas.microsoft.com/office/drawing/2014/main" id="{1C310FBC-C67B-7C6E-6F2D-F40D67DA87E3}"/>
-              </a:ext>
-            </a:extLst>
-          </p:cNvPr>
+          <p:cNvPr id="5" name="Footer Placeholder 4"/>
           <p:cNvSpPr>
             <a:spLocks noGrp="1"/>
           </p:cNvSpPr>
@@ -1219,13 +1151,7 @@
       </p:sp>
       <p:sp>
         <p:nvSpPr>
-          <p:cNvPr id="6" name="Slide Number Placeholder 5">
-            <a:extLst>
-              <a:ext uri="{FF2B5EF4-FFF2-40B4-BE49-F238E27FC236}">
-                <a16:creationId xmlns:a16="http://schemas.microsoft.com/office/drawing/2014/main" id="{1967FD47-474B-5F5E-4DC9-7175EFA56591}"/>
-              </a:ext>
-            </a:extLst>
-          </p:cNvPr>
+          <p:cNvPr id="6" name="Slide Number Placeholder 5"/>
           <p:cNvSpPr>
             <a:spLocks noGrp="1"/>
           </p:cNvSpPr>
@@ -1249,7 +1175,7 @@
     </p:spTree>
     <p:extLst>
       <p:ext uri="{BB962C8B-B14F-4D97-AF65-F5344CB8AC3E}">
-        <p14:creationId xmlns:p14="http://schemas.microsoft.com/office/powerpoint/2010/main" val="4115190560"/>
+        <p14:creationId xmlns:p14="http://schemas.microsoft.com/office/powerpoint/2010/main" val="3095114634"/>
       </p:ext>
     </p:extLst>
   </p:cSld>
@@ -1278,13 +1204,7 @@
       </p:grpSpPr>
       <p:sp>
         <p:nvSpPr>
-          <p:cNvPr id="2" name="Title 1">
-            <a:extLst>
-              <a:ext uri="{FF2B5EF4-FFF2-40B4-BE49-F238E27FC236}">
-                <a16:creationId xmlns:a16="http://schemas.microsoft.com/office/drawing/2014/main" id="{02A21CF5-684F-F0DC-3F83-1DA9149E0BB3}"/>
-              </a:ext>
-            </a:extLst>
-          </p:cNvPr>
+          <p:cNvPr id="2" name="Title 1"/>
           <p:cNvSpPr>
             <a:spLocks noGrp="1"/>
           </p:cNvSpPr>
@@ -1301,18 +1221,13 @@
               <a:rPr lang="en-US"/>
               <a:t>Click to edit Master title style</a:t>
             </a:r>
-          </a:p>
-        </p:txBody>
-      </p:sp>
-      <p:sp>
-        <p:nvSpPr>
-          <p:cNvPr id="3" name="Content Placeholder 2">
-            <a:extLst>
-              <a:ext uri="{FF2B5EF4-FFF2-40B4-BE49-F238E27FC236}">
-                <a16:creationId xmlns:a16="http://schemas.microsoft.com/office/drawing/2014/main" id="{F191A4AE-F18B-D18E-9A16-995BA85E33B0}"/>
-              </a:ext>
-            </a:extLst>
-          </p:cNvPr>
+            <a:endParaRPr lang="en-US" dirty="0"/>
+          </a:p>
+        </p:txBody>
+      </p:sp>
+      <p:sp>
+        <p:nvSpPr>
+          <p:cNvPr id="3" name="Content Placeholder 2"/>
           <p:cNvSpPr>
             <a:spLocks noGrp="1"/>
           </p:cNvSpPr>
@@ -1358,18 +1273,13 @@
               <a:rPr lang="en-US"/>
               <a:t>Fifth level</a:t>
             </a:r>
-          </a:p>
-        </p:txBody>
-      </p:sp>
-      <p:sp>
-        <p:nvSpPr>
-          <p:cNvPr id="4" name="Date Placeholder 3">
-            <a:extLst>
-              <a:ext uri="{FF2B5EF4-FFF2-40B4-BE49-F238E27FC236}">
-                <a16:creationId xmlns:a16="http://schemas.microsoft.com/office/drawing/2014/main" id="{30AC1085-4249-DE0F-7517-F4AB3C507C48}"/>
-              </a:ext>
-            </a:extLst>
-          </p:cNvPr>
+            <a:endParaRPr lang="en-US" dirty="0"/>
+          </a:p>
+        </p:txBody>
+      </p:sp>
+      <p:sp>
+        <p:nvSpPr>
+          <p:cNvPr id="4" name="Date Placeholder 3"/>
           <p:cNvSpPr>
             <a:spLocks noGrp="1"/>
           </p:cNvSpPr>
@@ -1384,7 +1294,7 @@
           <a:p>
             <a:fld id="{41FB2227-03CE-E245-9493-775E002035A1}" type="datetimeFigureOut">
               <a:rPr lang="en-US" smtClean="0"/>
-              <a:t>4/15/25</a:t>
+              <a:t>4/21/25</a:t>
             </a:fld>
             <a:endParaRPr lang="en-US"/>
           </a:p>
@@ -1392,13 +1302,7 @@
       </p:sp>
       <p:sp>
         <p:nvSpPr>
-          <p:cNvPr id="5" name="Footer Placeholder 4">
-            <a:extLst>
-              <a:ext uri="{FF2B5EF4-FFF2-40B4-BE49-F238E27FC236}">
-                <a16:creationId xmlns:a16="http://schemas.microsoft.com/office/drawing/2014/main" id="{E8108A55-D6A9-8881-141E-A2A1A0075602}"/>
-              </a:ext>
-            </a:extLst>
-          </p:cNvPr>
+          <p:cNvPr id="5" name="Footer Placeholder 4"/>
           <p:cNvSpPr>
             <a:spLocks noGrp="1"/>
           </p:cNvSpPr>
@@ -1417,13 +1321,7 @@
       </p:sp>
       <p:sp>
         <p:nvSpPr>
-          <p:cNvPr id="6" name="Slide Number Placeholder 5">
-            <a:extLst>
-              <a:ext uri="{FF2B5EF4-FFF2-40B4-BE49-F238E27FC236}">
-                <a16:creationId xmlns:a16="http://schemas.microsoft.com/office/drawing/2014/main" id="{69F79763-FC7B-CD79-CD6C-8A641922E5E0}"/>
-              </a:ext>
-            </a:extLst>
-          </p:cNvPr>
+          <p:cNvPr id="6" name="Slide Number Placeholder 5"/>
           <p:cNvSpPr>
             <a:spLocks noGrp="1"/>
           </p:cNvSpPr>
@@ -1447,7 +1345,7 @@
     </p:spTree>
     <p:extLst>
       <p:ext uri="{BB962C8B-B14F-4D97-AF65-F5344CB8AC3E}">
-        <p14:creationId xmlns:p14="http://schemas.microsoft.com/office/powerpoint/2010/main" val="582446487"/>
+        <p14:creationId xmlns:p14="http://schemas.microsoft.com/office/powerpoint/2010/main" val="1150224164"/>
       </p:ext>
     </p:extLst>
   </p:cSld>
@@ -1476,13 +1374,7 @@
       </p:grpSpPr>
       <p:sp>
         <p:nvSpPr>
-          <p:cNvPr id="2" name="Title 1">
-            <a:extLst>
-              <a:ext uri="{FF2B5EF4-FFF2-40B4-BE49-F238E27FC236}">
-                <a16:creationId xmlns:a16="http://schemas.microsoft.com/office/drawing/2014/main" id="{A40101B5-A2D9-7577-0A67-4E0E94733B77}"/>
-              </a:ext>
-            </a:extLst>
-          </p:cNvPr>
+          <p:cNvPr id="2" name="Title 1"/>
           <p:cNvSpPr>
             <a:spLocks noGrp="1"/>
           </p:cNvSpPr>
@@ -1492,15 +1384,15 @@
         </p:nvSpPr>
         <p:spPr>
           <a:xfrm>
-            <a:off x="831850" y="1709738"/>
-            <a:ext cx="10515600" cy="2852737"/>
+            <a:off x="831851" y="2279653"/>
+            <a:ext cx="10515600" cy="3803649"/>
           </a:xfrm>
         </p:spPr>
         <p:txBody>
           <a:bodyPr anchor="b"/>
           <a:lstStyle>
             <a:lvl1pPr>
-              <a:defRPr sz="6000"/>
+              <a:defRPr sz="8000"/>
             </a:lvl1pPr>
           </a:lstStyle>
           <a:p>
@@ -1508,18 +1400,13 @@
               <a:rPr lang="en-US"/>
               <a:t>Click to edit Master title style</a:t>
             </a:r>
-          </a:p>
-        </p:txBody>
-      </p:sp>
-      <p:sp>
-        <p:nvSpPr>
-          <p:cNvPr id="3" name="Text Placeholder 2">
-            <a:extLst>
-              <a:ext uri="{FF2B5EF4-FFF2-40B4-BE49-F238E27FC236}">
-                <a16:creationId xmlns:a16="http://schemas.microsoft.com/office/drawing/2014/main" id="{8D1E1C5E-4407-CE5E-9585-6CA99696CEC7}"/>
-              </a:ext>
-            </a:extLst>
-          </p:cNvPr>
+            <a:endParaRPr lang="en-US" dirty="0"/>
+          </a:p>
+        </p:txBody>
+      </p:sp>
+      <p:sp>
+        <p:nvSpPr>
+          <p:cNvPr id="3" name="Text Placeholder 2"/>
           <p:cNvSpPr>
             <a:spLocks noGrp="1"/>
           </p:cNvSpPr>
@@ -1529,14 +1416,34 @@
         </p:nvSpPr>
         <p:spPr>
           <a:xfrm>
-            <a:off x="831850" y="4589463"/>
-            <a:ext cx="10515600" cy="1500187"/>
+            <a:off x="831851" y="6119286"/>
+            <a:ext cx="10515600" cy="2000249"/>
           </a:xfrm>
         </p:spPr>
         <p:txBody>
           <a:bodyPr/>
           <a:lstStyle>
             <a:lvl1pPr marL="0" indent="0">
+              <a:buNone/>
+              <a:defRPr sz="3200">
+                <a:solidFill>
+                  <a:schemeClr val="tx1">
+                    <a:tint val="82000"/>
+                  </a:schemeClr>
+                </a:solidFill>
+              </a:defRPr>
+            </a:lvl1pPr>
+            <a:lvl2pPr marL="609585" indent="0">
+              <a:buNone/>
+              <a:defRPr sz="2667">
+                <a:solidFill>
+                  <a:schemeClr val="tx1">
+                    <a:tint val="82000"/>
+                  </a:schemeClr>
+                </a:solidFill>
+              </a:defRPr>
+            </a:lvl2pPr>
+            <a:lvl3pPr marL="1219170" indent="0">
               <a:buNone/>
               <a:defRPr sz="2400">
                 <a:solidFill>
@@ -1545,30 +1452,10 @@
                   </a:schemeClr>
                 </a:solidFill>
               </a:defRPr>
-            </a:lvl1pPr>
-            <a:lvl2pPr marL="457200" indent="0">
+            </a:lvl3pPr>
+            <a:lvl4pPr marL="1828754" indent="0">
               <a:buNone/>
-              <a:defRPr sz="2000">
-                <a:solidFill>
-                  <a:schemeClr val="tx1">
-                    <a:tint val="82000"/>
-                  </a:schemeClr>
-                </a:solidFill>
-              </a:defRPr>
-            </a:lvl2pPr>
-            <a:lvl3pPr marL="914400" indent="0">
-              <a:buNone/>
-              <a:defRPr sz="1800">
-                <a:solidFill>
-                  <a:schemeClr val="tx1">
-                    <a:tint val="82000"/>
-                  </a:schemeClr>
-                </a:solidFill>
-              </a:defRPr>
-            </a:lvl3pPr>
-            <a:lvl4pPr marL="1371600" indent="0">
-              <a:buNone/>
-              <a:defRPr sz="1600">
+              <a:defRPr sz="2133">
                 <a:solidFill>
                   <a:schemeClr val="tx1">
                     <a:tint val="82000"/>
@@ -1576,9 +1463,9 @@
                 </a:solidFill>
               </a:defRPr>
             </a:lvl4pPr>
-            <a:lvl5pPr marL="1828800" indent="0">
+            <a:lvl5pPr marL="2438339" indent="0">
               <a:buNone/>
-              <a:defRPr sz="1600">
+              <a:defRPr sz="2133">
                 <a:solidFill>
                   <a:schemeClr val="tx1">
                     <a:tint val="82000"/>
@@ -1586,9 +1473,9 @@
                 </a:solidFill>
               </a:defRPr>
             </a:lvl5pPr>
-            <a:lvl6pPr marL="2286000" indent="0">
+            <a:lvl6pPr marL="3047924" indent="0">
               <a:buNone/>
-              <a:defRPr sz="1600">
+              <a:defRPr sz="2133">
                 <a:solidFill>
                   <a:schemeClr val="tx1">
                     <a:tint val="82000"/>
@@ -1596,9 +1483,9 @@
                 </a:solidFill>
               </a:defRPr>
             </a:lvl6pPr>
-            <a:lvl7pPr marL="2743200" indent="0">
+            <a:lvl7pPr marL="3657509" indent="0">
               <a:buNone/>
-              <a:defRPr sz="1600">
+              <a:defRPr sz="2133">
                 <a:solidFill>
                   <a:schemeClr val="tx1">
                     <a:tint val="82000"/>
@@ -1606,9 +1493,9 @@
                 </a:solidFill>
               </a:defRPr>
             </a:lvl7pPr>
-            <a:lvl8pPr marL="3200400" indent="0">
+            <a:lvl8pPr marL="4267093" indent="0">
               <a:buNone/>
-              <a:defRPr sz="1600">
+              <a:defRPr sz="2133">
                 <a:solidFill>
                   <a:schemeClr val="tx1">
                     <a:tint val="82000"/>
@@ -1616,9 +1503,9 @@
                 </a:solidFill>
               </a:defRPr>
             </a:lvl8pPr>
-            <a:lvl9pPr marL="3657600" indent="0">
+            <a:lvl9pPr marL="4876678" indent="0">
               <a:buNone/>
-              <a:defRPr sz="1600">
+              <a:defRPr sz="2133">
                 <a:solidFill>
                   <a:schemeClr val="tx1">
                     <a:tint val="82000"/>
@@ -1638,13 +1525,7 @@
       </p:sp>
       <p:sp>
         <p:nvSpPr>
-          <p:cNvPr id="4" name="Date Placeholder 3">
-            <a:extLst>
-              <a:ext uri="{FF2B5EF4-FFF2-40B4-BE49-F238E27FC236}">
-                <a16:creationId xmlns:a16="http://schemas.microsoft.com/office/drawing/2014/main" id="{1E477887-ACF5-A599-0D8C-B3CC87A7647B}"/>
-              </a:ext>
-            </a:extLst>
-          </p:cNvPr>
+          <p:cNvPr id="4" name="Date Placeholder 3"/>
           <p:cNvSpPr>
             <a:spLocks noGrp="1"/>
           </p:cNvSpPr>
@@ -1659,7 +1540,7 @@
           <a:p>
             <a:fld id="{41FB2227-03CE-E245-9493-775E002035A1}" type="datetimeFigureOut">
               <a:rPr lang="en-US" smtClean="0"/>
-              <a:t>4/15/25</a:t>
+              <a:t>4/21/25</a:t>
             </a:fld>
             <a:endParaRPr lang="en-US"/>
           </a:p>
@@ -1667,13 +1548,7 @@
       </p:sp>
       <p:sp>
         <p:nvSpPr>
-          <p:cNvPr id="5" name="Footer Placeholder 4">
-            <a:extLst>
-              <a:ext uri="{FF2B5EF4-FFF2-40B4-BE49-F238E27FC236}">
-                <a16:creationId xmlns:a16="http://schemas.microsoft.com/office/drawing/2014/main" id="{21F85104-A937-268F-9EC7-4584E403DC12}"/>
-              </a:ext>
-            </a:extLst>
-          </p:cNvPr>
+          <p:cNvPr id="5" name="Footer Placeholder 4"/>
           <p:cNvSpPr>
             <a:spLocks noGrp="1"/>
           </p:cNvSpPr>
@@ -1692,13 +1567,7 @@
       </p:sp>
       <p:sp>
         <p:nvSpPr>
-          <p:cNvPr id="6" name="Slide Number Placeholder 5">
-            <a:extLst>
-              <a:ext uri="{FF2B5EF4-FFF2-40B4-BE49-F238E27FC236}">
-                <a16:creationId xmlns:a16="http://schemas.microsoft.com/office/drawing/2014/main" id="{9DC7F4FC-1985-5AB6-BD62-20621C4252F9}"/>
-              </a:ext>
-            </a:extLst>
-          </p:cNvPr>
+          <p:cNvPr id="6" name="Slide Number Placeholder 5"/>
           <p:cNvSpPr>
             <a:spLocks noGrp="1"/>
           </p:cNvSpPr>
@@ -1722,7 +1591,7 @@
     </p:spTree>
     <p:extLst>
       <p:ext uri="{BB962C8B-B14F-4D97-AF65-F5344CB8AC3E}">
-        <p14:creationId xmlns:p14="http://schemas.microsoft.com/office/powerpoint/2010/main" val="1692266447"/>
+        <p14:creationId xmlns:p14="http://schemas.microsoft.com/office/powerpoint/2010/main" val="925879884"/>
       </p:ext>
     </p:extLst>
   </p:cSld>
@@ -1751,13 +1620,7 @@
       </p:grpSpPr>
       <p:sp>
         <p:nvSpPr>
-          <p:cNvPr id="2" name="Title 1">
-            <a:extLst>
-              <a:ext uri="{FF2B5EF4-FFF2-40B4-BE49-F238E27FC236}">
-                <a16:creationId xmlns:a16="http://schemas.microsoft.com/office/drawing/2014/main" id="{54695EF1-5D3C-35E2-7BC5-017A7B00456F}"/>
-              </a:ext>
-            </a:extLst>
-          </p:cNvPr>
+          <p:cNvPr id="2" name="Title 1"/>
           <p:cNvSpPr>
             <a:spLocks noGrp="1"/>
           </p:cNvSpPr>
@@ -1774,18 +1637,13 @@
               <a:rPr lang="en-US"/>
               <a:t>Click to edit Master title style</a:t>
             </a:r>
-          </a:p>
-        </p:txBody>
-      </p:sp>
-      <p:sp>
-        <p:nvSpPr>
-          <p:cNvPr id="3" name="Content Placeholder 2">
-            <a:extLst>
-              <a:ext uri="{FF2B5EF4-FFF2-40B4-BE49-F238E27FC236}">
-                <a16:creationId xmlns:a16="http://schemas.microsoft.com/office/drawing/2014/main" id="{7F60B70F-151D-171A-B814-2A9FBE08975F}"/>
-              </a:ext>
-            </a:extLst>
-          </p:cNvPr>
+            <a:endParaRPr lang="en-US" dirty="0"/>
+          </a:p>
+        </p:txBody>
+      </p:sp>
+      <p:sp>
+        <p:nvSpPr>
+          <p:cNvPr id="3" name="Content Placeholder 2"/>
           <p:cNvSpPr>
             <a:spLocks noGrp="1"/>
           </p:cNvSpPr>
@@ -1795,8 +1653,8 @@
         </p:nvSpPr>
         <p:spPr>
           <a:xfrm>
-            <a:off x="838200" y="1825625"/>
-            <a:ext cx="5181600" cy="4351338"/>
+            <a:off x="838200" y="2434167"/>
+            <a:ext cx="5181600" cy="5801784"/>
           </a:xfrm>
         </p:spPr>
         <p:txBody>
@@ -1836,18 +1694,13 @@
               <a:rPr lang="en-US"/>
               <a:t>Fifth level</a:t>
             </a:r>
-          </a:p>
-        </p:txBody>
-      </p:sp>
-      <p:sp>
-        <p:nvSpPr>
-          <p:cNvPr id="4" name="Content Placeholder 3">
-            <a:extLst>
-              <a:ext uri="{FF2B5EF4-FFF2-40B4-BE49-F238E27FC236}">
-                <a16:creationId xmlns:a16="http://schemas.microsoft.com/office/drawing/2014/main" id="{C83BD8A7-4D8B-84E7-466F-C5D8DFE6B5D2}"/>
-              </a:ext>
-            </a:extLst>
-          </p:cNvPr>
+            <a:endParaRPr lang="en-US" dirty="0"/>
+          </a:p>
+        </p:txBody>
+      </p:sp>
+      <p:sp>
+        <p:nvSpPr>
+          <p:cNvPr id="4" name="Content Placeholder 3"/>
           <p:cNvSpPr>
             <a:spLocks noGrp="1"/>
           </p:cNvSpPr>
@@ -1857,8 +1710,8 @@
         </p:nvSpPr>
         <p:spPr>
           <a:xfrm>
-            <a:off x="6172200" y="1825625"/>
-            <a:ext cx="5181600" cy="4351338"/>
+            <a:off x="6172200" y="2434167"/>
+            <a:ext cx="5181600" cy="5801784"/>
           </a:xfrm>
         </p:spPr>
         <p:txBody>
@@ -1898,18 +1751,13 @@
               <a:rPr lang="en-US"/>
               <a:t>Fifth level</a:t>
             </a:r>
-          </a:p>
-        </p:txBody>
-      </p:sp>
-      <p:sp>
-        <p:nvSpPr>
-          <p:cNvPr id="5" name="Date Placeholder 4">
-            <a:extLst>
-              <a:ext uri="{FF2B5EF4-FFF2-40B4-BE49-F238E27FC236}">
-                <a16:creationId xmlns:a16="http://schemas.microsoft.com/office/drawing/2014/main" id="{99FB05AB-FDB1-5CFE-05F9-DD6E9AC7EBED}"/>
-              </a:ext>
-            </a:extLst>
-          </p:cNvPr>
+            <a:endParaRPr lang="en-US" dirty="0"/>
+          </a:p>
+        </p:txBody>
+      </p:sp>
+      <p:sp>
+        <p:nvSpPr>
+          <p:cNvPr id="5" name="Date Placeholder 4"/>
           <p:cNvSpPr>
             <a:spLocks noGrp="1"/>
           </p:cNvSpPr>
@@ -1924,7 +1772,7 @@
           <a:p>
             <a:fld id="{41FB2227-03CE-E245-9493-775E002035A1}" type="datetimeFigureOut">
               <a:rPr lang="en-US" smtClean="0"/>
-              <a:t>4/15/25</a:t>
+              <a:t>4/21/25</a:t>
             </a:fld>
             <a:endParaRPr lang="en-US"/>
           </a:p>
@@ -1932,13 +1780,7 @@
       </p:sp>
       <p:sp>
         <p:nvSpPr>
-          <p:cNvPr id="6" name="Footer Placeholder 5">
-            <a:extLst>
-              <a:ext uri="{FF2B5EF4-FFF2-40B4-BE49-F238E27FC236}">
-                <a16:creationId xmlns:a16="http://schemas.microsoft.com/office/drawing/2014/main" id="{16B22E4E-ED87-614F-AC41-7D6CB291125D}"/>
-              </a:ext>
-            </a:extLst>
-          </p:cNvPr>
+          <p:cNvPr id="6" name="Footer Placeholder 5"/>
           <p:cNvSpPr>
             <a:spLocks noGrp="1"/>
           </p:cNvSpPr>
@@ -1957,13 +1799,7 @@
       </p:sp>
       <p:sp>
         <p:nvSpPr>
-          <p:cNvPr id="7" name="Slide Number Placeholder 6">
-            <a:extLst>
-              <a:ext uri="{FF2B5EF4-FFF2-40B4-BE49-F238E27FC236}">
-                <a16:creationId xmlns:a16="http://schemas.microsoft.com/office/drawing/2014/main" id="{6824BB66-517E-D4E7-FAD7-0BF64A828ED2}"/>
-              </a:ext>
-            </a:extLst>
-          </p:cNvPr>
+          <p:cNvPr id="7" name="Slide Number Placeholder 6"/>
           <p:cNvSpPr>
             <a:spLocks noGrp="1"/>
           </p:cNvSpPr>
@@ -1987,7 +1823,7 @@
     </p:spTree>
     <p:extLst>
       <p:ext uri="{BB962C8B-B14F-4D97-AF65-F5344CB8AC3E}">
-        <p14:creationId xmlns:p14="http://schemas.microsoft.com/office/powerpoint/2010/main" val="60453095"/>
+        <p14:creationId xmlns:p14="http://schemas.microsoft.com/office/powerpoint/2010/main" val="1727719448"/>
       </p:ext>
     </p:extLst>
   </p:cSld>
@@ -2016,13 +1852,7 @@
       </p:grpSpPr>
       <p:sp>
         <p:nvSpPr>
-          <p:cNvPr id="2" name="Title 1">
-            <a:extLst>
-              <a:ext uri="{FF2B5EF4-FFF2-40B4-BE49-F238E27FC236}">
-                <a16:creationId xmlns:a16="http://schemas.microsoft.com/office/drawing/2014/main" id="{3ED3846E-06FE-AAD5-BC14-D6CFA09D8276}"/>
-              </a:ext>
-            </a:extLst>
-          </p:cNvPr>
+          <p:cNvPr id="2" name="Title 1"/>
           <p:cNvSpPr>
             <a:spLocks noGrp="1"/>
           </p:cNvSpPr>
@@ -2032,8 +1862,8 @@
         </p:nvSpPr>
         <p:spPr>
           <a:xfrm>
-            <a:off x="839788" y="365125"/>
-            <a:ext cx="10515600" cy="1325563"/>
+            <a:off x="839788" y="486835"/>
+            <a:ext cx="10515600" cy="1767417"/>
           </a:xfrm>
         </p:spPr>
         <p:txBody>
@@ -2044,18 +1874,13 @@
               <a:rPr lang="en-US"/>
               <a:t>Click to edit Master title style</a:t>
             </a:r>
-          </a:p>
-        </p:txBody>
-      </p:sp>
-      <p:sp>
-        <p:nvSpPr>
-          <p:cNvPr id="3" name="Text Placeholder 2">
-            <a:extLst>
-              <a:ext uri="{FF2B5EF4-FFF2-40B4-BE49-F238E27FC236}">
-                <a16:creationId xmlns:a16="http://schemas.microsoft.com/office/drawing/2014/main" id="{91617FF9-2265-19AB-0D24-439FB4BAEEC8}"/>
-              </a:ext>
-            </a:extLst>
-          </p:cNvPr>
+            <a:endParaRPr lang="en-US" dirty="0"/>
+          </a:p>
+        </p:txBody>
+      </p:sp>
+      <p:sp>
+        <p:nvSpPr>
+          <p:cNvPr id="3" name="Text Placeholder 2"/>
           <p:cNvSpPr>
             <a:spLocks noGrp="1"/>
           </p:cNvSpPr>
@@ -2065,8 +1890,8 @@
         </p:nvSpPr>
         <p:spPr>
           <a:xfrm>
-            <a:off x="839788" y="1681163"/>
-            <a:ext cx="5157787" cy="823912"/>
+            <a:off x="839789" y="2241551"/>
+            <a:ext cx="5157787" cy="1098549"/>
           </a:xfrm>
         </p:spPr>
         <p:txBody>
@@ -2074,39 +1899,39 @@
           <a:lstStyle>
             <a:lvl1pPr marL="0" indent="0">
               <a:buNone/>
+              <a:defRPr sz="3200" b="1"/>
+            </a:lvl1pPr>
+            <a:lvl2pPr marL="609585" indent="0">
+              <a:buNone/>
+              <a:defRPr sz="2667" b="1"/>
+            </a:lvl2pPr>
+            <a:lvl3pPr marL="1219170" indent="0">
+              <a:buNone/>
               <a:defRPr sz="2400" b="1"/>
-            </a:lvl1pPr>
-            <a:lvl2pPr marL="457200" indent="0">
+            </a:lvl3pPr>
+            <a:lvl4pPr marL="1828754" indent="0">
               <a:buNone/>
-              <a:defRPr sz="2000" b="1"/>
-            </a:lvl2pPr>
-            <a:lvl3pPr marL="914400" indent="0">
+              <a:defRPr sz="2133" b="1"/>
+            </a:lvl4pPr>
+            <a:lvl5pPr marL="2438339" indent="0">
               <a:buNone/>
-              <a:defRPr sz="1800" b="1"/>
-            </a:lvl3pPr>
-            <a:lvl4pPr marL="1371600" indent="0">
+              <a:defRPr sz="2133" b="1"/>
+            </a:lvl5pPr>
+            <a:lvl6pPr marL="3047924" indent="0">
               <a:buNone/>
-              <a:defRPr sz="1600" b="1"/>
-            </a:lvl4pPr>
-            <a:lvl5pPr marL="1828800" indent="0">
+              <a:defRPr sz="2133" b="1"/>
+            </a:lvl6pPr>
+            <a:lvl7pPr marL="3657509" indent="0">
               <a:buNone/>
-              <a:defRPr sz="1600" b="1"/>
-            </a:lvl5pPr>
-            <a:lvl6pPr marL="2286000" indent="0">
+              <a:defRPr sz="2133" b="1"/>
+            </a:lvl7pPr>
+            <a:lvl8pPr marL="4267093" indent="0">
               <a:buNone/>
-              <a:defRPr sz="1600" b="1"/>
-            </a:lvl6pPr>
-            <a:lvl7pPr marL="2743200" indent="0">
+              <a:defRPr sz="2133" b="1"/>
+            </a:lvl8pPr>
+            <a:lvl9pPr marL="4876678" indent="0">
               <a:buNone/>
-              <a:defRPr sz="1600" b="1"/>
-            </a:lvl7pPr>
-            <a:lvl8pPr marL="3200400" indent="0">
-              <a:buNone/>
-              <a:defRPr sz="1600" b="1"/>
-            </a:lvl8pPr>
-            <a:lvl9pPr marL="3657600" indent="0">
-              <a:buNone/>
-              <a:defRPr sz="1600" b="1"/>
+              <a:defRPr sz="2133" b="1"/>
             </a:lvl9pPr>
           </a:lstStyle>
           <a:p>
@@ -2120,13 +1945,7 @@
       </p:sp>
       <p:sp>
         <p:nvSpPr>
-          <p:cNvPr id="4" name="Content Placeholder 3">
-            <a:extLst>
-              <a:ext uri="{FF2B5EF4-FFF2-40B4-BE49-F238E27FC236}">
-                <a16:creationId xmlns:a16="http://schemas.microsoft.com/office/drawing/2014/main" id="{71CB890C-E85C-045C-AF57-5A6EE26D239E}"/>
-              </a:ext>
-            </a:extLst>
-          </p:cNvPr>
+          <p:cNvPr id="4" name="Content Placeholder 3"/>
           <p:cNvSpPr>
             <a:spLocks noGrp="1"/>
           </p:cNvSpPr>
@@ -2136,8 +1955,8 @@
         </p:nvSpPr>
         <p:spPr>
           <a:xfrm>
-            <a:off x="839788" y="2505075"/>
-            <a:ext cx="5157787" cy="3684588"/>
+            <a:off x="839789" y="3340100"/>
+            <a:ext cx="5157787" cy="4912784"/>
           </a:xfrm>
         </p:spPr>
         <p:txBody>
@@ -2177,18 +1996,13 @@
               <a:rPr lang="en-US"/>
               <a:t>Fifth level</a:t>
             </a:r>
-          </a:p>
-        </p:txBody>
-      </p:sp>
-      <p:sp>
-        <p:nvSpPr>
-          <p:cNvPr id="5" name="Text Placeholder 4">
-            <a:extLst>
-              <a:ext uri="{FF2B5EF4-FFF2-40B4-BE49-F238E27FC236}">
-                <a16:creationId xmlns:a16="http://schemas.microsoft.com/office/drawing/2014/main" id="{B1421C0F-02DF-DCDE-A933-0CA1099B15A4}"/>
-              </a:ext>
-            </a:extLst>
-          </p:cNvPr>
+            <a:endParaRPr lang="en-US" dirty="0"/>
+          </a:p>
+        </p:txBody>
+      </p:sp>
+      <p:sp>
+        <p:nvSpPr>
+          <p:cNvPr id="5" name="Text Placeholder 4"/>
           <p:cNvSpPr>
             <a:spLocks noGrp="1"/>
           </p:cNvSpPr>
@@ -2198,8 +2012,8 @@
         </p:nvSpPr>
         <p:spPr>
           <a:xfrm>
-            <a:off x="6172200" y="1681163"/>
-            <a:ext cx="5183188" cy="823912"/>
+            <a:off x="6172201" y="2241551"/>
+            <a:ext cx="5183188" cy="1098549"/>
           </a:xfrm>
         </p:spPr>
         <p:txBody>
@@ -2207,39 +2021,39 @@
           <a:lstStyle>
             <a:lvl1pPr marL="0" indent="0">
               <a:buNone/>
+              <a:defRPr sz="3200" b="1"/>
+            </a:lvl1pPr>
+            <a:lvl2pPr marL="609585" indent="0">
+              <a:buNone/>
+              <a:defRPr sz="2667" b="1"/>
+            </a:lvl2pPr>
+            <a:lvl3pPr marL="1219170" indent="0">
+              <a:buNone/>
               <a:defRPr sz="2400" b="1"/>
-            </a:lvl1pPr>
-            <a:lvl2pPr marL="457200" indent="0">
+            </a:lvl3pPr>
+            <a:lvl4pPr marL="1828754" indent="0">
               <a:buNone/>
-              <a:defRPr sz="2000" b="1"/>
-            </a:lvl2pPr>
-            <a:lvl3pPr marL="914400" indent="0">
+              <a:defRPr sz="2133" b="1"/>
+            </a:lvl4pPr>
+            <a:lvl5pPr marL="2438339" indent="0">
               <a:buNone/>
-              <a:defRPr sz="1800" b="1"/>
-            </a:lvl3pPr>
-            <a:lvl4pPr marL="1371600" indent="0">
+              <a:defRPr sz="2133" b="1"/>
+            </a:lvl5pPr>
+            <a:lvl6pPr marL="3047924" indent="0">
               <a:buNone/>
-              <a:defRPr sz="1600" b="1"/>
-            </a:lvl4pPr>
-            <a:lvl5pPr marL="1828800" indent="0">
+              <a:defRPr sz="2133" b="1"/>
+            </a:lvl6pPr>
+            <a:lvl7pPr marL="3657509" indent="0">
               <a:buNone/>
-              <a:defRPr sz="1600" b="1"/>
-            </a:lvl5pPr>
-            <a:lvl6pPr marL="2286000" indent="0">
+              <a:defRPr sz="2133" b="1"/>
+            </a:lvl7pPr>
+            <a:lvl8pPr marL="4267093" indent="0">
               <a:buNone/>
-              <a:defRPr sz="1600" b="1"/>
-            </a:lvl6pPr>
-            <a:lvl7pPr marL="2743200" indent="0">
+              <a:defRPr sz="2133" b="1"/>
+            </a:lvl8pPr>
+            <a:lvl9pPr marL="4876678" indent="0">
               <a:buNone/>
-              <a:defRPr sz="1600" b="1"/>
-            </a:lvl7pPr>
-            <a:lvl8pPr marL="3200400" indent="0">
-              <a:buNone/>
-              <a:defRPr sz="1600" b="1"/>
-            </a:lvl8pPr>
-            <a:lvl9pPr marL="3657600" indent="0">
-              <a:buNone/>
-              <a:defRPr sz="1600" b="1"/>
+              <a:defRPr sz="2133" b="1"/>
             </a:lvl9pPr>
           </a:lstStyle>
           <a:p>
@@ -2253,13 +2067,7 @@
       </p:sp>
       <p:sp>
         <p:nvSpPr>
-          <p:cNvPr id="6" name="Content Placeholder 5">
-            <a:extLst>
-              <a:ext uri="{FF2B5EF4-FFF2-40B4-BE49-F238E27FC236}">
-                <a16:creationId xmlns:a16="http://schemas.microsoft.com/office/drawing/2014/main" id="{06F50FEA-8867-B007-6524-C65ACA181E7B}"/>
-              </a:ext>
-            </a:extLst>
-          </p:cNvPr>
+          <p:cNvPr id="6" name="Content Placeholder 5"/>
           <p:cNvSpPr>
             <a:spLocks noGrp="1"/>
           </p:cNvSpPr>
@@ -2269,8 +2077,8 @@
         </p:nvSpPr>
         <p:spPr>
           <a:xfrm>
-            <a:off x="6172200" y="2505075"/>
-            <a:ext cx="5183188" cy="3684588"/>
+            <a:off x="6172201" y="3340100"/>
+            <a:ext cx="5183188" cy="4912784"/>
           </a:xfrm>
         </p:spPr>
         <p:txBody>
@@ -2310,18 +2118,13 @@
               <a:rPr lang="en-US"/>
               <a:t>Fifth level</a:t>
             </a:r>
-          </a:p>
-        </p:txBody>
-      </p:sp>
-      <p:sp>
-        <p:nvSpPr>
-          <p:cNvPr id="7" name="Date Placeholder 6">
-            <a:extLst>
-              <a:ext uri="{FF2B5EF4-FFF2-40B4-BE49-F238E27FC236}">
-                <a16:creationId xmlns:a16="http://schemas.microsoft.com/office/drawing/2014/main" id="{207B7B1B-06C7-7EBB-DCB6-EBB40D79BEF9}"/>
-              </a:ext>
-            </a:extLst>
-          </p:cNvPr>
+            <a:endParaRPr lang="en-US" dirty="0"/>
+          </a:p>
+        </p:txBody>
+      </p:sp>
+      <p:sp>
+        <p:nvSpPr>
+          <p:cNvPr id="7" name="Date Placeholder 6"/>
           <p:cNvSpPr>
             <a:spLocks noGrp="1"/>
           </p:cNvSpPr>
@@ -2336,7 +2139,7 @@
           <a:p>
             <a:fld id="{41FB2227-03CE-E245-9493-775E002035A1}" type="datetimeFigureOut">
               <a:rPr lang="en-US" smtClean="0"/>
-              <a:t>4/15/25</a:t>
+              <a:t>4/21/25</a:t>
             </a:fld>
             <a:endParaRPr lang="en-US"/>
           </a:p>
@@ -2344,13 +2147,7 @@
       </p:sp>
       <p:sp>
         <p:nvSpPr>
-          <p:cNvPr id="8" name="Footer Placeholder 7">
-            <a:extLst>
-              <a:ext uri="{FF2B5EF4-FFF2-40B4-BE49-F238E27FC236}">
-                <a16:creationId xmlns:a16="http://schemas.microsoft.com/office/drawing/2014/main" id="{45CBA813-098E-471E-F54E-10620CB383B9}"/>
-              </a:ext>
-            </a:extLst>
-          </p:cNvPr>
+          <p:cNvPr id="8" name="Footer Placeholder 7"/>
           <p:cNvSpPr>
             <a:spLocks noGrp="1"/>
           </p:cNvSpPr>
@@ -2369,13 +2166,7 @@
       </p:sp>
       <p:sp>
         <p:nvSpPr>
-          <p:cNvPr id="9" name="Slide Number Placeholder 8">
-            <a:extLst>
-              <a:ext uri="{FF2B5EF4-FFF2-40B4-BE49-F238E27FC236}">
-                <a16:creationId xmlns:a16="http://schemas.microsoft.com/office/drawing/2014/main" id="{2DED953B-E5F2-1DCE-945C-F6C67505CC88}"/>
-              </a:ext>
-            </a:extLst>
-          </p:cNvPr>
+          <p:cNvPr id="9" name="Slide Number Placeholder 8"/>
           <p:cNvSpPr>
             <a:spLocks noGrp="1"/>
           </p:cNvSpPr>
@@ -2399,7 +2190,7 @@
     </p:spTree>
     <p:extLst>
       <p:ext uri="{BB962C8B-B14F-4D97-AF65-F5344CB8AC3E}">
-        <p14:creationId xmlns:p14="http://schemas.microsoft.com/office/powerpoint/2010/main" val="2283938462"/>
+        <p14:creationId xmlns:p14="http://schemas.microsoft.com/office/powerpoint/2010/main" val="893902675"/>
       </p:ext>
     </p:extLst>
   </p:cSld>
@@ -2428,13 +2219,7 @@
       </p:grpSpPr>
       <p:sp>
         <p:nvSpPr>
-          <p:cNvPr id="2" name="Title 1">
-            <a:extLst>
-              <a:ext uri="{FF2B5EF4-FFF2-40B4-BE49-F238E27FC236}">
-                <a16:creationId xmlns:a16="http://schemas.microsoft.com/office/drawing/2014/main" id="{9D5EBF4F-50CB-1C69-E40C-3D1B586849DC}"/>
-              </a:ext>
-            </a:extLst>
-          </p:cNvPr>
+          <p:cNvPr id="2" name="Title 1"/>
           <p:cNvSpPr>
             <a:spLocks noGrp="1"/>
           </p:cNvSpPr>
@@ -2451,18 +2236,13 @@
               <a:rPr lang="en-US"/>
               <a:t>Click to edit Master title style</a:t>
             </a:r>
-          </a:p>
-        </p:txBody>
-      </p:sp>
-      <p:sp>
-        <p:nvSpPr>
-          <p:cNvPr id="3" name="Date Placeholder 2">
-            <a:extLst>
-              <a:ext uri="{FF2B5EF4-FFF2-40B4-BE49-F238E27FC236}">
-                <a16:creationId xmlns:a16="http://schemas.microsoft.com/office/drawing/2014/main" id="{F169A8FE-D964-EA6A-A706-0481A52F5F8E}"/>
-              </a:ext>
-            </a:extLst>
-          </p:cNvPr>
+            <a:endParaRPr lang="en-US" dirty="0"/>
+          </a:p>
+        </p:txBody>
+      </p:sp>
+      <p:sp>
+        <p:nvSpPr>
+          <p:cNvPr id="3" name="Date Placeholder 2"/>
           <p:cNvSpPr>
             <a:spLocks noGrp="1"/>
           </p:cNvSpPr>
@@ -2477,7 +2257,7 @@
           <a:p>
             <a:fld id="{41FB2227-03CE-E245-9493-775E002035A1}" type="datetimeFigureOut">
               <a:rPr lang="en-US" smtClean="0"/>
-              <a:t>4/15/25</a:t>
+              <a:t>4/21/25</a:t>
             </a:fld>
             <a:endParaRPr lang="en-US"/>
           </a:p>
@@ -2485,13 +2265,7 @@
       </p:sp>
       <p:sp>
         <p:nvSpPr>
-          <p:cNvPr id="4" name="Footer Placeholder 3">
-            <a:extLst>
-              <a:ext uri="{FF2B5EF4-FFF2-40B4-BE49-F238E27FC236}">
-                <a16:creationId xmlns:a16="http://schemas.microsoft.com/office/drawing/2014/main" id="{652AF243-5ED2-3CBA-6EB5-F302F9CBFA19}"/>
-              </a:ext>
-            </a:extLst>
-          </p:cNvPr>
+          <p:cNvPr id="4" name="Footer Placeholder 3"/>
           <p:cNvSpPr>
             <a:spLocks noGrp="1"/>
           </p:cNvSpPr>
@@ -2510,13 +2284,7 @@
       </p:sp>
       <p:sp>
         <p:nvSpPr>
-          <p:cNvPr id="5" name="Slide Number Placeholder 4">
-            <a:extLst>
-              <a:ext uri="{FF2B5EF4-FFF2-40B4-BE49-F238E27FC236}">
-                <a16:creationId xmlns:a16="http://schemas.microsoft.com/office/drawing/2014/main" id="{3BE177C8-C485-5B45-3E9E-D3F765F9EF9D}"/>
-              </a:ext>
-            </a:extLst>
-          </p:cNvPr>
+          <p:cNvPr id="5" name="Slide Number Placeholder 4"/>
           <p:cNvSpPr>
             <a:spLocks noGrp="1"/>
           </p:cNvSpPr>
@@ -2540,7 +2308,7 @@
     </p:spTree>
     <p:extLst>
       <p:ext uri="{BB962C8B-B14F-4D97-AF65-F5344CB8AC3E}">
-        <p14:creationId xmlns:p14="http://schemas.microsoft.com/office/powerpoint/2010/main" val="562114211"/>
+        <p14:creationId xmlns:p14="http://schemas.microsoft.com/office/powerpoint/2010/main" val="2223806967"/>
       </p:ext>
     </p:extLst>
   </p:cSld>
@@ -2569,13 +2337,7 @@
       </p:grpSpPr>
       <p:sp>
         <p:nvSpPr>
-          <p:cNvPr id="2" name="Date Placeholder 1">
-            <a:extLst>
-              <a:ext uri="{FF2B5EF4-FFF2-40B4-BE49-F238E27FC236}">
-                <a16:creationId xmlns:a16="http://schemas.microsoft.com/office/drawing/2014/main" id="{5F2D6339-7724-2FDB-E894-F1EC2B00041A}"/>
-              </a:ext>
-            </a:extLst>
-          </p:cNvPr>
+          <p:cNvPr id="2" name="Date Placeholder 1"/>
           <p:cNvSpPr>
             <a:spLocks noGrp="1"/>
           </p:cNvSpPr>
@@ -2590,7 +2352,7 @@
           <a:p>
             <a:fld id="{41FB2227-03CE-E245-9493-775E002035A1}" type="datetimeFigureOut">
               <a:rPr lang="en-US" smtClean="0"/>
-              <a:t>4/15/25</a:t>
+              <a:t>4/21/25</a:t>
             </a:fld>
             <a:endParaRPr lang="en-US"/>
           </a:p>
@@ -2598,13 +2360,7 @@
       </p:sp>
       <p:sp>
         <p:nvSpPr>
-          <p:cNvPr id="3" name="Footer Placeholder 2">
-            <a:extLst>
-              <a:ext uri="{FF2B5EF4-FFF2-40B4-BE49-F238E27FC236}">
-                <a16:creationId xmlns:a16="http://schemas.microsoft.com/office/drawing/2014/main" id="{BC7DD919-26E1-7E2D-0ECB-BCC022293D3C}"/>
-              </a:ext>
-            </a:extLst>
-          </p:cNvPr>
+          <p:cNvPr id="3" name="Footer Placeholder 2"/>
           <p:cNvSpPr>
             <a:spLocks noGrp="1"/>
           </p:cNvSpPr>
@@ -2623,13 +2379,7 @@
       </p:sp>
       <p:sp>
         <p:nvSpPr>
-          <p:cNvPr id="4" name="Slide Number Placeholder 3">
-            <a:extLst>
-              <a:ext uri="{FF2B5EF4-FFF2-40B4-BE49-F238E27FC236}">
-                <a16:creationId xmlns:a16="http://schemas.microsoft.com/office/drawing/2014/main" id="{8D61CE1D-3B69-8BBD-FB1F-436C81AC2CA9}"/>
-              </a:ext>
-            </a:extLst>
-          </p:cNvPr>
+          <p:cNvPr id="4" name="Slide Number Placeholder 3"/>
           <p:cNvSpPr>
             <a:spLocks noGrp="1"/>
           </p:cNvSpPr>
@@ -2653,7 +2403,7 @@
     </p:spTree>
     <p:extLst>
       <p:ext uri="{BB962C8B-B14F-4D97-AF65-F5344CB8AC3E}">
-        <p14:creationId xmlns:p14="http://schemas.microsoft.com/office/powerpoint/2010/main" val="1390456032"/>
+        <p14:creationId xmlns:p14="http://schemas.microsoft.com/office/powerpoint/2010/main" val="1738174748"/>
       </p:ext>
     </p:extLst>
   </p:cSld>
@@ -2682,13 +2432,7 @@
       </p:grpSpPr>
       <p:sp>
         <p:nvSpPr>
-          <p:cNvPr id="2" name="Title 1">
-            <a:extLst>
-              <a:ext uri="{FF2B5EF4-FFF2-40B4-BE49-F238E27FC236}">
-                <a16:creationId xmlns:a16="http://schemas.microsoft.com/office/drawing/2014/main" id="{A49B4DDD-6A40-6718-D696-50FFF4420415}"/>
-              </a:ext>
-            </a:extLst>
-          </p:cNvPr>
+          <p:cNvPr id="2" name="Title 1"/>
           <p:cNvSpPr>
             <a:spLocks noGrp="1"/>
           </p:cNvSpPr>
@@ -2698,15 +2442,15 @@
         </p:nvSpPr>
         <p:spPr>
           <a:xfrm>
-            <a:off x="839788" y="457200"/>
-            <a:ext cx="3932237" cy="1600200"/>
+            <a:off x="839788" y="609600"/>
+            <a:ext cx="3932237" cy="2133600"/>
           </a:xfrm>
         </p:spPr>
         <p:txBody>
           <a:bodyPr anchor="b"/>
           <a:lstStyle>
             <a:lvl1pPr>
-              <a:defRPr sz="3200"/>
+              <a:defRPr sz="4267"/>
             </a:lvl1pPr>
           </a:lstStyle>
           <a:p>
@@ -2714,18 +2458,13 @@
               <a:rPr lang="en-US"/>
               <a:t>Click to edit Master title style</a:t>
             </a:r>
-          </a:p>
-        </p:txBody>
-      </p:sp>
-      <p:sp>
-        <p:nvSpPr>
-          <p:cNvPr id="3" name="Content Placeholder 2">
-            <a:extLst>
-              <a:ext uri="{FF2B5EF4-FFF2-40B4-BE49-F238E27FC236}">
-                <a16:creationId xmlns:a16="http://schemas.microsoft.com/office/drawing/2014/main" id="{D620AB29-F901-A507-57E2-BC8CA15FEFFC}"/>
-              </a:ext>
-            </a:extLst>
-          </p:cNvPr>
+            <a:endParaRPr lang="en-US" dirty="0"/>
+          </a:p>
+        </p:txBody>
+      </p:sp>
+      <p:sp>
+        <p:nvSpPr>
+          <p:cNvPr id="3" name="Content Placeholder 2"/>
           <p:cNvSpPr>
             <a:spLocks noGrp="1"/>
           </p:cNvSpPr>
@@ -2735,39 +2474,39 @@
         </p:nvSpPr>
         <p:spPr>
           <a:xfrm>
-            <a:off x="5183188" y="987425"/>
-            <a:ext cx="6172200" cy="4873625"/>
+            <a:off x="5183188" y="1316568"/>
+            <a:ext cx="6172200" cy="6498167"/>
           </a:xfrm>
         </p:spPr>
         <p:txBody>
           <a:bodyPr/>
           <a:lstStyle>
             <a:lvl1pPr>
-              <a:defRPr sz="3200"/>
+              <a:defRPr sz="4267"/>
             </a:lvl1pPr>
             <a:lvl2pPr>
-              <a:defRPr sz="2800"/>
+              <a:defRPr sz="3733"/>
             </a:lvl2pPr>
             <a:lvl3pPr>
-              <a:defRPr sz="2400"/>
+              <a:defRPr sz="3200"/>
             </a:lvl3pPr>
             <a:lvl4pPr>
-              <a:defRPr sz="2000"/>
+              <a:defRPr sz="2667"/>
             </a:lvl4pPr>
             <a:lvl5pPr>
-              <a:defRPr sz="2000"/>
+              <a:defRPr sz="2667"/>
             </a:lvl5pPr>
             <a:lvl6pPr>
-              <a:defRPr sz="2000"/>
+              <a:defRPr sz="2667"/>
             </a:lvl6pPr>
             <a:lvl7pPr>
-              <a:defRPr sz="2000"/>
+              <a:defRPr sz="2667"/>
             </a:lvl7pPr>
             <a:lvl8pPr>
-              <a:defRPr sz="2000"/>
+              <a:defRPr sz="2667"/>
             </a:lvl8pPr>
             <a:lvl9pPr>
-              <a:defRPr sz="2000"/>
+              <a:defRPr sz="2667"/>
             </a:lvl9pPr>
           </a:lstStyle>
           <a:p>
@@ -2804,18 +2543,13 @@
               <a:rPr lang="en-US"/>
               <a:t>Fifth level</a:t>
             </a:r>
-          </a:p>
-        </p:txBody>
-      </p:sp>
-      <p:sp>
-        <p:nvSpPr>
-          <p:cNvPr id="4" name="Text Placeholder 3">
-            <a:extLst>
-              <a:ext uri="{FF2B5EF4-FFF2-40B4-BE49-F238E27FC236}">
-                <a16:creationId xmlns:a16="http://schemas.microsoft.com/office/drawing/2014/main" id="{69BFA18F-D987-D97B-0C40-AFD5B79A1503}"/>
-              </a:ext>
-            </a:extLst>
-          </p:cNvPr>
+            <a:endParaRPr lang="en-US" dirty="0"/>
+          </a:p>
+        </p:txBody>
+      </p:sp>
+      <p:sp>
+        <p:nvSpPr>
+          <p:cNvPr id="4" name="Text Placeholder 3"/>
           <p:cNvSpPr>
             <a:spLocks noGrp="1"/>
           </p:cNvSpPr>
@@ -2825,8 +2559,8 @@
         </p:nvSpPr>
         <p:spPr>
           <a:xfrm>
-            <a:off x="839788" y="2057400"/>
-            <a:ext cx="3932237" cy="3811588"/>
+            <a:off x="839788" y="2743200"/>
+            <a:ext cx="3932237" cy="5082117"/>
           </a:xfrm>
         </p:spPr>
         <p:txBody>
@@ -2834,39 +2568,39 @@
           <a:lstStyle>
             <a:lvl1pPr marL="0" indent="0">
               <a:buNone/>
+              <a:defRPr sz="2133"/>
+            </a:lvl1pPr>
+            <a:lvl2pPr marL="609585" indent="0">
+              <a:buNone/>
+              <a:defRPr sz="1867"/>
+            </a:lvl2pPr>
+            <a:lvl3pPr marL="1219170" indent="0">
+              <a:buNone/>
               <a:defRPr sz="1600"/>
-            </a:lvl1pPr>
-            <a:lvl2pPr marL="457200" indent="0">
+            </a:lvl3pPr>
+            <a:lvl4pPr marL="1828754" indent="0">
               <a:buNone/>
-              <a:defRPr sz="1400"/>
-            </a:lvl2pPr>
-            <a:lvl3pPr marL="914400" indent="0">
+              <a:defRPr sz="1333"/>
+            </a:lvl4pPr>
+            <a:lvl5pPr marL="2438339" indent="0">
               <a:buNone/>
-              <a:defRPr sz="1200"/>
-            </a:lvl3pPr>
-            <a:lvl4pPr marL="1371600" indent="0">
+              <a:defRPr sz="1333"/>
+            </a:lvl5pPr>
+            <a:lvl6pPr marL="3047924" indent="0">
               <a:buNone/>
-              <a:defRPr sz="1000"/>
-            </a:lvl4pPr>
-            <a:lvl5pPr marL="1828800" indent="0">
+              <a:defRPr sz="1333"/>
+            </a:lvl6pPr>
+            <a:lvl7pPr marL="3657509" indent="0">
               <a:buNone/>
-              <a:defRPr sz="1000"/>
-            </a:lvl5pPr>
-            <a:lvl6pPr marL="2286000" indent="0">
+              <a:defRPr sz="1333"/>
+            </a:lvl7pPr>
+            <a:lvl8pPr marL="4267093" indent="0">
               <a:buNone/>
-              <a:defRPr sz="1000"/>
-            </a:lvl6pPr>
-            <a:lvl7pPr marL="2743200" indent="0">
+              <a:defRPr sz="1333"/>
+            </a:lvl8pPr>
+            <a:lvl9pPr marL="4876678" indent="0">
               <a:buNone/>
-              <a:defRPr sz="1000"/>
-            </a:lvl7pPr>
-            <a:lvl8pPr marL="3200400" indent="0">
-              <a:buNone/>
-              <a:defRPr sz="1000"/>
-            </a:lvl8pPr>
-            <a:lvl9pPr marL="3657600" indent="0">
-              <a:buNone/>
-              <a:defRPr sz="1000"/>
+              <a:defRPr sz="1333"/>
             </a:lvl9pPr>
           </a:lstStyle>
           <a:p>
@@ -2880,13 +2614,7 @@
       </p:sp>
       <p:sp>
         <p:nvSpPr>
-          <p:cNvPr id="5" name="Date Placeholder 4">
-            <a:extLst>
-              <a:ext uri="{FF2B5EF4-FFF2-40B4-BE49-F238E27FC236}">
-                <a16:creationId xmlns:a16="http://schemas.microsoft.com/office/drawing/2014/main" id="{9F4D4EBB-E3B0-BB79-8F63-B47D15AFB6C7}"/>
-              </a:ext>
-            </a:extLst>
-          </p:cNvPr>
+          <p:cNvPr id="5" name="Date Placeholder 4"/>
           <p:cNvSpPr>
             <a:spLocks noGrp="1"/>
           </p:cNvSpPr>
@@ -2901,7 +2629,7 @@
           <a:p>
             <a:fld id="{41FB2227-03CE-E245-9493-775E002035A1}" type="datetimeFigureOut">
               <a:rPr lang="en-US" smtClean="0"/>
-              <a:t>4/15/25</a:t>
+              <a:t>4/21/25</a:t>
             </a:fld>
             <a:endParaRPr lang="en-US"/>
           </a:p>
@@ -2909,13 +2637,7 @@
       </p:sp>
       <p:sp>
         <p:nvSpPr>
-          <p:cNvPr id="6" name="Footer Placeholder 5">
-            <a:extLst>
-              <a:ext uri="{FF2B5EF4-FFF2-40B4-BE49-F238E27FC236}">
-                <a16:creationId xmlns:a16="http://schemas.microsoft.com/office/drawing/2014/main" id="{5B4DAF26-0165-027C-87A1-30D7A5380958}"/>
-              </a:ext>
-            </a:extLst>
-          </p:cNvPr>
+          <p:cNvPr id="6" name="Footer Placeholder 5"/>
           <p:cNvSpPr>
             <a:spLocks noGrp="1"/>
           </p:cNvSpPr>
@@ -2934,13 +2656,7 @@
       </p:sp>
       <p:sp>
         <p:nvSpPr>
-          <p:cNvPr id="7" name="Slide Number Placeholder 6">
-            <a:extLst>
-              <a:ext uri="{FF2B5EF4-FFF2-40B4-BE49-F238E27FC236}">
-                <a16:creationId xmlns:a16="http://schemas.microsoft.com/office/drawing/2014/main" id="{8BDC4CAF-C83E-E518-C69F-18BACE3BFAF3}"/>
-              </a:ext>
-            </a:extLst>
-          </p:cNvPr>
+          <p:cNvPr id="7" name="Slide Number Placeholder 6"/>
           <p:cNvSpPr>
             <a:spLocks noGrp="1"/>
           </p:cNvSpPr>
@@ -2964,7 +2680,7 @@
     </p:spTree>
     <p:extLst>
       <p:ext uri="{BB962C8B-B14F-4D97-AF65-F5344CB8AC3E}">
-        <p14:creationId xmlns:p14="http://schemas.microsoft.com/office/powerpoint/2010/main" val="3526891174"/>
+        <p14:creationId xmlns:p14="http://schemas.microsoft.com/office/powerpoint/2010/main" val="2800746511"/>
       </p:ext>
     </p:extLst>
   </p:cSld>
@@ -2993,13 +2709,7 @@
       </p:grpSpPr>
       <p:sp>
         <p:nvSpPr>
-          <p:cNvPr id="2" name="Title 1">
-            <a:extLst>
-              <a:ext uri="{FF2B5EF4-FFF2-40B4-BE49-F238E27FC236}">
-                <a16:creationId xmlns:a16="http://schemas.microsoft.com/office/drawing/2014/main" id="{C6F0B31C-4839-AF7B-3F0B-BBE3E882E5CC}"/>
-              </a:ext>
-            </a:extLst>
-          </p:cNvPr>
+          <p:cNvPr id="2" name="Title 1"/>
           <p:cNvSpPr>
             <a:spLocks noGrp="1"/>
           </p:cNvSpPr>
@@ -3009,15 +2719,15 @@
         </p:nvSpPr>
         <p:spPr>
           <a:xfrm>
-            <a:off x="839788" y="457200"/>
-            <a:ext cx="3932237" cy="1600200"/>
+            <a:off x="839788" y="609600"/>
+            <a:ext cx="3932237" cy="2133600"/>
           </a:xfrm>
         </p:spPr>
         <p:txBody>
           <a:bodyPr anchor="b"/>
           <a:lstStyle>
             <a:lvl1pPr>
-              <a:defRPr sz="3200"/>
+              <a:defRPr sz="4267"/>
             </a:lvl1pPr>
           </a:lstStyle>
           <a:p>
@@ -3025,20 +2735,15 @@
               <a:rPr lang="en-US"/>
               <a:t>Click to edit Master title style</a:t>
             </a:r>
-          </a:p>
-        </p:txBody>
-      </p:sp>
-      <p:sp>
-        <p:nvSpPr>
-          <p:cNvPr id="3" name="Picture Placeholder 2">
-            <a:extLst>
-              <a:ext uri="{FF2B5EF4-FFF2-40B4-BE49-F238E27FC236}">
-                <a16:creationId xmlns:a16="http://schemas.microsoft.com/office/drawing/2014/main" id="{C9386271-29F8-2EF1-DFA2-3C65704A9D80}"/>
-              </a:ext>
-            </a:extLst>
-          </p:cNvPr>
+            <a:endParaRPr lang="en-US" dirty="0"/>
+          </a:p>
+        </p:txBody>
+      </p:sp>
+      <p:sp>
+        <p:nvSpPr>
+          <p:cNvPr id="3" name="Picture Placeholder 2"/>
           <p:cNvSpPr>
-            <a:spLocks noGrp="1"/>
+            <a:spLocks noGrp="1" noChangeAspect="1"/>
           </p:cNvSpPr>
           <p:nvPr>
             <p:ph type="pic" idx="1"/>
@@ -3046,64 +2751,62 @@
         </p:nvSpPr>
         <p:spPr>
           <a:xfrm>
-            <a:off x="5183188" y="987425"/>
-            <a:ext cx="6172200" cy="4873625"/>
+            <a:off x="5183188" y="1316568"/>
+            <a:ext cx="6172200" cy="6498167"/>
           </a:xfrm>
         </p:spPr>
         <p:txBody>
-          <a:bodyPr/>
+          <a:bodyPr anchor="t"/>
           <a:lstStyle>
             <a:lvl1pPr marL="0" indent="0">
               <a:buNone/>
+              <a:defRPr sz="4267"/>
+            </a:lvl1pPr>
+            <a:lvl2pPr marL="609585" indent="0">
+              <a:buNone/>
+              <a:defRPr sz="3733"/>
+            </a:lvl2pPr>
+            <a:lvl3pPr marL="1219170" indent="0">
+              <a:buNone/>
               <a:defRPr sz="3200"/>
-            </a:lvl1pPr>
-            <a:lvl2pPr marL="457200" indent="0">
+            </a:lvl3pPr>
+            <a:lvl4pPr marL="1828754" indent="0">
               <a:buNone/>
-              <a:defRPr sz="2800"/>
-            </a:lvl2pPr>
-            <a:lvl3pPr marL="914400" indent="0">
+              <a:defRPr sz="2667"/>
+            </a:lvl4pPr>
+            <a:lvl5pPr marL="2438339" indent="0">
               <a:buNone/>
-              <a:defRPr sz="2400"/>
-            </a:lvl3pPr>
-            <a:lvl4pPr marL="1371600" indent="0">
+              <a:defRPr sz="2667"/>
+            </a:lvl5pPr>
+            <a:lvl6pPr marL="3047924" indent="0">
               <a:buNone/>
-              <a:defRPr sz="2000"/>
-            </a:lvl4pPr>
-            <a:lvl5pPr marL="1828800" indent="0">
+              <a:defRPr sz="2667"/>
+            </a:lvl6pPr>
+            <a:lvl7pPr marL="3657509" indent="0">
               <a:buNone/>
-              <a:defRPr sz="2000"/>
-            </a:lvl5pPr>
-            <a:lvl6pPr marL="2286000" indent="0">
+              <a:defRPr sz="2667"/>
+            </a:lvl7pPr>
+            <a:lvl8pPr marL="4267093" indent="0">
               <a:buNone/>
-              <a:defRPr sz="2000"/>
-            </a:lvl6pPr>
-            <a:lvl7pPr marL="2743200" indent="0">
+              <a:defRPr sz="2667"/>
+            </a:lvl8pPr>
+            <a:lvl9pPr marL="4876678" indent="0">
               <a:buNone/>
-              <a:defRPr sz="2000"/>
-            </a:lvl7pPr>
-            <a:lvl8pPr marL="3200400" indent="0">
-              <a:buNone/>
-              <a:defRPr sz="2000"/>
-            </a:lvl8pPr>
-            <a:lvl9pPr marL="3657600" indent="0">
-              <a:buNone/>
-              <a:defRPr sz="2000"/>
+              <a:defRPr sz="2667"/>
             </a:lvl9pPr>
           </a:lstStyle>
           <a:p>
-            <a:endParaRPr lang="en-US"/>
-          </a:p>
-        </p:txBody>
-      </p:sp>
-      <p:sp>
-        <p:nvSpPr>
-          <p:cNvPr id="4" name="Text Placeholder 3">
-            <a:extLst>
-              <a:ext uri="{FF2B5EF4-FFF2-40B4-BE49-F238E27FC236}">
-                <a16:creationId xmlns:a16="http://schemas.microsoft.com/office/drawing/2014/main" id="{0FE1F351-2BCC-643F-C125-14FF62320EA6}"/>
-              </a:ext>
-            </a:extLst>
-          </p:cNvPr>
+            <a:r>
+              <a:rPr lang="en-US"/>
+              <a:t>Click icon to add picture</a:t>
+            </a:r>
+            <a:endParaRPr lang="en-US" dirty="0"/>
+          </a:p>
+        </p:txBody>
+      </p:sp>
+      <p:sp>
+        <p:nvSpPr>
+          <p:cNvPr id="4" name="Text Placeholder 3"/>
           <p:cNvSpPr>
             <a:spLocks noGrp="1"/>
           </p:cNvSpPr>
@@ -3113,8 +2816,8 @@
         </p:nvSpPr>
         <p:spPr>
           <a:xfrm>
-            <a:off x="839788" y="2057400"/>
-            <a:ext cx="3932237" cy="3811588"/>
+            <a:off x="839788" y="2743200"/>
+            <a:ext cx="3932237" cy="5082117"/>
           </a:xfrm>
         </p:spPr>
         <p:txBody>
@@ -3122,39 +2825,39 @@
           <a:lstStyle>
             <a:lvl1pPr marL="0" indent="0">
               <a:buNone/>
+              <a:defRPr sz="2133"/>
+            </a:lvl1pPr>
+            <a:lvl2pPr marL="609585" indent="0">
+              <a:buNone/>
+              <a:defRPr sz="1867"/>
+            </a:lvl2pPr>
+            <a:lvl3pPr marL="1219170" indent="0">
+              <a:buNone/>
               <a:defRPr sz="1600"/>
-            </a:lvl1pPr>
-            <a:lvl2pPr marL="457200" indent="0">
+            </a:lvl3pPr>
+            <a:lvl4pPr marL="1828754" indent="0">
               <a:buNone/>
-              <a:defRPr sz="1400"/>
-            </a:lvl2pPr>
-            <a:lvl3pPr marL="914400" indent="0">
+              <a:defRPr sz="1333"/>
+            </a:lvl4pPr>
+            <a:lvl5pPr marL="2438339" indent="0">
               <a:buNone/>
-              <a:defRPr sz="1200"/>
-            </a:lvl3pPr>
-            <a:lvl4pPr marL="1371600" indent="0">
+              <a:defRPr sz="1333"/>
+            </a:lvl5pPr>
+            <a:lvl6pPr marL="3047924" indent="0">
               <a:buNone/>
-              <a:defRPr sz="1000"/>
-            </a:lvl4pPr>
-            <a:lvl5pPr marL="1828800" indent="0">
+              <a:defRPr sz="1333"/>
+            </a:lvl6pPr>
+            <a:lvl7pPr marL="3657509" indent="0">
               <a:buNone/>
-              <a:defRPr sz="1000"/>
-            </a:lvl5pPr>
-            <a:lvl6pPr marL="2286000" indent="0">
+              <a:defRPr sz="1333"/>
+            </a:lvl7pPr>
+            <a:lvl8pPr marL="4267093" indent="0">
               <a:buNone/>
-              <a:defRPr sz="1000"/>
-            </a:lvl6pPr>
-            <a:lvl7pPr marL="2743200" indent="0">
+              <a:defRPr sz="1333"/>
+            </a:lvl8pPr>
+            <a:lvl9pPr marL="4876678" indent="0">
               <a:buNone/>
-              <a:defRPr sz="1000"/>
-            </a:lvl7pPr>
-            <a:lvl8pPr marL="3200400" indent="0">
-              <a:buNone/>
-              <a:defRPr sz="1000"/>
-            </a:lvl8pPr>
-            <a:lvl9pPr marL="3657600" indent="0">
-              <a:buNone/>
-              <a:defRPr sz="1000"/>
+              <a:defRPr sz="1333"/>
             </a:lvl9pPr>
           </a:lstStyle>
           <a:p>
@@ -3168,13 +2871,7 @@
       </p:sp>
       <p:sp>
         <p:nvSpPr>
-          <p:cNvPr id="5" name="Date Placeholder 4">
-            <a:extLst>
-              <a:ext uri="{FF2B5EF4-FFF2-40B4-BE49-F238E27FC236}">
-                <a16:creationId xmlns:a16="http://schemas.microsoft.com/office/drawing/2014/main" id="{B28AAF2F-8CBB-4EF7-D0D6-8DA9FEC62FBF}"/>
-              </a:ext>
-            </a:extLst>
-          </p:cNvPr>
+          <p:cNvPr id="5" name="Date Placeholder 4"/>
           <p:cNvSpPr>
             <a:spLocks noGrp="1"/>
           </p:cNvSpPr>
@@ -3189,7 +2886,7 @@
           <a:p>
             <a:fld id="{41FB2227-03CE-E245-9493-775E002035A1}" type="datetimeFigureOut">
               <a:rPr lang="en-US" smtClean="0"/>
-              <a:t>4/15/25</a:t>
+              <a:t>4/21/25</a:t>
             </a:fld>
             <a:endParaRPr lang="en-US"/>
           </a:p>
@@ -3197,13 +2894,7 @@
       </p:sp>
       <p:sp>
         <p:nvSpPr>
-          <p:cNvPr id="6" name="Footer Placeholder 5">
-            <a:extLst>
-              <a:ext uri="{FF2B5EF4-FFF2-40B4-BE49-F238E27FC236}">
-                <a16:creationId xmlns:a16="http://schemas.microsoft.com/office/drawing/2014/main" id="{EAD12447-B8AC-1B79-6BBF-F8E0C39BA736}"/>
-              </a:ext>
-            </a:extLst>
-          </p:cNvPr>
+          <p:cNvPr id="6" name="Footer Placeholder 5"/>
           <p:cNvSpPr>
             <a:spLocks noGrp="1"/>
           </p:cNvSpPr>
@@ -3222,13 +2913,7 @@
       </p:sp>
       <p:sp>
         <p:nvSpPr>
-          <p:cNvPr id="7" name="Slide Number Placeholder 6">
-            <a:extLst>
-              <a:ext uri="{FF2B5EF4-FFF2-40B4-BE49-F238E27FC236}">
-                <a16:creationId xmlns:a16="http://schemas.microsoft.com/office/drawing/2014/main" id="{8400844D-401B-A617-5936-39D055F90491}"/>
-              </a:ext>
-            </a:extLst>
-          </p:cNvPr>
+          <p:cNvPr id="7" name="Slide Number Placeholder 6"/>
           <p:cNvSpPr>
             <a:spLocks noGrp="1"/>
           </p:cNvSpPr>
@@ -3252,7 +2937,7 @@
     </p:spTree>
     <p:extLst>
       <p:ext uri="{BB962C8B-B14F-4D97-AF65-F5344CB8AC3E}">
-        <p14:creationId xmlns:p14="http://schemas.microsoft.com/office/powerpoint/2010/main" val="1511051561"/>
+        <p14:creationId xmlns:p14="http://schemas.microsoft.com/office/powerpoint/2010/main" val="3115576741"/>
       </p:ext>
     </p:extLst>
   </p:cSld>
@@ -3286,13 +2971,7 @@
       </p:grpSpPr>
       <p:sp>
         <p:nvSpPr>
-          <p:cNvPr id="2" name="Title Placeholder 1">
-            <a:extLst>
-              <a:ext uri="{FF2B5EF4-FFF2-40B4-BE49-F238E27FC236}">
-                <a16:creationId xmlns:a16="http://schemas.microsoft.com/office/drawing/2014/main" id="{AF1FBF8D-A852-4D84-33C1-1FB06C5E6CAD}"/>
-              </a:ext>
-            </a:extLst>
-          </p:cNvPr>
+          <p:cNvPr id="2" name="Title Placeholder 1"/>
           <p:cNvSpPr>
             <a:spLocks noGrp="1"/>
           </p:cNvSpPr>
@@ -3302,8 +2981,8 @@
         </p:nvSpPr>
         <p:spPr>
           <a:xfrm>
-            <a:off x="838200" y="365125"/>
-            <a:ext cx="10515600" cy="1325563"/>
+            <a:off x="838200" y="486835"/>
+            <a:ext cx="10515600" cy="1767417"/>
           </a:xfrm>
           <a:prstGeom prst="rect">
             <a:avLst/>
@@ -3319,18 +2998,13 @@
               <a:rPr lang="en-US"/>
               <a:t>Click to edit Master title style</a:t>
             </a:r>
-          </a:p>
-        </p:txBody>
-      </p:sp>
-      <p:sp>
-        <p:nvSpPr>
-          <p:cNvPr id="3" name="Text Placeholder 2">
-            <a:extLst>
-              <a:ext uri="{FF2B5EF4-FFF2-40B4-BE49-F238E27FC236}">
-                <a16:creationId xmlns:a16="http://schemas.microsoft.com/office/drawing/2014/main" id="{849ED33C-DA46-14ED-2FC2-3B6A72406A28}"/>
-              </a:ext>
-            </a:extLst>
-          </p:cNvPr>
+            <a:endParaRPr lang="en-US" dirty="0"/>
+          </a:p>
+        </p:txBody>
+      </p:sp>
+      <p:sp>
+        <p:nvSpPr>
+          <p:cNvPr id="3" name="Text Placeholder 2"/>
           <p:cNvSpPr>
             <a:spLocks noGrp="1"/>
           </p:cNvSpPr>
@@ -3340,8 +3014,8 @@
         </p:nvSpPr>
         <p:spPr>
           <a:xfrm>
-            <a:off x="838200" y="1825625"/>
-            <a:ext cx="10515600" cy="4351338"/>
+            <a:off x="838200" y="2434167"/>
+            <a:ext cx="10515600" cy="5801784"/>
           </a:xfrm>
           <a:prstGeom prst="rect">
             <a:avLst/>
@@ -3386,18 +3060,13 @@
               <a:rPr lang="en-US"/>
               <a:t>Fifth level</a:t>
             </a:r>
-          </a:p>
-        </p:txBody>
-      </p:sp>
-      <p:sp>
-        <p:nvSpPr>
-          <p:cNvPr id="4" name="Date Placeholder 3">
-            <a:extLst>
-              <a:ext uri="{FF2B5EF4-FFF2-40B4-BE49-F238E27FC236}">
-                <a16:creationId xmlns:a16="http://schemas.microsoft.com/office/drawing/2014/main" id="{18128DF5-867C-A183-3D2A-72E4B0742B80}"/>
-              </a:ext>
-            </a:extLst>
-          </p:cNvPr>
+            <a:endParaRPr lang="en-US" dirty="0"/>
+          </a:p>
+        </p:txBody>
+      </p:sp>
+      <p:sp>
+        <p:nvSpPr>
+          <p:cNvPr id="4" name="Date Placeholder 3"/>
           <p:cNvSpPr>
             <a:spLocks noGrp="1"/>
           </p:cNvSpPr>
@@ -3407,8 +3076,8 @@
         </p:nvSpPr>
         <p:spPr>
           <a:xfrm>
-            <a:off x="838200" y="6356350"/>
-            <a:ext cx="2743200" cy="365125"/>
+            <a:off x="838200" y="8475136"/>
+            <a:ext cx="2743200" cy="486833"/>
           </a:xfrm>
           <a:prstGeom prst="rect">
             <a:avLst/>
@@ -3418,7 +3087,7 @@
           <a:bodyPr vert="horz" lIns="91440" tIns="45720" rIns="91440" bIns="45720" rtlCol="0" anchor="ctr"/>
           <a:lstStyle>
             <a:lvl1pPr algn="l">
-              <a:defRPr sz="1200">
+              <a:defRPr sz="1600">
                 <a:solidFill>
                   <a:schemeClr val="tx1">
                     <a:tint val="82000"/>
@@ -3430,7 +3099,7 @@
           <a:p>
             <a:fld id="{41FB2227-03CE-E245-9493-775E002035A1}" type="datetimeFigureOut">
               <a:rPr lang="en-US" smtClean="0"/>
-              <a:t>4/15/25</a:t>
+              <a:t>4/21/25</a:t>
             </a:fld>
             <a:endParaRPr lang="en-US"/>
           </a:p>
@@ -3438,13 +3107,7 @@
       </p:sp>
       <p:sp>
         <p:nvSpPr>
-          <p:cNvPr id="5" name="Footer Placeholder 4">
-            <a:extLst>
-              <a:ext uri="{FF2B5EF4-FFF2-40B4-BE49-F238E27FC236}">
-                <a16:creationId xmlns:a16="http://schemas.microsoft.com/office/drawing/2014/main" id="{C049C5C3-4BEE-5EB0-F8FB-F746450216ED}"/>
-              </a:ext>
-            </a:extLst>
-          </p:cNvPr>
+          <p:cNvPr id="5" name="Footer Placeholder 4"/>
           <p:cNvSpPr>
             <a:spLocks noGrp="1"/>
           </p:cNvSpPr>
@@ -3454,8 +3117,8 @@
         </p:nvSpPr>
         <p:spPr>
           <a:xfrm>
-            <a:off x="4038600" y="6356350"/>
-            <a:ext cx="4114800" cy="365125"/>
+            <a:off x="4038600" y="8475136"/>
+            <a:ext cx="4114800" cy="486833"/>
           </a:xfrm>
           <a:prstGeom prst="rect">
             <a:avLst/>
@@ -3465,7 +3128,7 @@
           <a:bodyPr vert="horz" lIns="91440" tIns="45720" rIns="91440" bIns="45720" rtlCol="0" anchor="ctr"/>
           <a:lstStyle>
             <a:lvl1pPr algn="ctr">
-              <a:defRPr sz="1200">
+              <a:defRPr sz="1600">
                 <a:solidFill>
                   <a:schemeClr val="tx1">
                     <a:tint val="82000"/>
@@ -3481,13 +3144,7 @@
       </p:sp>
       <p:sp>
         <p:nvSpPr>
-          <p:cNvPr id="6" name="Slide Number Placeholder 5">
-            <a:extLst>
-              <a:ext uri="{FF2B5EF4-FFF2-40B4-BE49-F238E27FC236}">
-                <a16:creationId xmlns:a16="http://schemas.microsoft.com/office/drawing/2014/main" id="{B39D2031-6A28-38DD-DBBC-4C10593EF9F5}"/>
-              </a:ext>
-            </a:extLst>
-          </p:cNvPr>
+          <p:cNvPr id="6" name="Slide Number Placeholder 5"/>
           <p:cNvSpPr>
             <a:spLocks noGrp="1"/>
           </p:cNvSpPr>
@@ -3497,8 +3154,8 @@
         </p:nvSpPr>
         <p:spPr>
           <a:xfrm>
-            <a:off x="8610600" y="6356350"/>
-            <a:ext cx="2743200" cy="365125"/>
+            <a:off x="8610600" y="8475136"/>
+            <a:ext cx="2743200" cy="486833"/>
           </a:xfrm>
           <a:prstGeom prst="rect">
             <a:avLst/>
@@ -3508,7 +3165,7 @@
           <a:bodyPr vert="horz" lIns="91440" tIns="45720" rIns="91440" bIns="45720" rtlCol="0" anchor="ctr"/>
           <a:lstStyle>
             <a:lvl1pPr algn="r">
-              <a:defRPr sz="1200">
+              <a:defRPr sz="1600">
                 <a:solidFill>
                   <a:schemeClr val="tx1">
                     <a:tint val="82000"/>
@@ -3529,27 +3186,27 @@
     </p:spTree>
     <p:extLst>
       <p:ext uri="{BB962C8B-B14F-4D97-AF65-F5344CB8AC3E}">
-        <p14:creationId xmlns:p14="http://schemas.microsoft.com/office/powerpoint/2010/main" val="3528916561"/>
+        <p14:creationId xmlns:p14="http://schemas.microsoft.com/office/powerpoint/2010/main" val="2234476591"/>
       </p:ext>
     </p:extLst>
   </p:cSld>
   <p:clrMap bg1="lt1" tx1="dk1" bg2="lt2" tx2="dk2" accent1="accent1" accent2="accent2" accent3="accent3" accent4="accent4" accent5="accent5" accent6="accent6" hlink="hlink" folHlink="folHlink"/>
   <p:sldLayoutIdLst>
-    <p:sldLayoutId id="2147483649" r:id="rId1"/>
-    <p:sldLayoutId id="2147483650" r:id="rId2"/>
-    <p:sldLayoutId id="2147483651" r:id="rId3"/>
-    <p:sldLayoutId id="2147483652" r:id="rId4"/>
-    <p:sldLayoutId id="2147483653" r:id="rId5"/>
-    <p:sldLayoutId id="2147483654" r:id="rId6"/>
-    <p:sldLayoutId id="2147483655" r:id="rId7"/>
-    <p:sldLayoutId id="2147483656" r:id="rId8"/>
-    <p:sldLayoutId id="2147483657" r:id="rId9"/>
-    <p:sldLayoutId id="2147483658" r:id="rId10"/>
-    <p:sldLayoutId id="2147483659" r:id="rId11"/>
+    <p:sldLayoutId id="2147483661" r:id="rId1"/>
+    <p:sldLayoutId id="2147483662" r:id="rId2"/>
+    <p:sldLayoutId id="2147483663" r:id="rId3"/>
+    <p:sldLayoutId id="2147483664" r:id="rId4"/>
+    <p:sldLayoutId id="2147483665" r:id="rId5"/>
+    <p:sldLayoutId id="2147483666" r:id="rId6"/>
+    <p:sldLayoutId id="2147483667" r:id="rId7"/>
+    <p:sldLayoutId id="2147483668" r:id="rId8"/>
+    <p:sldLayoutId id="2147483669" r:id="rId9"/>
+    <p:sldLayoutId id="2147483670" r:id="rId10"/>
+    <p:sldLayoutId id="2147483671" r:id="rId11"/>
   </p:sldLayoutIdLst>
   <p:txStyles>
     <p:titleStyle>
-      <a:lvl1pPr algn="l" defTabSz="914400" rtl="0" eaLnBrk="1" latinLnBrk="0" hangingPunct="1">
+      <a:lvl1pPr algn="l" defTabSz="1219170" rtl="0" eaLnBrk="1" latinLnBrk="0" hangingPunct="1">
         <a:lnSpc>
           <a:spcPct val="90000"/>
         </a:lnSpc>
@@ -3557,7 +3214,7 @@
           <a:spcPct val="0"/>
         </a:spcBef>
         <a:buNone/>
-        <a:defRPr sz="4400" kern="1200">
+        <a:defRPr sz="5867" kern="1200">
           <a:solidFill>
             <a:schemeClr val="tx1"/>
           </a:solidFill>
@@ -3568,16 +3225,16 @@
       </a:lvl1pPr>
     </p:titleStyle>
     <p:bodyStyle>
-      <a:lvl1pPr marL="228600" indent="-228600" algn="l" defTabSz="914400" rtl="0" eaLnBrk="1" latinLnBrk="0" hangingPunct="1">
+      <a:lvl1pPr marL="304792" indent="-304792" algn="l" defTabSz="1219170" rtl="0" eaLnBrk="1" latinLnBrk="0" hangingPunct="1">
         <a:lnSpc>
           <a:spcPct val="90000"/>
         </a:lnSpc>
         <a:spcBef>
-          <a:spcPts val="1000"/>
+          <a:spcPts val="1333"/>
         </a:spcBef>
         <a:buFont typeface="Arial" panose="020B0604020202020204" pitchFamily="34" charset="0"/>
         <a:buChar char="•"/>
-        <a:defRPr sz="2800" kern="1200">
+        <a:defRPr sz="3733" kern="1200">
           <a:solidFill>
             <a:schemeClr val="tx1"/>
           </a:solidFill>
@@ -3586,12 +3243,48 @@
           <a:cs typeface="+mn-cs"/>
         </a:defRPr>
       </a:lvl1pPr>
-      <a:lvl2pPr marL="685800" indent="-228600" algn="l" defTabSz="914400" rtl="0" eaLnBrk="1" latinLnBrk="0" hangingPunct="1">
+      <a:lvl2pPr marL="914377" indent="-304792" algn="l" defTabSz="1219170" rtl="0" eaLnBrk="1" latinLnBrk="0" hangingPunct="1">
         <a:lnSpc>
           <a:spcPct val="90000"/>
         </a:lnSpc>
         <a:spcBef>
-          <a:spcPts val="500"/>
+          <a:spcPts val="667"/>
+        </a:spcBef>
+        <a:buFont typeface="Arial" panose="020B0604020202020204" pitchFamily="34" charset="0"/>
+        <a:buChar char="•"/>
+        <a:defRPr sz="3200" kern="1200">
+          <a:solidFill>
+            <a:schemeClr val="tx1"/>
+          </a:solidFill>
+          <a:latin typeface="+mn-lt"/>
+          <a:ea typeface="+mn-ea"/>
+          <a:cs typeface="+mn-cs"/>
+        </a:defRPr>
+      </a:lvl2pPr>
+      <a:lvl3pPr marL="1523962" indent="-304792" algn="l" defTabSz="1219170" rtl="0" eaLnBrk="1" latinLnBrk="0" hangingPunct="1">
+        <a:lnSpc>
+          <a:spcPct val="90000"/>
+        </a:lnSpc>
+        <a:spcBef>
+          <a:spcPts val="667"/>
+        </a:spcBef>
+        <a:buFont typeface="Arial" panose="020B0604020202020204" pitchFamily="34" charset="0"/>
+        <a:buChar char="•"/>
+        <a:defRPr sz="2667" kern="1200">
+          <a:solidFill>
+            <a:schemeClr val="tx1"/>
+          </a:solidFill>
+          <a:latin typeface="+mn-lt"/>
+          <a:ea typeface="+mn-ea"/>
+          <a:cs typeface="+mn-cs"/>
+        </a:defRPr>
+      </a:lvl3pPr>
+      <a:lvl4pPr marL="2133547" indent="-304792" algn="l" defTabSz="1219170" rtl="0" eaLnBrk="1" latinLnBrk="0" hangingPunct="1">
+        <a:lnSpc>
+          <a:spcPct val="90000"/>
+        </a:lnSpc>
+        <a:spcBef>
+          <a:spcPts val="667"/>
         </a:spcBef>
         <a:buFont typeface="Arial" panose="020B0604020202020204" pitchFamily="34" charset="0"/>
         <a:buChar char="•"/>
@@ -3603,53 +3296,17 @@
           <a:ea typeface="+mn-ea"/>
           <a:cs typeface="+mn-cs"/>
         </a:defRPr>
-      </a:lvl2pPr>
-      <a:lvl3pPr marL="1143000" indent="-228600" algn="l" defTabSz="914400" rtl="0" eaLnBrk="1" latinLnBrk="0" hangingPunct="1">
+      </a:lvl4pPr>
+      <a:lvl5pPr marL="2743131" indent="-304792" algn="l" defTabSz="1219170" rtl="0" eaLnBrk="1" latinLnBrk="0" hangingPunct="1">
         <a:lnSpc>
           <a:spcPct val="90000"/>
         </a:lnSpc>
         <a:spcBef>
-          <a:spcPts val="500"/>
+          <a:spcPts val="667"/>
         </a:spcBef>
         <a:buFont typeface="Arial" panose="020B0604020202020204" pitchFamily="34" charset="0"/>
         <a:buChar char="•"/>
-        <a:defRPr sz="2000" kern="1200">
-          <a:solidFill>
-            <a:schemeClr val="tx1"/>
-          </a:solidFill>
-          <a:latin typeface="+mn-lt"/>
-          <a:ea typeface="+mn-ea"/>
-          <a:cs typeface="+mn-cs"/>
-        </a:defRPr>
-      </a:lvl3pPr>
-      <a:lvl4pPr marL="1600200" indent="-228600" algn="l" defTabSz="914400" rtl="0" eaLnBrk="1" latinLnBrk="0" hangingPunct="1">
-        <a:lnSpc>
-          <a:spcPct val="90000"/>
-        </a:lnSpc>
-        <a:spcBef>
-          <a:spcPts val="500"/>
-        </a:spcBef>
-        <a:buFont typeface="Arial" panose="020B0604020202020204" pitchFamily="34" charset="0"/>
-        <a:buChar char="•"/>
-        <a:defRPr sz="1800" kern="1200">
-          <a:solidFill>
-            <a:schemeClr val="tx1"/>
-          </a:solidFill>
-          <a:latin typeface="+mn-lt"/>
-          <a:ea typeface="+mn-ea"/>
-          <a:cs typeface="+mn-cs"/>
-        </a:defRPr>
-      </a:lvl4pPr>
-      <a:lvl5pPr marL="2057400" indent="-228600" algn="l" defTabSz="914400" rtl="0" eaLnBrk="1" latinLnBrk="0" hangingPunct="1">
-        <a:lnSpc>
-          <a:spcPct val="90000"/>
-        </a:lnSpc>
-        <a:spcBef>
-          <a:spcPts val="500"/>
-        </a:spcBef>
-        <a:buFont typeface="Arial" panose="020B0604020202020204" pitchFamily="34" charset="0"/>
-        <a:buChar char="•"/>
-        <a:defRPr sz="1800" kern="1200">
+        <a:defRPr sz="2400" kern="1200">
           <a:solidFill>
             <a:schemeClr val="tx1"/>
           </a:solidFill>
@@ -3658,16 +3315,16 @@
           <a:cs typeface="+mn-cs"/>
         </a:defRPr>
       </a:lvl5pPr>
-      <a:lvl6pPr marL="2514600" indent="-228600" algn="l" defTabSz="914400" rtl="0" eaLnBrk="1" latinLnBrk="0" hangingPunct="1">
+      <a:lvl6pPr marL="3352716" indent="-304792" algn="l" defTabSz="1219170" rtl="0" eaLnBrk="1" latinLnBrk="0" hangingPunct="1">
         <a:lnSpc>
           <a:spcPct val="90000"/>
         </a:lnSpc>
         <a:spcBef>
-          <a:spcPts val="500"/>
+          <a:spcPts val="667"/>
         </a:spcBef>
         <a:buFont typeface="Arial" panose="020B0604020202020204" pitchFamily="34" charset="0"/>
         <a:buChar char="•"/>
-        <a:defRPr sz="1800" kern="1200">
+        <a:defRPr sz="2400" kern="1200">
           <a:solidFill>
             <a:schemeClr val="tx1"/>
           </a:solidFill>
@@ -3676,16 +3333,16 @@
           <a:cs typeface="+mn-cs"/>
         </a:defRPr>
       </a:lvl6pPr>
-      <a:lvl7pPr marL="2971800" indent="-228600" algn="l" defTabSz="914400" rtl="0" eaLnBrk="1" latinLnBrk="0" hangingPunct="1">
+      <a:lvl7pPr marL="3962301" indent="-304792" algn="l" defTabSz="1219170" rtl="0" eaLnBrk="1" latinLnBrk="0" hangingPunct="1">
         <a:lnSpc>
           <a:spcPct val="90000"/>
         </a:lnSpc>
         <a:spcBef>
-          <a:spcPts val="500"/>
+          <a:spcPts val="667"/>
         </a:spcBef>
         <a:buFont typeface="Arial" panose="020B0604020202020204" pitchFamily="34" charset="0"/>
         <a:buChar char="•"/>
-        <a:defRPr sz="1800" kern="1200">
+        <a:defRPr sz="2400" kern="1200">
           <a:solidFill>
             <a:schemeClr val="tx1"/>
           </a:solidFill>
@@ -3694,16 +3351,16 @@
           <a:cs typeface="+mn-cs"/>
         </a:defRPr>
       </a:lvl7pPr>
-      <a:lvl8pPr marL="3429000" indent="-228600" algn="l" defTabSz="914400" rtl="0" eaLnBrk="1" latinLnBrk="0" hangingPunct="1">
+      <a:lvl8pPr marL="4571886" indent="-304792" algn="l" defTabSz="1219170" rtl="0" eaLnBrk="1" latinLnBrk="0" hangingPunct="1">
         <a:lnSpc>
           <a:spcPct val="90000"/>
         </a:lnSpc>
         <a:spcBef>
-          <a:spcPts val="500"/>
+          <a:spcPts val="667"/>
         </a:spcBef>
         <a:buFont typeface="Arial" panose="020B0604020202020204" pitchFamily="34" charset="0"/>
         <a:buChar char="•"/>
-        <a:defRPr sz="1800" kern="1200">
+        <a:defRPr sz="2400" kern="1200">
           <a:solidFill>
             <a:schemeClr val="tx1"/>
           </a:solidFill>
@@ -3712,16 +3369,16 @@
           <a:cs typeface="+mn-cs"/>
         </a:defRPr>
       </a:lvl8pPr>
-      <a:lvl9pPr marL="3886200" indent="-228600" algn="l" defTabSz="914400" rtl="0" eaLnBrk="1" latinLnBrk="0" hangingPunct="1">
+      <a:lvl9pPr marL="5181470" indent="-304792" algn="l" defTabSz="1219170" rtl="0" eaLnBrk="1" latinLnBrk="0" hangingPunct="1">
         <a:lnSpc>
           <a:spcPct val="90000"/>
         </a:lnSpc>
         <a:spcBef>
-          <a:spcPts val="500"/>
+          <a:spcPts val="667"/>
         </a:spcBef>
         <a:buFont typeface="Arial" panose="020B0604020202020204" pitchFamily="34" charset="0"/>
         <a:buChar char="•"/>
-        <a:defRPr sz="1800" kern="1200">
+        <a:defRPr sz="2400" kern="1200">
           <a:solidFill>
             <a:schemeClr val="tx1"/>
           </a:solidFill>
@@ -3735,8 +3392,8 @@
       <a:defPPr>
         <a:defRPr lang="en-US"/>
       </a:defPPr>
-      <a:lvl1pPr marL="0" algn="l" defTabSz="914400" rtl="0" eaLnBrk="1" latinLnBrk="0" hangingPunct="1">
-        <a:defRPr sz="1800" kern="1200">
+      <a:lvl1pPr marL="0" algn="l" defTabSz="1219170" rtl="0" eaLnBrk="1" latinLnBrk="0" hangingPunct="1">
+        <a:defRPr sz="2400" kern="1200">
           <a:solidFill>
             <a:schemeClr val="tx1"/>
           </a:solidFill>
@@ -3745,8 +3402,8 @@
           <a:cs typeface="+mn-cs"/>
         </a:defRPr>
       </a:lvl1pPr>
-      <a:lvl2pPr marL="457200" algn="l" defTabSz="914400" rtl="0" eaLnBrk="1" latinLnBrk="0" hangingPunct="1">
-        <a:defRPr sz="1800" kern="1200">
+      <a:lvl2pPr marL="609585" algn="l" defTabSz="1219170" rtl="0" eaLnBrk="1" latinLnBrk="0" hangingPunct="1">
+        <a:defRPr sz="2400" kern="1200">
           <a:solidFill>
             <a:schemeClr val="tx1"/>
           </a:solidFill>
@@ -3755,8 +3412,8 @@
           <a:cs typeface="+mn-cs"/>
         </a:defRPr>
       </a:lvl2pPr>
-      <a:lvl3pPr marL="914400" algn="l" defTabSz="914400" rtl="0" eaLnBrk="1" latinLnBrk="0" hangingPunct="1">
-        <a:defRPr sz="1800" kern="1200">
+      <a:lvl3pPr marL="1219170" algn="l" defTabSz="1219170" rtl="0" eaLnBrk="1" latinLnBrk="0" hangingPunct="1">
+        <a:defRPr sz="2400" kern="1200">
           <a:solidFill>
             <a:schemeClr val="tx1"/>
           </a:solidFill>
@@ -3765,8 +3422,8 @@
           <a:cs typeface="+mn-cs"/>
         </a:defRPr>
       </a:lvl3pPr>
-      <a:lvl4pPr marL="1371600" algn="l" defTabSz="914400" rtl="0" eaLnBrk="1" latinLnBrk="0" hangingPunct="1">
-        <a:defRPr sz="1800" kern="1200">
+      <a:lvl4pPr marL="1828754" algn="l" defTabSz="1219170" rtl="0" eaLnBrk="1" latinLnBrk="0" hangingPunct="1">
+        <a:defRPr sz="2400" kern="1200">
           <a:solidFill>
             <a:schemeClr val="tx1"/>
           </a:solidFill>
@@ -3775,8 +3432,8 @@
           <a:cs typeface="+mn-cs"/>
         </a:defRPr>
       </a:lvl4pPr>
-      <a:lvl5pPr marL="1828800" algn="l" defTabSz="914400" rtl="0" eaLnBrk="1" latinLnBrk="0" hangingPunct="1">
-        <a:defRPr sz="1800" kern="1200">
+      <a:lvl5pPr marL="2438339" algn="l" defTabSz="1219170" rtl="0" eaLnBrk="1" latinLnBrk="0" hangingPunct="1">
+        <a:defRPr sz="2400" kern="1200">
           <a:solidFill>
             <a:schemeClr val="tx1"/>
           </a:solidFill>
@@ -3785,8 +3442,8 @@
           <a:cs typeface="+mn-cs"/>
         </a:defRPr>
       </a:lvl5pPr>
-      <a:lvl6pPr marL="2286000" algn="l" defTabSz="914400" rtl="0" eaLnBrk="1" latinLnBrk="0" hangingPunct="1">
-        <a:defRPr sz="1800" kern="1200">
+      <a:lvl6pPr marL="3047924" algn="l" defTabSz="1219170" rtl="0" eaLnBrk="1" latinLnBrk="0" hangingPunct="1">
+        <a:defRPr sz="2400" kern="1200">
           <a:solidFill>
             <a:schemeClr val="tx1"/>
           </a:solidFill>
@@ -3795,8 +3452,8 @@
           <a:cs typeface="+mn-cs"/>
         </a:defRPr>
       </a:lvl6pPr>
-      <a:lvl7pPr marL="2743200" algn="l" defTabSz="914400" rtl="0" eaLnBrk="1" latinLnBrk="0" hangingPunct="1">
-        <a:defRPr sz="1800" kern="1200">
+      <a:lvl7pPr marL="3657509" algn="l" defTabSz="1219170" rtl="0" eaLnBrk="1" latinLnBrk="0" hangingPunct="1">
+        <a:defRPr sz="2400" kern="1200">
           <a:solidFill>
             <a:schemeClr val="tx1"/>
           </a:solidFill>
@@ -3805,8 +3462,8 @@
           <a:cs typeface="+mn-cs"/>
         </a:defRPr>
       </a:lvl7pPr>
-      <a:lvl8pPr marL="3200400" algn="l" defTabSz="914400" rtl="0" eaLnBrk="1" latinLnBrk="0" hangingPunct="1">
-        <a:defRPr sz="1800" kern="1200">
+      <a:lvl8pPr marL="4267093" algn="l" defTabSz="1219170" rtl="0" eaLnBrk="1" latinLnBrk="0" hangingPunct="1">
+        <a:defRPr sz="2400" kern="1200">
           <a:solidFill>
             <a:schemeClr val="tx1"/>
           </a:solidFill>
@@ -3815,8 +3472,8 @@
           <a:cs typeface="+mn-cs"/>
         </a:defRPr>
       </a:lvl8pPr>
-      <a:lvl9pPr marL="3657600" algn="l" defTabSz="914400" rtl="0" eaLnBrk="1" latinLnBrk="0" hangingPunct="1">
-        <a:defRPr sz="1800" kern="1200">
+      <a:lvl9pPr marL="4876678" algn="l" defTabSz="1219170" rtl="0" eaLnBrk="1" latinLnBrk="0" hangingPunct="1">
+        <a:defRPr sz="2400" kern="1200">
           <a:solidFill>
             <a:schemeClr val="tx1"/>
           </a:solidFill>
@@ -3861,8 +3518,8 @@
         </p:nvSpPr>
         <p:spPr>
           <a:xfrm>
-            <a:off x="611861" y="2"/>
-            <a:ext cx="10930269" cy="6212636"/>
+            <a:off x="611866" y="1243018"/>
+            <a:ext cx="10930269" cy="7358060"/>
           </a:xfrm>
           <a:prstGeom prst="roundRect">
             <a:avLst>
@@ -3927,8 +3584,8 @@
         </p:nvSpPr>
         <p:spPr>
           <a:xfrm>
-            <a:off x="607353" y="0"/>
-            <a:ext cx="10930269" cy="6212638"/>
+            <a:off x="607358" y="1243020"/>
+            <a:ext cx="10930269" cy="7358063"/>
           </a:xfrm>
           <a:prstGeom prst="roundRect">
             <a:avLst>
@@ -3990,13 +3647,13 @@
           <p:nvPr>
             <p:extLst>
               <p:ext uri="{D42A27DB-BD31-4B8C-83A1-F6EECF244321}">
-                <p14:modId xmlns:p14="http://schemas.microsoft.com/office/powerpoint/2010/main" val="1921523138"/>
+                <p14:modId xmlns:p14="http://schemas.microsoft.com/office/powerpoint/2010/main" val="878062203"/>
               </p:ext>
             </p:extLst>
           </p:nvPr>
         </p:nvGraphicFramePr>
         <p:xfrm>
-          <a:off x="777908" y="212651"/>
+          <a:off x="777908" y="1455667"/>
           <a:ext cx="8550352" cy="2194560"/>
         </p:xfrm>
         <a:graphic>
@@ -4105,7 +3762,7 @@
                     <a:lstStyle/>
                     <a:p>
                       <a:r>
-                        <a:rPr lang="en-US" b="1" dirty="0">
+                        <a:rPr lang="en-US" sz="1800" b="1" dirty="0">
                           <a:solidFill>
                             <a:schemeClr val="bg1"/>
                           </a:solidFill>
@@ -4155,7 +3812,7 @@
                     <a:bodyPr/>
                     <a:lstStyle/>
                     <a:p>
-                      <a:endParaRPr lang="en-US" b="1" dirty="0">
+                      <a:endParaRPr lang="en-US" sz="1800" b="1" dirty="0">
                         <a:solidFill>
                           <a:schemeClr val="bg1"/>
                         </a:solidFill>
@@ -4203,7 +3860,7 @@
                     <a:bodyPr/>
                     <a:lstStyle/>
                     <a:p>
-                      <a:endParaRPr lang="en-US" b="1" dirty="0">
+                      <a:endParaRPr lang="en-US" sz="1800" b="1" dirty="0">
                         <a:solidFill>
                           <a:schemeClr val="bg1"/>
                         </a:solidFill>
@@ -4245,7 +3902,7 @@
                     <a:bodyPr/>
                     <a:lstStyle/>
                     <a:p>
-                      <a:endParaRPr lang="en-US" b="1" dirty="0">
+                      <a:endParaRPr lang="en-US" sz="1800" b="1" dirty="0">
                         <a:solidFill>
                           <a:schemeClr val="bg1"/>
                         </a:solidFill>
@@ -4293,7 +3950,7 @@
                     <a:bodyPr/>
                     <a:lstStyle/>
                     <a:p>
-                      <a:endParaRPr lang="en-US" b="1" dirty="0">
+                      <a:endParaRPr lang="en-US" sz="1800" b="1" dirty="0">
                         <a:solidFill>
                           <a:schemeClr val="bg1"/>
                         </a:solidFill>
@@ -4341,7 +3998,7 @@
                     <a:bodyPr/>
                     <a:lstStyle/>
                     <a:p>
-                      <a:endParaRPr lang="en-US" b="1" dirty="0">
+                      <a:endParaRPr lang="en-US" sz="1800" b="1" dirty="0">
                         <a:solidFill>
                           <a:schemeClr val="bg1"/>
                         </a:solidFill>
@@ -4383,7 +4040,7 @@
                     <a:bodyPr/>
                     <a:lstStyle/>
                     <a:p>
-                      <a:endParaRPr lang="en-US" b="1" dirty="0">
+                      <a:endParaRPr lang="en-US" sz="1800" b="1" dirty="0">
                         <a:solidFill>
                           <a:schemeClr val="bg1"/>
                         </a:solidFill>
@@ -4431,7 +4088,7 @@
                     <a:bodyPr/>
                     <a:lstStyle/>
                     <a:p>
-                      <a:endParaRPr lang="en-US" b="1" dirty="0">
+                      <a:endParaRPr lang="en-US" sz="1800" b="1" dirty="0">
                         <a:solidFill>
                           <a:schemeClr val="bg1"/>
                         </a:solidFill>
@@ -4479,7 +4136,7 @@
                     <a:bodyPr/>
                     <a:lstStyle/>
                     <a:p>
-                      <a:endParaRPr lang="en-US" b="1" dirty="0">
+                      <a:endParaRPr lang="en-US" sz="1800" b="1" dirty="0">
                         <a:solidFill>
                           <a:schemeClr val="bg1"/>
                         </a:solidFill>
@@ -4521,7 +4178,7 @@
                     <a:bodyPr/>
                     <a:lstStyle/>
                     <a:p>
-                      <a:endParaRPr lang="en-US" b="1" dirty="0">
+                      <a:endParaRPr lang="en-US" sz="1800" b="1" dirty="0">
                         <a:solidFill>
                           <a:schemeClr val="bg1"/>
                         </a:solidFill>
@@ -4569,7 +4226,7 @@
                     <a:bodyPr/>
                     <a:lstStyle/>
                     <a:p>
-                      <a:endParaRPr lang="en-US" b="1" dirty="0">
+                      <a:endParaRPr lang="en-US" sz="1800" b="1" dirty="0">
                         <a:solidFill>
                           <a:schemeClr val="bg1"/>
                         </a:solidFill>
@@ -4617,7 +4274,7 @@
                     <a:bodyPr/>
                     <a:lstStyle/>
                     <a:p>
-                      <a:endParaRPr lang="en-US" b="1" dirty="0">
+                      <a:endParaRPr lang="en-US" sz="1800" b="1" dirty="0">
                         <a:solidFill>
                           <a:schemeClr val="bg1"/>
                         </a:solidFill>
@@ -4659,7 +4316,7 @@
                     <a:bodyPr/>
                     <a:lstStyle/>
                     <a:p>
-                      <a:endParaRPr lang="en-US" b="1" dirty="0">
+                      <a:endParaRPr lang="en-US" sz="1800" b="1" dirty="0">
                         <a:solidFill>
                           <a:schemeClr val="bg1"/>
                         </a:solidFill>
@@ -4709,7 +4366,7 @@
                     <a:lstStyle/>
                     <a:p>
                       <a:r>
-                        <a:rPr lang="en-US" b="1" dirty="0">
+                        <a:rPr lang="en-US" sz="1800" b="1" dirty="0">
                           <a:solidFill>
                             <a:schemeClr val="bg1"/>
                           </a:solidFill>
@@ -4765,7 +4422,7 @@
                     <a:bodyPr/>
                     <a:lstStyle/>
                     <a:p>
-                      <a:endParaRPr lang="en-US" b="1">
+                      <a:endParaRPr lang="en-US" sz="1800" b="1">
                         <a:solidFill>
                           <a:schemeClr val="bg1"/>
                         </a:solidFill>
@@ -4819,7 +4476,7 @@
                     <a:bodyPr/>
                     <a:lstStyle/>
                     <a:p>
-                      <a:endParaRPr lang="en-US" b="1">
+                      <a:endParaRPr lang="en-US" sz="1800" b="1">
                         <a:solidFill>
                           <a:schemeClr val="bg1"/>
                         </a:solidFill>
@@ -4867,7 +4524,7 @@
                     <a:bodyPr/>
                     <a:lstStyle/>
                     <a:p>
-                      <a:endParaRPr lang="en-US" b="1">
+                      <a:endParaRPr lang="en-US" sz="1800" b="1">
                         <a:solidFill>
                           <a:schemeClr val="bg1"/>
                         </a:solidFill>
@@ -4921,7 +4578,7 @@
                     <a:bodyPr/>
                     <a:lstStyle/>
                     <a:p>
-                      <a:endParaRPr lang="en-US" b="1">
+                      <a:endParaRPr lang="en-US" sz="1800" b="1">
                         <a:solidFill>
                           <a:schemeClr val="bg1"/>
                         </a:solidFill>
@@ -4975,7 +4632,7 @@
                     <a:bodyPr/>
                     <a:lstStyle/>
                     <a:p>
-                      <a:endParaRPr lang="en-US" b="1" dirty="0">
+                      <a:endParaRPr lang="en-US" sz="1800" b="1" dirty="0">
                         <a:solidFill>
                           <a:schemeClr val="bg1"/>
                         </a:solidFill>
@@ -5023,7 +4680,7 @@
                     <a:bodyPr/>
                     <a:lstStyle/>
                     <a:p>
-                      <a:endParaRPr lang="en-US" b="1">
+                      <a:endParaRPr lang="en-US" sz="1800" b="1" dirty="0">
                         <a:solidFill>
                           <a:schemeClr val="bg1"/>
                         </a:solidFill>
@@ -5077,7 +4734,7 @@
                     <a:bodyPr/>
                     <a:lstStyle/>
                     <a:p>
-                      <a:endParaRPr lang="en-US" b="1">
+                      <a:endParaRPr lang="en-US" sz="1800" b="1" dirty="0">
                         <a:solidFill>
                           <a:schemeClr val="bg1"/>
                         </a:solidFill>
@@ -5131,7 +4788,7 @@
                     <a:bodyPr/>
                     <a:lstStyle/>
                     <a:p>
-                      <a:endParaRPr lang="en-US" b="1">
+                      <a:endParaRPr lang="en-US" sz="1800" b="1" dirty="0">
                         <a:solidFill>
                           <a:schemeClr val="bg1"/>
                         </a:solidFill>
@@ -5179,7 +4836,7 @@
                     <a:bodyPr/>
                     <a:lstStyle/>
                     <a:p>
-                      <a:endParaRPr lang="en-US" b="1">
+                      <a:endParaRPr lang="en-US" sz="1800" b="1">
                         <a:solidFill>
                           <a:schemeClr val="bg1"/>
                         </a:solidFill>
@@ -5233,7 +4890,7 @@
                     <a:bodyPr/>
                     <a:lstStyle/>
                     <a:p>
-                      <a:endParaRPr lang="en-US" b="1" dirty="0">
+                      <a:endParaRPr lang="en-US" sz="1800" b="1" dirty="0">
                         <a:solidFill>
                           <a:schemeClr val="bg1"/>
                         </a:solidFill>
@@ -5287,7 +4944,7 @@
                     <a:bodyPr/>
                     <a:lstStyle/>
                     <a:p>
-                      <a:endParaRPr lang="en-US" b="1">
+                      <a:endParaRPr lang="en-US" sz="1800" b="1">
                         <a:solidFill>
                           <a:schemeClr val="bg1"/>
                         </a:solidFill>
@@ -5335,7 +4992,7 @@
                     <a:bodyPr/>
                     <a:lstStyle/>
                     <a:p>
-                      <a:endParaRPr lang="en-US" b="1">
+                      <a:endParaRPr lang="en-US" sz="1800" b="1">
                         <a:solidFill>
                           <a:schemeClr val="bg1"/>
                         </a:solidFill>
@@ -5391,7 +5048,7 @@
                     <a:lstStyle/>
                     <a:p>
                       <a:r>
-                        <a:rPr lang="en-US" b="1" dirty="0">
+                        <a:rPr lang="en-US" sz="1800" b="1" dirty="0">
                           <a:solidFill>
                             <a:schemeClr val="bg1"/>
                           </a:solidFill>
@@ -5447,7 +5104,7 @@
                     <a:bodyPr/>
                     <a:lstStyle/>
                     <a:p>
-                      <a:endParaRPr lang="en-US" b="1" dirty="0">
+                      <a:endParaRPr lang="en-US" sz="1800" b="1" dirty="0">
                         <a:solidFill>
                           <a:schemeClr val="bg1"/>
                         </a:solidFill>
@@ -5501,7 +5158,7 @@
                     <a:bodyPr/>
                     <a:lstStyle/>
                     <a:p>
-                      <a:endParaRPr lang="en-US" b="1" dirty="0">
+                      <a:endParaRPr lang="en-US" sz="1800" b="1" dirty="0">
                         <a:solidFill>
                           <a:schemeClr val="bg1"/>
                         </a:solidFill>
@@ -5549,7 +5206,7 @@
                     <a:bodyPr/>
                     <a:lstStyle/>
                     <a:p>
-                      <a:endParaRPr lang="en-US" b="1" dirty="0">
+                      <a:endParaRPr lang="en-US" sz="1800" b="1" dirty="0">
                         <a:solidFill>
                           <a:schemeClr val="bg1"/>
                         </a:solidFill>
@@ -5603,7 +5260,7 @@
                     <a:bodyPr/>
                     <a:lstStyle/>
                     <a:p>
-                      <a:endParaRPr lang="en-US" b="1" dirty="0">
+                      <a:endParaRPr lang="en-US" sz="1800" b="1" dirty="0">
                         <a:solidFill>
                           <a:schemeClr val="bg1"/>
                         </a:solidFill>
@@ -5657,7 +5314,7 @@
                     <a:bodyPr/>
                     <a:lstStyle/>
                     <a:p>
-                      <a:endParaRPr lang="en-US" b="1" dirty="0">
+                      <a:endParaRPr lang="en-US" sz="1800" b="1" dirty="0">
                         <a:solidFill>
                           <a:schemeClr val="bg1"/>
                         </a:solidFill>
@@ -5705,7 +5362,7 @@
                     <a:bodyPr/>
                     <a:lstStyle/>
                     <a:p>
-                      <a:endParaRPr lang="en-US" b="1" dirty="0">
+                      <a:endParaRPr lang="en-US" sz="1800" b="1" dirty="0">
                         <a:solidFill>
                           <a:schemeClr val="bg1"/>
                         </a:solidFill>
@@ -5759,7 +5416,7 @@
                     <a:bodyPr/>
                     <a:lstStyle/>
                     <a:p>
-                      <a:endParaRPr lang="en-US" b="1" dirty="0">
+                      <a:endParaRPr lang="en-US" sz="1800" b="1" dirty="0">
                         <a:solidFill>
                           <a:schemeClr val="bg1"/>
                         </a:solidFill>
@@ -5813,7 +5470,7 @@
                     <a:bodyPr/>
                     <a:lstStyle/>
                     <a:p>
-                      <a:endParaRPr lang="en-US" b="1" dirty="0">
+                      <a:endParaRPr lang="en-US" sz="1800" b="1" dirty="0">
                         <a:solidFill>
                           <a:schemeClr val="bg1"/>
                         </a:solidFill>
@@ -5861,7 +5518,7 @@
                     <a:bodyPr/>
                     <a:lstStyle/>
                     <a:p>
-                      <a:endParaRPr lang="en-US" b="1" dirty="0">
+                      <a:endParaRPr lang="en-US" sz="1800" b="1" dirty="0">
                         <a:solidFill>
                           <a:schemeClr val="bg1"/>
                         </a:solidFill>
@@ -5915,7 +5572,7 @@
                     <a:bodyPr/>
                     <a:lstStyle/>
                     <a:p>
-                      <a:endParaRPr lang="en-US" b="1" dirty="0">
+                      <a:endParaRPr lang="en-US" sz="1800" b="1" dirty="0">
                         <a:solidFill>
                           <a:schemeClr val="bg1"/>
                         </a:solidFill>
@@ -5969,7 +5626,7 @@
                     <a:bodyPr/>
                     <a:lstStyle/>
                     <a:p>
-                      <a:endParaRPr lang="en-US" b="1" dirty="0">
+                      <a:endParaRPr lang="en-US" sz="1800" b="1" dirty="0">
                         <a:solidFill>
                           <a:schemeClr val="bg1"/>
                         </a:solidFill>
@@ -6017,7 +5674,7 @@
                     <a:bodyPr/>
                     <a:lstStyle/>
                     <a:p>
-                      <a:endParaRPr lang="en-US" b="1" dirty="0">
+                      <a:endParaRPr lang="en-US" sz="1800" b="1" dirty="0">
                         <a:solidFill>
                           <a:schemeClr val="bg1"/>
                         </a:solidFill>
@@ -6073,7 +5730,7 @@
                     <a:lstStyle/>
                     <a:p>
                       <a:r>
-                        <a:rPr lang="en-US" b="1" dirty="0">
+                        <a:rPr lang="en-US" sz="1800" b="1" dirty="0">
                           <a:solidFill>
                             <a:schemeClr val="bg1"/>
                           </a:solidFill>
@@ -6129,7 +5786,7 @@
                     <a:bodyPr/>
                     <a:lstStyle/>
                     <a:p>
-                      <a:endParaRPr lang="en-US" b="1" dirty="0">
+                      <a:endParaRPr lang="en-US" sz="1800" b="1" dirty="0">
                         <a:solidFill>
                           <a:schemeClr val="bg1"/>
                         </a:solidFill>
@@ -6183,7 +5840,7 @@
                     <a:bodyPr/>
                     <a:lstStyle/>
                     <a:p>
-                      <a:endParaRPr lang="en-US" b="1" dirty="0">
+                      <a:endParaRPr lang="en-US" sz="1800" b="1" dirty="0">
                         <a:solidFill>
                           <a:schemeClr val="bg1"/>
                         </a:solidFill>
@@ -6231,7 +5888,7 @@
                     <a:bodyPr/>
                     <a:lstStyle/>
                     <a:p>
-                      <a:endParaRPr lang="en-US" b="1" dirty="0">
+                      <a:endParaRPr lang="en-US" sz="1800" b="1" dirty="0">
                         <a:solidFill>
                           <a:schemeClr val="bg1"/>
                         </a:solidFill>
@@ -6285,7 +5942,7 @@
                     <a:bodyPr/>
                     <a:lstStyle/>
                     <a:p>
-                      <a:endParaRPr lang="en-US" b="1" dirty="0">
+                      <a:endParaRPr lang="en-US" sz="1800" b="1" dirty="0">
                         <a:solidFill>
                           <a:schemeClr val="bg1"/>
                         </a:solidFill>
@@ -6339,7 +5996,7 @@
                     <a:bodyPr/>
                     <a:lstStyle/>
                     <a:p>
-                      <a:endParaRPr lang="en-US" b="1" dirty="0">
+                      <a:endParaRPr lang="en-US" sz="1800" b="1" dirty="0">
                         <a:solidFill>
                           <a:schemeClr val="bg1"/>
                         </a:solidFill>
@@ -6387,7 +6044,7 @@
                     <a:bodyPr/>
                     <a:lstStyle/>
                     <a:p>
-                      <a:endParaRPr lang="en-US" b="1" dirty="0">
+                      <a:endParaRPr lang="en-US" sz="1800" b="1" dirty="0">
                         <a:solidFill>
                           <a:schemeClr val="bg1"/>
                         </a:solidFill>
@@ -6441,7 +6098,7 @@
                     <a:bodyPr/>
                     <a:lstStyle/>
                     <a:p>
-                      <a:endParaRPr lang="en-US" b="1" dirty="0">
+                      <a:endParaRPr lang="en-US" sz="1800" b="1" dirty="0">
                         <a:solidFill>
                           <a:schemeClr val="bg1"/>
                         </a:solidFill>
@@ -6495,7 +6152,7 @@
                     <a:bodyPr/>
                     <a:lstStyle/>
                     <a:p>
-                      <a:endParaRPr lang="en-US" b="1" dirty="0">
+                      <a:endParaRPr lang="en-US" sz="1800" b="1" dirty="0">
                         <a:solidFill>
                           <a:schemeClr val="bg1"/>
                         </a:solidFill>
@@ -6543,7 +6200,7 @@
                     <a:bodyPr/>
                     <a:lstStyle/>
                     <a:p>
-                      <a:endParaRPr lang="en-US" b="1" dirty="0">
+                      <a:endParaRPr lang="en-US" sz="1800" b="1" dirty="0">
                         <a:solidFill>
                           <a:schemeClr val="bg1"/>
                         </a:solidFill>
@@ -6597,7 +6254,7 @@
                     <a:bodyPr/>
                     <a:lstStyle/>
                     <a:p>
-                      <a:endParaRPr lang="en-US" b="1" dirty="0">
+                      <a:endParaRPr lang="en-US" sz="1800" b="1" dirty="0">
                         <a:solidFill>
                           <a:schemeClr val="bg1"/>
                         </a:solidFill>
@@ -6651,7 +6308,7 @@
                     <a:bodyPr/>
                     <a:lstStyle/>
                     <a:p>
-                      <a:endParaRPr lang="en-US" b="1" dirty="0">
+                      <a:endParaRPr lang="en-US" sz="1800" b="1" dirty="0">
                         <a:solidFill>
                           <a:schemeClr val="bg1"/>
                         </a:solidFill>
@@ -6699,7 +6356,7 @@
                     <a:bodyPr/>
                     <a:lstStyle/>
                     <a:p>
-                      <a:endParaRPr lang="en-US" b="1" dirty="0">
+                      <a:endParaRPr lang="en-US" sz="1800" b="1" dirty="0">
                         <a:solidFill>
                           <a:schemeClr val="bg1"/>
                         </a:solidFill>
@@ -6755,7 +6412,7 @@
                     <a:lstStyle/>
                     <a:p>
                       <a:r>
-                        <a:rPr lang="en-US" b="1" dirty="0">
+                        <a:rPr lang="en-US" sz="1800" b="1" dirty="0">
                           <a:solidFill>
                             <a:schemeClr val="bg1"/>
                           </a:solidFill>
@@ -6811,7 +6468,7 @@
                     <a:bodyPr/>
                     <a:lstStyle/>
                     <a:p>
-                      <a:endParaRPr lang="en-US" b="1" dirty="0">
+                      <a:endParaRPr lang="en-US" sz="1800" b="1" dirty="0">
                         <a:solidFill>
                           <a:schemeClr val="bg1"/>
                         </a:solidFill>
@@ -6865,7 +6522,7 @@
                     <a:bodyPr/>
                     <a:lstStyle/>
                     <a:p>
-                      <a:endParaRPr lang="en-US" b="1" dirty="0">
+                      <a:endParaRPr lang="en-US" sz="1800" b="1" dirty="0">
                         <a:solidFill>
                           <a:schemeClr val="bg1"/>
                         </a:solidFill>
@@ -6913,7 +6570,7 @@
                     <a:bodyPr/>
                     <a:lstStyle/>
                     <a:p>
-                      <a:endParaRPr lang="en-US" b="1" dirty="0">
+                      <a:endParaRPr lang="en-US" sz="1800" b="1" dirty="0">
                         <a:solidFill>
                           <a:schemeClr val="bg1"/>
                         </a:solidFill>
@@ -6967,7 +6624,7 @@
                     <a:bodyPr/>
                     <a:lstStyle/>
                     <a:p>
-                      <a:endParaRPr lang="en-US" b="1" dirty="0">
+                      <a:endParaRPr lang="en-US" sz="1800" b="1" dirty="0">
                         <a:solidFill>
                           <a:schemeClr val="bg1"/>
                         </a:solidFill>
@@ -7021,7 +6678,7 @@
                     <a:bodyPr/>
                     <a:lstStyle/>
                     <a:p>
-                      <a:endParaRPr lang="en-US" b="1" dirty="0">
+                      <a:endParaRPr lang="en-US" sz="1800" b="1" dirty="0">
                         <a:solidFill>
                           <a:schemeClr val="bg1"/>
                         </a:solidFill>
@@ -7069,7 +6726,7 @@
                     <a:bodyPr/>
                     <a:lstStyle/>
                     <a:p>
-                      <a:endParaRPr lang="en-US" b="1" dirty="0">
+                      <a:endParaRPr lang="en-US" sz="1800" b="1" dirty="0">
                         <a:solidFill>
                           <a:schemeClr val="bg1"/>
                         </a:solidFill>
@@ -7123,7 +6780,7 @@
                     <a:bodyPr/>
                     <a:lstStyle/>
                     <a:p>
-                      <a:endParaRPr lang="en-US" b="1" dirty="0">
+                      <a:endParaRPr lang="en-US" sz="1800" b="1" dirty="0">
                         <a:solidFill>
                           <a:schemeClr val="bg1"/>
                         </a:solidFill>
@@ -7177,7 +6834,7 @@
                     <a:bodyPr/>
                     <a:lstStyle/>
                     <a:p>
-                      <a:endParaRPr lang="en-US" b="1" dirty="0">
+                      <a:endParaRPr lang="en-US" sz="1800" b="1" dirty="0">
                         <a:solidFill>
                           <a:schemeClr val="bg1"/>
                         </a:solidFill>
@@ -7225,7 +6882,7 @@
                     <a:bodyPr/>
                     <a:lstStyle/>
                     <a:p>
-                      <a:endParaRPr lang="en-US" b="1" dirty="0">
+                      <a:endParaRPr lang="en-US" sz="1800" b="1" dirty="0">
                         <a:solidFill>
                           <a:schemeClr val="bg1"/>
                         </a:solidFill>
@@ -7279,7 +6936,7 @@
                     <a:bodyPr/>
                     <a:lstStyle/>
                     <a:p>
-                      <a:endParaRPr lang="en-US" b="1" dirty="0">
+                      <a:endParaRPr lang="en-US" sz="1800" b="1" dirty="0">
                         <a:solidFill>
                           <a:schemeClr val="bg1"/>
                         </a:solidFill>
@@ -7333,7 +6990,7 @@
                     <a:bodyPr/>
                     <a:lstStyle/>
                     <a:p>
-                      <a:endParaRPr lang="en-US" b="1" dirty="0">
+                      <a:endParaRPr lang="en-US" sz="1800" b="1" dirty="0">
                         <a:solidFill>
                           <a:schemeClr val="bg1"/>
                         </a:solidFill>
@@ -7381,7 +7038,7 @@
                     <a:bodyPr/>
                     <a:lstStyle/>
                     <a:p>
-                      <a:endParaRPr lang="en-US" b="1" dirty="0">
+                      <a:endParaRPr lang="en-US" sz="1800" b="1" dirty="0">
                         <a:solidFill>
                           <a:schemeClr val="bg1"/>
                         </a:solidFill>
@@ -7437,7 +7094,7 @@
                     <a:lstStyle/>
                     <a:p>
                       <a:r>
-                        <a:rPr lang="en-US" b="1" dirty="0">
+                        <a:rPr lang="en-US" sz="1800" b="1" dirty="0">
                           <a:solidFill>
                             <a:schemeClr val="bg1"/>
                           </a:solidFill>
@@ -7487,7 +7144,7 @@
                     <a:bodyPr/>
                     <a:lstStyle/>
                     <a:p>
-                      <a:endParaRPr lang="en-US" b="1" dirty="0">
+                      <a:endParaRPr lang="en-US" sz="1800" b="1" dirty="0">
                         <a:solidFill>
                           <a:schemeClr val="bg1"/>
                         </a:solidFill>
@@ -7535,7 +7192,7 @@
                     <a:bodyPr/>
                     <a:lstStyle/>
                     <a:p>
-                      <a:endParaRPr lang="en-US" b="1" dirty="0">
+                      <a:endParaRPr lang="en-US" sz="1800" b="1" dirty="0">
                         <a:solidFill>
                           <a:schemeClr val="bg1"/>
                         </a:solidFill>
@@ -7577,7 +7234,7 @@
                     <a:bodyPr/>
                     <a:lstStyle/>
                     <a:p>
-                      <a:endParaRPr lang="en-US" b="1" dirty="0">
+                      <a:endParaRPr lang="en-US" sz="1800" b="1" dirty="0">
                         <a:solidFill>
                           <a:schemeClr val="bg1"/>
                         </a:solidFill>
@@ -7625,7 +7282,7 @@
                     <a:bodyPr/>
                     <a:lstStyle/>
                     <a:p>
-                      <a:endParaRPr lang="en-US" b="1" dirty="0">
+                      <a:endParaRPr lang="en-US" sz="1800" b="1" dirty="0">
                         <a:solidFill>
                           <a:schemeClr val="bg1"/>
                         </a:solidFill>
@@ -7673,7 +7330,7 @@
                     <a:bodyPr/>
                     <a:lstStyle/>
                     <a:p>
-                      <a:endParaRPr lang="en-US" b="1" dirty="0">
+                      <a:endParaRPr lang="en-US" sz="1800" b="1" dirty="0">
                         <a:solidFill>
                           <a:schemeClr val="bg1"/>
                         </a:solidFill>
@@ -7715,7 +7372,7 @@
                     <a:bodyPr/>
                     <a:lstStyle/>
                     <a:p>
-                      <a:endParaRPr lang="en-US" b="1" dirty="0">
+                      <a:endParaRPr lang="en-US" sz="1800" b="1" dirty="0">
                         <a:solidFill>
                           <a:schemeClr val="bg1"/>
                         </a:solidFill>
@@ -7763,7 +7420,7 @@
                     <a:bodyPr/>
                     <a:lstStyle/>
                     <a:p>
-                      <a:endParaRPr lang="en-US" b="1" dirty="0">
+                      <a:endParaRPr lang="en-US" sz="1800" b="1" dirty="0">
                         <a:solidFill>
                           <a:schemeClr val="bg1"/>
                         </a:solidFill>
@@ -7811,7 +7468,7 @@
                     <a:bodyPr/>
                     <a:lstStyle/>
                     <a:p>
-                      <a:endParaRPr lang="en-US" b="1" dirty="0">
+                      <a:endParaRPr lang="en-US" sz="1800" b="1" dirty="0">
                         <a:solidFill>
                           <a:schemeClr val="bg1"/>
                         </a:solidFill>
@@ -7853,7 +7510,7 @@
                     <a:bodyPr/>
                     <a:lstStyle/>
                     <a:p>
-                      <a:endParaRPr lang="en-US" b="1" dirty="0">
+                      <a:endParaRPr lang="en-US" sz="1800" b="1" dirty="0">
                         <a:solidFill>
                           <a:schemeClr val="bg1"/>
                         </a:solidFill>
@@ -7901,7 +7558,7 @@
                     <a:bodyPr/>
                     <a:lstStyle/>
                     <a:p>
-                      <a:endParaRPr lang="en-US" b="1" dirty="0">
+                      <a:endParaRPr lang="en-US" sz="1800" b="1" dirty="0">
                         <a:solidFill>
                           <a:schemeClr val="bg1"/>
                         </a:solidFill>
@@ -7949,7 +7606,7 @@
                     <a:bodyPr/>
                     <a:lstStyle/>
                     <a:p>
-                      <a:endParaRPr lang="en-US" b="1" dirty="0">
+                      <a:endParaRPr lang="en-US" sz="1800" b="1" dirty="0">
                         <a:solidFill>
                           <a:schemeClr val="bg1"/>
                         </a:solidFill>
@@ -7991,7 +7648,7 @@
                     <a:bodyPr/>
                     <a:lstStyle/>
                     <a:p>
-                      <a:endParaRPr lang="en-US" b="1" dirty="0">
+                      <a:endParaRPr lang="en-US" sz="1800" b="1" dirty="0">
                         <a:solidFill>
                           <a:schemeClr val="bg1"/>
                         </a:solidFill>
@@ -8052,7 +7709,7 @@
         </p:nvSpPr>
         <p:spPr>
           <a:xfrm>
-            <a:off x="781125" y="2812807"/>
+            <a:off x="781125" y="4055828"/>
             <a:ext cx="681100" cy="307777"/>
           </a:xfrm>
           <a:prstGeom prst="rect">
@@ -8092,7 +7749,7 @@
         </p:nvGrpSpPr>
         <p:grpSpPr>
           <a:xfrm>
-            <a:off x="1030239" y="3271908"/>
+            <a:off x="1030239" y="4514924"/>
             <a:ext cx="8053986" cy="261610"/>
             <a:chOff x="966865" y="3942494"/>
             <a:chExt cx="8053986" cy="261610"/>
@@ -8654,7 +8311,7 @@
         </p:nvSpPr>
         <p:spPr>
           <a:xfrm>
-            <a:off x="1661064" y="276791"/>
+            <a:off x="1661064" y="1519807"/>
             <a:ext cx="242230" cy="232560"/>
           </a:xfrm>
           <a:prstGeom prst="ellipse">
@@ -8710,7 +8367,7 @@
         </p:nvSpPr>
         <p:spPr>
           <a:xfrm>
-            <a:off x="2311447" y="276791"/>
+            <a:off x="2311447" y="1519807"/>
             <a:ext cx="242230" cy="232560"/>
           </a:xfrm>
           <a:prstGeom prst="ellipse">
@@ -8766,7 +8423,7 @@
         </p:nvSpPr>
         <p:spPr>
           <a:xfrm>
-            <a:off x="2968636" y="276791"/>
+            <a:off x="2968636" y="1519807"/>
             <a:ext cx="242230" cy="232560"/>
           </a:xfrm>
           <a:prstGeom prst="ellipse">
@@ -8822,7 +8479,7 @@
         </p:nvSpPr>
         <p:spPr>
           <a:xfrm>
-            <a:off x="4274677" y="276791"/>
+            <a:off x="4274677" y="1519807"/>
             <a:ext cx="242230" cy="232560"/>
           </a:xfrm>
           <a:prstGeom prst="ellipse">
@@ -8878,7 +8535,7 @@
         </p:nvSpPr>
         <p:spPr>
           <a:xfrm>
-            <a:off x="4933679" y="276791"/>
+            <a:off x="4933679" y="1519807"/>
             <a:ext cx="242230" cy="232560"/>
           </a:xfrm>
           <a:prstGeom prst="ellipse">
@@ -8934,7 +8591,7 @@
         </p:nvSpPr>
         <p:spPr>
           <a:xfrm>
-            <a:off x="5595315" y="276791"/>
+            <a:off x="5595315" y="1519807"/>
             <a:ext cx="242230" cy="232560"/>
           </a:xfrm>
           <a:prstGeom prst="ellipse">
@@ -8990,7 +8647,7 @@
         </p:nvSpPr>
         <p:spPr>
           <a:xfrm>
-            <a:off x="6251321" y="276791"/>
+            <a:off x="6251321" y="1519807"/>
             <a:ext cx="242230" cy="232560"/>
           </a:xfrm>
           <a:prstGeom prst="ellipse">
@@ -9046,7 +8703,7 @@
         </p:nvSpPr>
         <p:spPr>
           <a:xfrm>
-            <a:off x="6904370" y="276791"/>
+            <a:off x="6904370" y="1519807"/>
             <a:ext cx="242230" cy="232560"/>
           </a:xfrm>
           <a:prstGeom prst="ellipse">
@@ -9102,7 +8759,7 @@
         </p:nvSpPr>
         <p:spPr>
           <a:xfrm>
-            <a:off x="7550652" y="276791"/>
+            <a:off x="7550652" y="1519807"/>
             <a:ext cx="242230" cy="232560"/>
           </a:xfrm>
           <a:prstGeom prst="ellipse">
@@ -9158,7 +8815,7 @@
         </p:nvSpPr>
         <p:spPr>
           <a:xfrm>
-            <a:off x="8209560" y="276791"/>
+            <a:off x="8209560" y="1519807"/>
             <a:ext cx="242230" cy="232560"/>
           </a:xfrm>
           <a:prstGeom prst="ellipse">
@@ -9214,7 +8871,7 @@
         </p:nvSpPr>
         <p:spPr>
           <a:xfrm>
-            <a:off x="8860456" y="276791"/>
+            <a:off x="8860456" y="1519807"/>
             <a:ext cx="242230" cy="232560"/>
           </a:xfrm>
           <a:prstGeom prst="ellipse">
@@ -9270,7 +8927,7 @@
         </p:nvSpPr>
         <p:spPr>
           <a:xfrm>
-            <a:off x="1661064" y="645362"/>
+            <a:off x="1661064" y="1888378"/>
             <a:ext cx="242230" cy="232560"/>
           </a:xfrm>
           <a:prstGeom prst="ellipse">
@@ -9326,7 +8983,7 @@
         </p:nvSpPr>
         <p:spPr>
           <a:xfrm>
-            <a:off x="2968636" y="645362"/>
+            <a:off x="2968636" y="1888378"/>
             <a:ext cx="242230" cy="232560"/>
           </a:xfrm>
           <a:prstGeom prst="ellipse">
@@ -9382,7 +9039,7 @@
         </p:nvSpPr>
         <p:spPr>
           <a:xfrm>
-            <a:off x="5595315" y="645362"/>
+            <a:off x="5595315" y="1888378"/>
             <a:ext cx="242230" cy="232560"/>
           </a:xfrm>
           <a:prstGeom prst="ellipse">
@@ -9438,7 +9095,7 @@
         </p:nvSpPr>
         <p:spPr>
           <a:xfrm>
-            <a:off x="6251321" y="645362"/>
+            <a:off x="6251321" y="1888378"/>
             <a:ext cx="242230" cy="232560"/>
           </a:xfrm>
           <a:prstGeom prst="ellipse">
@@ -9494,7 +9151,7 @@
         </p:nvSpPr>
         <p:spPr>
           <a:xfrm>
-            <a:off x="7550652" y="645362"/>
+            <a:off x="7550652" y="1888378"/>
             <a:ext cx="242230" cy="232560"/>
           </a:xfrm>
           <a:prstGeom prst="ellipse">
@@ -9550,7 +9207,7 @@
         </p:nvSpPr>
         <p:spPr>
           <a:xfrm>
-            <a:off x="8209560" y="645362"/>
+            <a:off x="8209560" y="1888378"/>
             <a:ext cx="242230" cy="232560"/>
           </a:xfrm>
           <a:prstGeom prst="ellipse">
@@ -9606,7 +9263,7 @@
         </p:nvSpPr>
         <p:spPr>
           <a:xfrm>
-            <a:off x="8860456" y="645362"/>
+            <a:off x="8860456" y="1888378"/>
             <a:ext cx="242230" cy="232560"/>
           </a:xfrm>
           <a:prstGeom prst="ellipse">
@@ -9662,7 +9319,7 @@
         </p:nvSpPr>
         <p:spPr>
           <a:xfrm>
-            <a:off x="1661064" y="1003323"/>
+            <a:off x="1661064" y="2246339"/>
             <a:ext cx="242230" cy="232560"/>
           </a:xfrm>
           <a:prstGeom prst="ellipse">
@@ -9718,7 +9375,7 @@
         </p:nvSpPr>
         <p:spPr>
           <a:xfrm>
-            <a:off x="2311447" y="1003323"/>
+            <a:off x="2311447" y="2246339"/>
             <a:ext cx="242230" cy="232560"/>
           </a:xfrm>
           <a:prstGeom prst="ellipse">
@@ -9774,7 +9431,7 @@
         </p:nvSpPr>
         <p:spPr>
           <a:xfrm>
-            <a:off x="2968636" y="1003323"/>
+            <a:off x="2968636" y="2246339"/>
             <a:ext cx="242230" cy="232560"/>
           </a:xfrm>
           <a:prstGeom prst="ellipse">
@@ -9830,7 +9487,7 @@
         </p:nvSpPr>
         <p:spPr>
           <a:xfrm>
-            <a:off x="3628395" y="1003323"/>
+            <a:off x="3628395" y="2246339"/>
             <a:ext cx="242230" cy="232560"/>
           </a:xfrm>
           <a:prstGeom prst="ellipse">
@@ -9886,7 +9543,7 @@
         </p:nvSpPr>
         <p:spPr>
           <a:xfrm>
-            <a:off x="4274677" y="1003323"/>
+            <a:off x="4274677" y="2246339"/>
             <a:ext cx="242230" cy="232560"/>
           </a:xfrm>
           <a:prstGeom prst="ellipse">
@@ -9942,7 +9599,7 @@
         </p:nvSpPr>
         <p:spPr>
           <a:xfrm>
-            <a:off x="1661064" y="1375045"/>
+            <a:off x="1661064" y="2618061"/>
             <a:ext cx="242230" cy="232560"/>
           </a:xfrm>
           <a:prstGeom prst="ellipse">
@@ -9998,7 +9655,7 @@
         </p:nvSpPr>
         <p:spPr>
           <a:xfrm>
-            <a:off x="2968636" y="1375045"/>
+            <a:off x="2968636" y="2618061"/>
             <a:ext cx="242230" cy="232560"/>
           </a:xfrm>
           <a:prstGeom prst="ellipse">
@@ -10054,7 +9711,7 @@
         </p:nvSpPr>
         <p:spPr>
           <a:xfrm>
-            <a:off x="4274677" y="1375045"/>
+            <a:off x="4274677" y="2618061"/>
             <a:ext cx="242230" cy="232560"/>
           </a:xfrm>
           <a:prstGeom prst="ellipse">
@@ -10110,7 +9767,7 @@
         </p:nvSpPr>
         <p:spPr>
           <a:xfrm>
-            <a:off x="4933679" y="1375045"/>
+            <a:off x="4933679" y="2618061"/>
             <a:ext cx="242230" cy="232560"/>
           </a:xfrm>
           <a:prstGeom prst="ellipse">
@@ -10166,7 +9823,7 @@
         </p:nvSpPr>
         <p:spPr>
           <a:xfrm>
-            <a:off x="1661064" y="1746515"/>
+            <a:off x="1661064" y="2989531"/>
             <a:ext cx="242230" cy="232560"/>
           </a:xfrm>
           <a:prstGeom prst="ellipse">
@@ -10222,7 +9879,7 @@
         </p:nvSpPr>
         <p:spPr>
           <a:xfrm>
-            <a:off x="2311447" y="1746515"/>
+            <a:off x="2311447" y="2989531"/>
             <a:ext cx="242230" cy="232560"/>
           </a:xfrm>
           <a:prstGeom prst="ellipse">
@@ -10278,7 +9935,7 @@
         </p:nvSpPr>
         <p:spPr>
           <a:xfrm>
-            <a:off x="2968636" y="1746515"/>
+            <a:off x="2968636" y="2989531"/>
             <a:ext cx="242230" cy="232560"/>
           </a:xfrm>
           <a:prstGeom prst="ellipse">
@@ -10334,7 +9991,7 @@
         </p:nvSpPr>
         <p:spPr>
           <a:xfrm>
-            <a:off x="3628395" y="1746515"/>
+            <a:off x="3628395" y="2989531"/>
             <a:ext cx="242230" cy="232560"/>
           </a:xfrm>
           <a:prstGeom prst="ellipse">
@@ -10390,7 +10047,7 @@
         </p:nvSpPr>
         <p:spPr>
           <a:xfrm>
-            <a:off x="4274677" y="1746515"/>
+            <a:off x="4274677" y="2989531"/>
             <a:ext cx="242230" cy="232560"/>
           </a:xfrm>
           <a:prstGeom prst="ellipse">
@@ -10446,7 +10103,7 @@
         </p:nvSpPr>
         <p:spPr>
           <a:xfrm>
-            <a:off x="4933679" y="1746515"/>
+            <a:off x="4933679" y="2989531"/>
             <a:ext cx="242230" cy="232560"/>
           </a:xfrm>
           <a:prstGeom prst="ellipse">
@@ -10502,7 +10159,7 @@
         </p:nvSpPr>
         <p:spPr>
           <a:xfrm>
-            <a:off x="1661064" y="2103786"/>
+            <a:off x="1661064" y="3346802"/>
             <a:ext cx="242230" cy="232560"/>
           </a:xfrm>
           <a:prstGeom prst="ellipse">
@@ -10558,7 +10215,7 @@
         </p:nvSpPr>
         <p:spPr>
           <a:xfrm>
-            <a:off x="2311447" y="2103786"/>
+            <a:off x="2311447" y="3346802"/>
             <a:ext cx="242230" cy="232560"/>
           </a:xfrm>
           <a:prstGeom prst="ellipse">
@@ -10614,7 +10271,7 @@
         </p:nvSpPr>
         <p:spPr>
           <a:xfrm>
-            <a:off x="2968636" y="2103786"/>
+            <a:off x="2968636" y="3346802"/>
             <a:ext cx="242230" cy="232560"/>
           </a:xfrm>
           <a:prstGeom prst="ellipse">
@@ -10670,7 +10327,7 @@
         </p:nvSpPr>
         <p:spPr>
           <a:xfrm>
-            <a:off x="3628395" y="2103786"/>
+            <a:off x="3628395" y="3346802"/>
             <a:ext cx="242230" cy="232560"/>
           </a:xfrm>
           <a:prstGeom prst="ellipse">
@@ -10726,7 +10383,7 @@
         </p:nvSpPr>
         <p:spPr>
           <a:xfrm>
-            <a:off x="4933679" y="2103786"/>
+            <a:off x="4933679" y="3346802"/>
             <a:ext cx="242230" cy="232560"/>
           </a:xfrm>
           <a:prstGeom prst="ellipse">
@@ -10782,7 +10439,7 @@
         </p:nvSpPr>
         <p:spPr>
           <a:xfrm>
-            <a:off x="5595315" y="2103786"/>
+            <a:off x="5595315" y="3346802"/>
             <a:ext cx="242230" cy="232560"/>
           </a:xfrm>
           <a:prstGeom prst="ellipse">
@@ -10838,7 +10495,7 @@
         </p:nvSpPr>
         <p:spPr>
           <a:xfrm>
-            <a:off x="6251321" y="2103786"/>
+            <a:off x="6251321" y="3346802"/>
             <a:ext cx="242230" cy="232560"/>
           </a:xfrm>
           <a:prstGeom prst="ellipse">
@@ -10894,7 +10551,7 @@
         </p:nvSpPr>
         <p:spPr>
           <a:xfrm>
-            <a:off x="6904370" y="2103786"/>
+            <a:off x="6904370" y="3346802"/>
             <a:ext cx="242230" cy="232560"/>
           </a:xfrm>
           <a:prstGeom prst="ellipse">
@@ -10950,7 +10607,7 @@
         </p:nvSpPr>
         <p:spPr>
           <a:xfrm>
-            <a:off x="7550652" y="2103786"/>
+            <a:off x="7550652" y="3346802"/>
             <a:ext cx="242230" cy="232560"/>
           </a:xfrm>
           <a:prstGeom prst="ellipse">
@@ -11006,7 +10663,7 @@
         </p:nvSpPr>
         <p:spPr>
           <a:xfrm>
-            <a:off x="8209560" y="2103786"/>
+            <a:off x="8209560" y="3346802"/>
             <a:ext cx="242230" cy="232560"/>
           </a:xfrm>
           <a:prstGeom prst="ellipse">
@@ -11062,7 +10719,7 @@
         </p:nvSpPr>
         <p:spPr>
           <a:xfrm>
-            <a:off x="8860456" y="2103786"/>
+            <a:off x="8860456" y="3346802"/>
             <a:ext cx="242230" cy="232560"/>
           </a:xfrm>
           <a:prstGeom prst="ellipse">
@@ -11118,7 +10775,7 @@
         </p:nvSpPr>
         <p:spPr>
           <a:xfrm rot="5400000">
-            <a:off x="1528472" y="2813895"/>
+            <a:off x="1528472" y="4056911"/>
             <a:ext cx="530568" cy="303028"/>
           </a:xfrm>
           <a:prstGeom prst="roundRect">
@@ -11176,7 +10833,7 @@
         </p:nvSpPr>
         <p:spPr>
           <a:xfrm rot="5400000">
-            <a:off x="2182995" y="2813895"/>
+            <a:off x="2182995" y="4056911"/>
             <a:ext cx="530568" cy="303028"/>
           </a:xfrm>
           <a:prstGeom prst="roundRect">
@@ -11234,7 +10891,7 @@
         </p:nvSpPr>
         <p:spPr>
           <a:xfrm rot="5400000">
-            <a:off x="2837518" y="2813895"/>
+            <a:off x="2837518" y="4056911"/>
             <a:ext cx="530568" cy="303028"/>
           </a:xfrm>
           <a:prstGeom prst="roundRect">
@@ -11292,7 +10949,7 @@
         </p:nvSpPr>
         <p:spPr>
           <a:xfrm rot="5400000">
-            <a:off x="3492041" y="2813895"/>
+            <a:off x="3492041" y="4056911"/>
             <a:ext cx="530568" cy="303028"/>
           </a:xfrm>
           <a:prstGeom prst="roundRect">
@@ -11350,7 +11007,7 @@
         </p:nvSpPr>
         <p:spPr>
           <a:xfrm rot="5400000">
-            <a:off x="4146564" y="2813895"/>
+            <a:off x="4146564" y="4056911"/>
             <a:ext cx="530568" cy="303028"/>
           </a:xfrm>
           <a:prstGeom prst="roundRect">
@@ -11408,7 +11065,7 @@
         </p:nvSpPr>
         <p:spPr>
           <a:xfrm rot="5400000">
-            <a:off x="4801087" y="2813895"/>
+            <a:off x="4801087" y="4056911"/>
             <a:ext cx="530568" cy="303028"/>
           </a:xfrm>
           <a:prstGeom prst="roundRect">
@@ -11466,7 +11123,7 @@
         </p:nvSpPr>
         <p:spPr>
           <a:xfrm rot="5400000">
-            <a:off x="5455610" y="2813895"/>
+            <a:off x="5455610" y="4056911"/>
             <a:ext cx="530568" cy="303028"/>
           </a:xfrm>
           <a:prstGeom prst="roundRect">
@@ -11524,7 +11181,7 @@
         </p:nvSpPr>
         <p:spPr>
           <a:xfrm rot="5400000">
-            <a:off x="6110133" y="2813895"/>
+            <a:off x="6110133" y="4056911"/>
             <a:ext cx="530568" cy="303028"/>
           </a:xfrm>
           <a:prstGeom prst="roundRect">
@@ -11582,7 +11239,7 @@
         </p:nvSpPr>
         <p:spPr>
           <a:xfrm rot="5400000">
-            <a:off x="6764656" y="2813895"/>
+            <a:off x="6764656" y="4056911"/>
             <a:ext cx="530568" cy="303028"/>
           </a:xfrm>
           <a:prstGeom prst="roundRect">
@@ -11640,7 +11297,7 @@
         </p:nvSpPr>
         <p:spPr>
           <a:xfrm rot="5400000">
-            <a:off x="7419179" y="2813895"/>
+            <a:off x="7419179" y="4056911"/>
             <a:ext cx="530568" cy="303028"/>
           </a:xfrm>
           <a:prstGeom prst="roundRect">
@@ -11698,7 +11355,7 @@
         </p:nvSpPr>
         <p:spPr>
           <a:xfrm rot="5400000">
-            <a:off x="8073702" y="2813895"/>
+            <a:off x="8073702" y="4056911"/>
             <a:ext cx="530568" cy="303028"/>
           </a:xfrm>
           <a:prstGeom prst="roundRect">
@@ -11756,7 +11413,7 @@
         </p:nvSpPr>
         <p:spPr>
           <a:xfrm rot="5400000">
-            <a:off x="8728225" y="2813895"/>
+            <a:off x="8728225" y="4056911"/>
             <a:ext cx="530568" cy="303028"/>
           </a:xfrm>
           <a:prstGeom prst="roundRect">
@@ -11814,7 +11471,7 @@
         </p:nvSpPr>
         <p:spPr>
           <a:xfrm>
-            <a:off x="1469721" y="2384671"/>
+            <a:off x="1469726" y="3627687"/>
             <a:ext cx="1958429" cy="58746"/>
           </a:xfrm>
           <a:prstGeom prst="roundRect">
@@ -11866,7 +11523,7 @@
         </p:nvSpPr>
         <p:spPr>
           <a:xfrm>
-            <a:off x="3435188" y="2384690"/>
+            <a:off x="3435193" y="3627706"/>
             <a:ext cx="1958429" cy="58746"/>
           </a:xfrm>
           <a:prstGeom prst="roundRect">
@@ -11918,7 +11575,7 @@
         </p:nvSpPr>
         <p:spPr>
           <a:xfrm>
-            <a:off x="5391555" y="2390370"/>
+            <a:off x="5391560" y="3633386"/>
             <a:ext cx="1958429" cy="58746"/>
           </a:xfrm>
           <a:prstGeom prst="roundRect">
@@ -11970,7 +11627,7 @@
         </p:nvSpPr>
         <p:spPr>
           <a:xfrm>
-            <a:off x="7357022" y="2390389"/>
+            <a:off x="7357027" y="3633405"/>
             <a:ext cx="1958429" cy="58746"/>
           </a:xfrm>
           <a:prstGeom prst="roundRect">
@@ -12022,7 +11679,7 @@
         </p:nvSpPr>
         <p:spPr>
           <a:xfrm rot="5400000">
-            <a:off x="1877851" y="3838825"/>
+            <a:off x="1877851" y="5081841"/>
             <a:ext cx="530568" cy="303028"/>
           </a:xfrm>
           <a:prstGeom prst="roundRect">
@@ -12080,7 +11737,7 @@
         </p:nvSpPr>
         <p:spPr>
           <a:xfrm>
-            <a:off x="1341079" y="4010171"/>
+            <a:off x="1341079" y="5253187"/>
             <a:ext cx="655360" cy="261610"/>
           </a:xfrm>
           <a:prstGeom prst="rect">
@@ -12120,7 +11777,7 @@
         </p:nvSpPr>
         <p:spPr>
           <a:xfrm>
-            <a:off x="1345392" y="3711020"/>
+            <a:off x="1345392" y="4954036"/>
             <a:ext cx="655360" cy="261610"/>
           </a:xfrm>
           <a:prstGeom prst="rect">
@@ -12160,7 +11817,7 @@
         </p:nvSpPr>
         <p:spPr>
           <a:xfrm rot="5400000">
-            <a:off x="2838560" y="3838825"/>
+            <a:off x="2838560" y="5081841"/>
             <a:ext cx="530568" cy="303028"/>
           </a:xfrm>
           <a:prstGeom prst="roundRect">
@@ -12218,7 +11875,7 @@
         </p:nvSpPr>
         <p:spPr>
           <a:xfrm>
-            <a:off x="2308317" y="4010171"/>
+            <a:off x="2308317" y="5253187"/>
             <a:ext cx="655360" cy="261610"/>
           </a:xfrm>
           <a:prstGeom prst="rect">
@@ -12258,7 +11915,7 @@
         </p:nvSpPr>
         <p:spPr>
           <a:xfrm>
-            <a:off x="2308317" y="3711020"/>
+            <a:off x="2308317" y="4954036"/>
             <a:ext cx="655360" cy="261610"/>
           </a:xfrm>
           <a:prstGeom prst="rect">
@@ -12298,7 +11955,7 @@
         </p:nvSpPr>
         <p:spPr>
           <a:xfrm rot="16200000">
-            <a:off x="3848997" y="3837092"/>
+            <a:off x="3848997" y="5080108"/>
             <a:ext cx="530568" cy="303028"/>
           </a:xfrm>
           <a:prstGeom prst="roundRect">
@@ -12359,7 +12016,7 @@
         </p:nvSpPr>
         <p:spPr>
           <a:xfrm>
-            <a:off x="3376925" y="3861325"/>
+            <a:off x="3376930" y="5104341"/>
             <a:ext cx="594971" cy="261610"/>
           </a:xfrm>
           <a:prstGeom prst="rect">
@@ -12399,7 +12056,7 @@
         </p:nvSpPr>
         <p:spPr>
           <a:xfrm rot="16200000">
-            <a:off x="4859036" y="3837092"/>
+            <a:off x="4859036" y="5080108"/>
             <a:ext cx="530568" cy="303028"/>
           </a:xfrm>
           <a:prstGeom prst="roundRect">
@@ -12460,7 +12117,7 @@
         </p:nvSpPr>
         <p:spPr>
           <a:xfrm>
-            <a:off x="4346627" y="3861325"/>
+            <a:off x="4346627" y="5104341"/>
             <a:ext cx="635308" cy="261610"/>
           </a:xfrm>
           <a:prstGeom prst="rect">
@@ -12500,7 +12157,7 @@
         </p:nvSpPr>
         <p:spPr>
           <a:xfrm rot="16200000">
-            <a:off x="5788243" y="3837092"/>
+            <a:off x="5788243" y="5080108"/>
             <a:ext cx="530568" cy="303028"/>
           </a:xfrm>
           <a:prstGeom prst="roundRect">
@@ -12561,7 +12218,7 @@
         </p:nvSpPr>
         <p:spPr>
           <a:xfrm>
-            <a:off x="5342740" y="3861325"/>
+            <a:off x="5342745" y="5104341"/>
             <a:ext cx="564089" cy="261610"/>
           </a:xfrm>
           <a:prstGeom prst="rect">
@@ -12601,7 +12258,7 @@
         </p:nvSpPr>
         <p:spPr>
           <a:xfrm rot="16200000">
-            <a:off x="6926168" y="3837669"/>
+            <a:off x="6926168" y="5080685"/>
             <a:ext cx="530568" cy="303028"/>
           </a:xfrm>
           <a:prstGeom prst="roundRect">
@@ -12662,7 +12319,7 @@
         </p:nvSpPr>
         <p:spPr>
           <a:xfrm>
-            <a:off x="6299653" y="3861325"/>
+            <a:off x="6299658" y="5104341"/>
             <a:ext cx="745101" cy="261610"/>
           </a:xfrm>
           <a:prstGeom prst="rect">
@@ -12702,7 +12359,7 @@
         </p:nvSpPr>
         <p:spPr>
           <a:xfrm rot="16200000">
-            <a:off x="8125129" y="3837045"/>
+            <a:off x="8125129" y="5080061"/>
             <a:ext cx="530568" cy="303028"/>
           </a:xfrm>
           <a:prstGeom prst="roundRect">
@@ -12763,7 +12420,7 @@
         </p:nvSpPr>
         <p:spPr>
           <a:xfrm>
-            <a:off x="7486404" y="3785313"/>
+            <a:off x="7486409" y="5028334"/>
             <a:ext cx="760365" cy="430887"/>
           </a:xfrm>
           <a:prstGeom prst="rect">
@@ -12803,7 +12460,7 @@
         </p:nvSpPr>
         <p:spPr>
           <a:xfrm rot="16200000">
-            <a:off x="9318111" y="3837092"/>
+            <a:off x="9318111" y="5080108"/>
             <a:ext cx="530568" cy="303028"/>
           </a:xfrm>
           <a:prstGeom prst="roundRect">
@@ -12864,7 +12521,7 @@
         </p:nvSpPr>
         <p:spPr>
           <a:xfrm>
-            <a:off x="8680972" y="3861325"/>
+            <a:off x="8680977" y="5104341"/>
             <a:ext cx="755725" cy="261610"/>
           </a:xfrm>
           <a:prstGeom prst="rect">
@@ -12904,7 +12561,7 @@
         </p:nvSpPr>
         <p:spPr>
           <a:xfrm rot="16200000">
-            <a:off x="10555234" y="3835681"/>
+            <a:off x="10555234" y="5078697"/>
             <a:ext cx="530568" cy="303028"/>
           </a:xfrm>
           <a:prstGeom prst="roundRect">
@@ -12965,7 +12622,7 @@
         </p:nvSpPr>
         <p:spPr>
           <a:xfrm>
-            <a:off x="9949246" y="3785313"/>
+            <a:off x="9949251" y="5028334"/>
             <a:ext cx="722989" cy="430887"/>
           </a:xfrm>
           <a:prstGeom prst="rect">
@@ -13005,7 +12662,7 @@
         </p:nvGrpSpPr>
         <p:grpSpPr>
           <a:xfrm>
-            <a:off x="1030239" y="4344893"/>
+            <a:off x="1030244" y="5587909"/>
             <a:ext cx="9878333" cy="261610"/>
             <a:chOff x="966865" y="5034731"/>
             <a:chExt cx="9878333" cy="261610"/>
@@ -13426,7 +13083,7 @@
         </p:nvSpPr>
         <p:spPr>
           <a:xfrm>
-            <a:off x="778897" y="3834716"/>
+            <a:off x="778897" y="5077737"/>
             <a:ext cx="681100" cy="307777"/>
           </a:xfrm>
           <a:prstGeom prst="rect">
@@ -13468,7 +13125,7 @@
         </p:nvCxnSpPr>
         <p:spPr>
           <a:xfrm>
-            <a:off x="1469721" y="2618569"/>
+            <a:off x="1469721" y="3861590"/>
             <a:ext cx="0" cy="898595"/>
           </a:xfrm>
           <a:prstGeom prst="line">
@@ -13509,7 +13166,7 @@
         </p:nvSpPr>
         <p:spPr>
           <a:xfrm>
-            <a:off x="9498374" y="129406"/>
+            <a:off x="9498379" y="1372422"/>
             <a:ext cx="1467293" cy="2781274"/>
           </a:xfrm>
           <a:prstGeom prst="rect">
@@ -13675,7 +13332,7 @@
         </p:nvCxnSpPr>
         <p:spPr>
           <a:xfrm>
-            <a:off x="9490214" y="212651"/>
+            <a:off x="9490214" y="1455667"/>
             <a:ext cx="0" cy="3316054"/>
           </a:xfrm>
           <a:prstGeom prst="line">
@@ -13718,7 +13375,7 @@
         </p:nvCxnSpPr>
         <p:spPr>
           <a:xfrm flipH="1">
-            <a:off x="9490214" y="2920769"/>
+            <a:off x="9490219" y="4163785"/>
             <a:ext cx="1846001" cy="0"/>
           </a:xfrm>
           <a:prstGeom prst="line">
@@ -13760,13 +13417,13 @@
           <p:nvPr>
             <p:extLst>
               <p:ext uri="{D42A27DB-BD31-4B8C-83A1-F6EECF244321}">
-                <p14:modId xmlns:p14="http://schemas.microsoft.com/office/powerpoint/2010/main" val="935280299"/>
+                <p14:modId xmlns:p14="http://schemas.microsoft.com/office/powerpoint/2010/main" val="1340076104"/>
               </p:ext>
             </p:extLst>
           </p:nvPr>
         </p:nvGraphicFramePr>
         <p:xfrm>
-          <a:off x="9487745" y="2975680"/>
+          <a:off x="9487745" y="4218696"/>
           <a:ext cx="2073348" cy="619396"/>
         </p:xfrm>
         <a:graphic>
@@ -13979,7 +13636,7 @@
         </p:nvSpPr>
         <p:spPr>
           <a:xfrm>
-            <a:off x="10556944" y="220516"/>
+            <a:off x="10556944" y="1463532"/>
             <a:ext cx="242230" cy="232560"/>
           </a:xfrm>
           <a:prstGeom prst="ellipse">
@@ -14035,7 +13692,7 @@
         </p:nvSpPr>
         <p:spPr>
           <a:xfrm>
-            <a:off x="10556944" y="523546"/>
+            <a:off x="10556944" y="1766562"/>
             <a:ext cx="242230" cy="232560"/>
           </a:xfrm>
           <a:prstGeom prst="ellipse">
@@ -14091,7 +13748,7 @@
         </p:nvSpPr>
         <p:spPr>
           <a:xfrm>
-            <a:off x="10556944" y="823079"/>
+            <a:off x="10556944" y="2066095"/>
             <a:ext cx="242230" cy="232560"/>
           </a:xfrm>
           <a:prstGeom prst="ellipse">
@@ -14147,7 +13804,7 @@
         </p:nvSpPr>
         <p:spPr>
           <a:xfrm>
-            <a:off x="10556944" y="1424991"/>
+            <a:off x="10556944" y="2668007"/>
             <a:ext cx="242230" cy="232560"/>
           </a:xfrm>
           <a:prstGeom prst="ellipse">
@@ -14203,7 +13860,7 @@
         </p:nvSpPr>
         <p:spPr>
           <a:xfrm>
-            <a:off x="10556944" y="1733098"/>
+            <a:off x="10556944" y="2976114"/>
             <a:ext cx="242230" cy="232560"/>
           </a:xfrm>
           <a:prstGeom prst="ellipse">
@@ -14259,7 +13916,7 @@
         </p:nvSpPr>
         <p:spPr>
           <a:xfrm>
-            <a:off x="10556944" y="2020318"/>
+            <a:off x="10556944" y="3263334"/>
             <a:ext cx="242230" cy="232560"/>
           </a:xfrm>
           <a:prstGeom prst="ellipse">
@@ -14315,7 +13972,7 @@
         </p:nvSpPr>
         <p:spPr>
           <a:xfrm>
-            <a:off x="10556944" y="2315130"/>
+            <a:off x="10556944" y="3558146"/>
             <a:ext cx="242230" cy="232560"/>
           </a:xfrm>
           <a:prstGeom prst="ellipse">
@@ -14371,7 +14028,7 @@
         </p:nvSpPr>
         <p:spPr>
           <a:xfrm>
-            <a:off x="703476" y="5651038"/>
+            <a:off x="703481" y="8046133"/>
             <a:ext cx="2924919" cy="523220"/>
           </a:xfrm>
           <a:prstGeom prst="rect">
@@ -14413,7 +14070,7 @@
         </p:nvCxnSpPr>
         <p:spPr>
           <a:xfrm flipH="1">
-            <a:off x="815652" y="5588567"/>
+            <a:off x="815652" y="7984786"/>
             <a:ext cx="10508840" cy="0"/>
           </a:xfrm>
           <a:prstGeom prst="line">
@@ -14454,7 +14111,7 @@
         </p:nvSpPr>
         <p:spPr>
           <a:xfrm>
-            <a:off x="10556944" y="1118365"/>
+            <a:off x="10556944" y="2361381"/>
             <a:ext cx="242230" cy="232560"/>
           </a:xfrm>
           <a:prstGeom prst="ellipse">
@@ -14510,7 +14167,7 @@
         </p:nvGrpSpPr>
         <p:grpSpPr>
           <a:xfrm>
-            <a:off x="10084132" y="2976640"/>
+            <a:off x="10084137" y="4219661"/>
             <a:ext cx="1087059" cy="550707"/>
             <a:chOff x="10020758" y="3580593"/>
             <a:chExt cx="1087059" cy="550707"/>
@@ -14755,7 +14412,7 @@
         </p:nvSpPr>
         <p:spPr>
           <a:xfrm>
-            <a:off x="2311447" y="645362"/>
+            <a:off x="2311447" y="1888378"/>
             <a:ext cx="242230" cy="232560"/>
           </a:xfrm>
           <a:prstGeom prst="ellipse">
@@ -14811,7 +14468,7 @@
         </p:nvSpPr>
         <p:spPr>
           <a:xfrm>
-            <a:off x="2311447" y="1375045"/>
+            <a:off x="2311447" y="2618061"/>
             <a:ext cx="242230" cy="232560"/>
           </a:xfrm>
           <a:prstGeom prst="ellipse">
@@ -14867,7 +14524,7 @@
         </p:nvSpPr>
         <p:spPr>
           <a:xfrm>
-            <a:off x="3628395" y="276791"/>
+            <a:off x="3628395" y="1519807"/>
             <a:ext cx="242230" cy="232560"/>
           </a:xfrm>
           <a:prstGeom prst="ellipse">
@@ -14923,7 +14580,7 @@
         </p:nvSpPr>
         <p:spPr>
           <a:xfrm>
-            <a:off x="4274677" y="645362"/>
+            <a:off x="4274677" y="1888378"/>
             <a:ext cx="242230" cy="232560"/>
           </a:xfrm>
           <a:prstGeom prst="ellipse">
@@ -14979,7 +14636,7 @@
         </p:nvSpPr>
         <p:spPr>
           <a:xfrm>
-            <a:off x="4933679" y="645362"/>
+            <a:off x="4933679" y="1888378"/>
             <a:ext cx="242230" cy="232560"/>
           </a:xfrm>
           <a:prstGeom prst="ellipse">
@@ -15035,7 +14692,7 @@
         </p:nvSpPr>
         <p:spPr>
           <a:xfrm>
-            <a:off x="3628395" y="645362"/>
+            <a:off x="3628395" y="1888378"/>
             <a:ext cx="242230" cy="232560"/>
           </a:xfrm>
           <a:prstGeom prst="ellipse">
@@ -15091,7 +14748,7 @@
         </p:nvSpPr>
         <p:spPr>
           <a:xfrm>
-            <a:off x="4933679" y="1003323"/>
+            <a:off x="4933679" y="2246339"/>
             <a:ext cx="242230" cy="232560"/>
           </a:xfrm>
           <a:prstGeom prst="ellipse">
@@ -15147,7 +14804,7 @@
         </p:nvSpPr>
         <p:spPr>
           <a:xfrm>
-            <a:off x="6904370" y="645362"/>
+            <a:off x="6904370" y="1888378"/>
             <a:ext cx="242230" cy="232560"/>
           </a:xfrm>
           <a:prstGeom prst="ellipse">
@@ -15203,7 +14860,7 @@
         </p:nvSpPr>
         <p:spPr>
           <a:xfrm>
-            <a:off x="5595315" y="1003323"/>
+            <a:off x="5595315" y="2246339"/>
             <a:ext cx="242230" cy="232560"/>
           </a:xfrm>
           <a:prstGeom prst="ellipse">
@@ -15259,7 +14916,7 @@
         </p:nvSpPr>
         <p:spPr>
           <a:xfrm>
-            <a:off x="6251321" y="1003323"/>
+            <a:off x="6251321" y="2246339"/>
             <a:ext cx="242230" cy="232560"/>
           </a:xfrm>
           <a:prstGeom prst="ellipse">
@@ -15315,7 +14972,7 @@
         </p:nvSpPr>
         <p:spPr>
           <a:xfrm>
-            <a:off x="6904370" y="1003323"/>
+            <a:off x="6904370" y="2246339"/>
             <a:ext cx="242230" cy="232560"/>
           </a:xfrm>
           <a:prstGeom prst="ellipse">
@@ -15371,7 +15028,7 @@
         </p:nvSpPr>
         <p:spPr>
           <a:xfrm>
-            <a:off x="7550652" y="1003323"/>
+            <a:off x="7550652" y="2246339"/>
             <a:ext cx="242230" cy="232560"/>
           </a:xfrm>
           <a:prstGeom prst="ellipse">
@@ -15427,7 +15084,7 @@
         </p:nvSpPr>
         <p:spPr>
           <a:xfrm>
-            <a:off x="8209560" y="1003323"/>
+            <a:off x="8209560" y="2246339"/>
             <a:ext cx="242230" cy="232560"/>
           </a:xfrm>
           <a:prstGeom prst="ellipse">
@@ -15483,7 +15140,7 @@
         </p:nvSpPr>
         <p:spPr>
           <a:xfrm>
-            <a:off x="8860456" y="1003323"/>
+            <a:off x="8860456" y="2246339"/>
             <a:ext cx="242230" cy="232560"/>
           </a:xfrm>
           <a:prstGeom prst="ellipse">
@@ -15539,7 +15196,7 @@
         </p:nvSpPr>
         <p:spPr>
           <a:xfrm>
-            <a:off x="5595315" y="1375045"/>
+            <a:off x="5595315" y="2618061"/>
             <a:ext cx="242230" cy="232560"/>
           </a:xfrm>
           <a:prstGeom prst="ellipse">
@@ -15595,7 +15252,7 @@
         </p:nvSpPr>
         <p:spPr>
           <a:xfrm>
-            <a:off x="6251321" y="1375045"/>
+            <a:off x="6251321" y="2618061"/>
             <a:ext cx="242230" cy="232560"/>
           </a:xfrm>
           <a:prstGeom prst="ellipse">
@@ -15651,7 +15308,7 @@
         </p:nvSpPr>
         <p:spPr>
           <a:xfrm>
-            <a:off x="7550652" y="1375045"/>
+            <a:off x="7550652" y="2618061"/>
             <a:ext cx="242230" cy="232560"/>
           </a:xfrm>
           <a:prstGeom prst="ellipse">
@@ -15707,7 +15364,7 @@
         </p:nvSpPr>
         <p:spPr>
           <a:xfrm>
-            <a:off x="8209560" y="1375045"/>
+            <a:off x="8209560" y="2618061"/>
             <a:ext cx="242230" cy="232560"/>
           </a:xfrm>
           <a:prstGeom prst="ellipse">
@@ -15763,7 +15420,7 @@
         </p:nvSpPr>
         <p:spPr>
           <a:xfrm>
-            <a:off x="8860456" y="1375045"/>
+            <a:off x="8860456" y="2618061"/>
             <a:ext cx="242230" cy="232560"/>
           </a:xfrm>
           <a:prstGeom prst="ellipse">
@@ -15819,7 +15476,7 @@
         </p:nvSpPr>
         <p:spPr>
           <a:xfrm>
-            <a:off x="6904370" y="1375045"/>
+            <a:off x="6904370" y="2618061"/>
             <a:ext cx="242230" cy="232560"/>
           </a:xfrm>
           <a:prstGeom prst="ellipse">
@@ -15875,7 +15532,7 @@
         </p:nvSpPr>
         <p:spPr>
           <a:xfrm>
-            <a:off x="5595315" y="1746515"/>
+            <a:off x="5595315" y="2989531"/>
             <a:ext cx="242230" cy="232560"/>
           </a:xfrm>
           <a:prstGeom prst="ellipse">
@@ -15931,7 +15588,7 @@
         </p:nvSpPr>
         <p:spPr>
           <a:xfrm>
-            <a:off x="6251321" y="1746515"/>
+            <a:off x="6251321" y="2989531"/>
             <a:ext cx="242230" cy="232560"/>
           </a:xfrm>
           <a:prstGeom prst="ellipse">
@@ -15987,7 +15644,7 @@
         </p:nvSpPr>
         <p:spPr>
           <a:xfrm>
-            <a:off x="6904370" y="1746515"/>
+            <a:off x="6904370" y="2989531"/>
             <a:ext cx="242230" cy="232560"/>
           </a:xfrm>
           <a:prstGeom prst="ellipse">
@@ -16043,7 +15700,7 @@
         </p:nvSpPr>
         <p:spPr>
           <a:xfrm>
-            <a:off x="7550652" y="1746515"/>
+            <a:off x="7550652" y="2989531"/>
             <a:ext cx="242230" cy="232560"/>
           </a:xfrm>
           <a:prstGeom prst="ellipse">
@@ -16099,7 +15756,7 @@
         </p:nvSpPr>
         <p:spPr>
           <a:xfrm>
-            <a:off x="8209560" y="1746515"/>
+            <a:off x="8209560" y="2989531"/>
             <a:ext cx="242230" cy="232560"/>
           </a:xfrm>
           <a:prstGeom prst="ellipse">
@@ -16155,7 +15812,7 @@
         </p:nvSpPr>
         <p:spPr>
           <a:xfrm>
-            <a:off x="8860456" y="1746515"/>
+            <a:off x="8860456" y="2989531"/>
             <a:ext cx="242230" cy="232560"/>
           </a:xfrm>
           <a:prstGeom prst="ellipse">
@@ -16211,7 +15868,7 @@
         </p:nvSpPr>
         <p:spPr>
           <a:xfrm>
-            <a:off x="3628395" y="1375045"/>
+            <a:off x="3628395" y="2618061"/>
             <a:ext cx="242230" cy="232560"/>
           </a:xfrm>
           <a:prstGeom prst="ellipse">
@@ -16267,7 +15924,7 @@
         </p:nvSpPr>
         <p:spPr>
           <a:xfrm>
-            <a:off x="4274677" y="2103786"/>
+            <a:off x="4274677" y="3346802"/>
             <a:ext cx="242230" cy="232560"/>
           </a:xfrm>
           <a:prstGeom prst="ellipse">
@@ -16325,7 +15982,7 @@
         </p:nvCxnSpPr>
         <p:spPr>
           <a:xfrm>
-            <a:off x="1469721" y="3665595"/>
+            <a:off x="1469721" y="4908611"/>
             <a:ext cx="0" cy="924678"/>
           </a:xfrm>
           <a:prstGeom prst="line">
@@ -16366,7 +16023,7 @@
         </p:nvGrpSpPr>
         <p:grpSpPr>
           <a:xfrm>
-            <a:off x="8749115" y="5739626"/>
+            <a:off x="8749115" y="8134721"/>
             <a:ext cx="2606188" cy="320675"/>
             <a:chOff x="8685741" y="5591175"/>
             <a:chExt cx="2606188" cy="320675"/>
@@ -16607,7 +16264,7 @@
         </p:nvGrpSpPr>
         <p:grpSpPr>
           <a:xfrm>
-            <a:off x="6329281" y="5739626"/>
+            <a:off x="6329281" y="8134721"/>
             <a:ext cx="2408804" cy="320675"/>
             <a:chOff x="5451271" y="5591175"/>
             <a:chExt cx="2408804" cy="320675"/>
@@ -16850,7 +16507,7 @@
         </p:nvCxnSpPr>
         <p:spPr>
           <a:xfrm>
-            <a:off x="8750079" y="5586529"/>
+            <a:off x="8750079" y="7982753"/>
             <a:ext cx="0" cy="620751"/>
           </a:xfrm>
           <a:prstGeom prst="line">
@@ -16891,7 +16548,7 @@
         </p:nvSpPr>
         <p:spPr>
           <a:xfrm>
-            <a:off x="10556944" y="2607302"/>
+            <a:off x="10556944" y="3850318"/>
             <a:ext cx="242230" cy="232560"/>
           </a:xfrm>
           <a:prstGeom prst="ellipse">
@@ -16947,8 +16604,8 @@
         </p:nvSpPr>
         <p:spPr>
           <a:xfrm>
-            <a:off x="611861" y="4740640"/>
-            <a:ext cx="847147" cy="674558"/>
+            <a:off x="611866" y="5983235"/>
+            <a:ext cx="847147" cy="1824487"/>
           </a:xfrm>
           <a:prstGeom prst="rect">
             <a:avLst/>
@@ -16989,8 +16646,8 @@
         </p:nvCxnSpPr>
         <p:spPr>
           <a:xfrm>
-            <a:off x="1468732" y="4736892"/>
-            <a:ext cx="0" cy="685800"/>
+            <a:off x="1468732" y="5985846"/>
+            <a:ext cx="0" cy="1836186"/>
           </a:xfrm>
           <a:prstGeom prst="line">
             <a:avLst/>
@@ -17030,8 +16687,8 @@
         </p:nvSpPr>
         <p:spPr>
           <a:xfrm>
-            <a:off x="1660445" y="4753568"/>
-            <a:ext cx="9656231" cy="663509"/>
+            <a:off x="1660450" y="5996589"/>
+            <a:ext cx="9656231" cy="1827641"/>
           </a:xfrm>
           <a:prstGeom prst="rect">
             <a:avLst/>
@@ -17086,8 +16743,8 @@
         </p:nvSpPr>
         <p:spPr>
           <a:xfrm>
-            <a:off x="1670050" y="4765675"/>
-            <a:ext cx="9639300" cy="638175"/>
+            <a:off x="1670050" y="6008691"/>
+            <a:ext cx="9639300" cy="1803400"/>
           </a:xfrm>
           <a:prstGeom prst="rect">
             <a:avLst/>
@@ -17147,8 +16804,8 @@
         </p:nvSpPr>
         <p:spPr>
           <a:xfrm>
-            <a:off x="1666875" y="4769519"/>
-            <a:ext cx="9639301" cy="634331"/>
+            <a:off x="1666880" y="6012534"/>
+            <a:ext cx="9639301" cy="1796382"/>
           </a:xfrm>
           <a:prstGeom prst="rect">
             <a:avLst/>
@@ -17249,7 +16906,7 @@
         </p:nvSpPr>
         <p:spPr>
           <a:xfrm>
-            <a:off x="3340881" y="1385669"/>
+            <a:off x="3340881" y="2528669"/>
             <a:ext cx="242230" cy="232560"/>
           </a:xfrm>
           <a:prstGeom prst="ellipse">
@@ -17310,7 +16967,7 @@
         </p:nvSpPr>
         <p:spPr>
           <a:xfrm>
-            <a:off x="1975848" y="2659169"/>
+            <a:off x="1975848" y="3802169"/>
             <a:ext cx="314788" cy="302220"/>
           </a:xfrm>
           <a:prstGeom prst="ellipse">
@@ -17373,7 +17030,7 @@
         </p:nvSpPr>
         <p:spPr>
           <a:xfrm>
-            <a:off x="1941547" y="3347638"/>
+            <a:off x="1941547" y="4490638"/>
             <a:ext cx="314788" cy="302220"/>
           </a:xfrm>
           <a:prstGeom prst="ellipse">
@@ -17436,7 +17093,7 @@
         </p:nvSpPr>
         <p:spPr>
           <a:xfrm rot="16200000">
-            <a:off x="4264034" y="3081109"/>
+            <a:off x="4264034" y="4224109"/>
             <a:ext cx="530568" cy="303028"/>
           </a:xfrm>
           <a:prstGeom prst="roundRect">
@@ -17499,7 +17156,7 @@
 <file path=ppt/theme/theme1.xml><?xml version="1.0" encoding="utf-8"?>
 <a:theme xmlns:a="http://schemas.openxmlformats.org/drawingml/2006/main" name="Office Theme">
   <a:themeElements>
-    <a:clrScheme name="Office">
+    <a:clrScheme name="Office Theme">
       <a:dk1>
         <a:sysClr val="windowText" lastClr="000000"/>
       </a:dk1>
@@ -17537,7 +17194,7 @@
         <a:srgbClr val="96607D"/>
       </a:folHlink>
     </a:clrScheme>
-    <a:fontScheme name="Office">
+    <a:fontScheme name="Office Theme">
       <a:majorFont>
         <a:latin typeface="Aptos Display" panose="02110004020202020204"/>
         <a:ea typeface=""/>
@@ -17643,7 +17300,7 @@
         <a:font script="Tfng" typeface="Ebrima"/>
       </a:minorFont>
     </a:fontScheme>
-    <a:fmtScheme name="Office">
+    <a:fmtScheme name="Office Theme">
       <a:fillStyleLst>
         <a:solidFill>
           <a:schemeClr val="phClr"/>

</xml_diff>